<commit_message>
Add notebook pointers to slides
</commit_message>
<xml_diff>
--- a/prace_days_ml_2019.pptx
+++ b/prace_days_ml_2019.pptx
@@ -5,33 +5,34 @@
     <p:sldMasterId id="2147483660" r:id="rId1"/>
   </p:sldMasterIdLst>
   <p:notesMasterIdLst>
-    <p:notesMasterId r:id="rId26"/>
+    <p:notesMasterId r:id="rId27"/>
   </p:notesMasterIdLst>
   <p:sldIdLst>
     <p:sldId id="257" r:id="rId2"/>
-    <p:sldId id="258" r:id="rId3"/>
-    <p:sldId id="259" r:id="rId4"/>
-    <p:sldId id="260" r:id="rId5"/>
-    <p:sldId id="261" r:id="rId6"/>
-    <p:sldId id="266" r:id="rId7"/>
-    <p:sldId id="265" r:id="rId8"/>
-    <p:sldId id="274" r:id="rId9"/>
-    <p:sldId id="267" r:id="rId10"/>
-    <p:sldId id="277" r:id="rId11"/>
-    <p:sldId id="268" r:id="rId12"/>
-    <p:sldId id="262" r:id="rId13"/>
-    <p:sldId id="263" r:id="rId14"/>
-    <p:sldId id="264" r:id="rId15"/>
-    <p:sldId id="273" r:id="rId16"/>
-    <p:sldId id="276" r:id="rId17"/>
-    <p:sldId id="270" r:id="rId18"/>
-    <p:sldId id="271" r:id="rId19"/>
-    <p:sldId id="275" r:id="rId20"/>
+    <p:sldId id="281" r:id="rId3"/>
+    <p:sldId id="258" r:id="rId4"/>
+    <p:sldId id="259" r:id="rId5"/>
+    <p:sldId id="260" r:id="rId6"/>
+    <p:sldId id="261" r:id="rId7"/>
+    <p:sldId id="266" r:id="rId8"/>
+    <p:sldId id="265" r:id="rId9"/>
+    <p:sldId id="274" r:id="rId10"/>
+    <p:sldId id="267" r:id="rId11"/>
+    <p:sldId id="277" r:id="rId12"/>
+    <p:sldId id="268" r:id="rId13"/>
+    <p:sldId id="262" r:id="rId14"/>
+    <p:sldId id="263" r:id="rId15"/>
+    <p:sldId id="264" r:id="rId16"/>
+    <p:sldId id="273" r:id="rId17"/>
+    <p:sldId id="276" r:id="rId18"/>
+    <p:sldId id="270" r:id="rId19"/>
+    <p:sldId id="271" r:id="rId20"/>
     <p:sldId id="272" r:id="rId21"/>
     <p:sldId id="279" r:id="rId22"/>
     <p:sldId id="280" r:id="rId23"/>
-    <p:sldId id="278" r:id="rId24"/>
-    <p:sldId id="269" r:id="rId25"/>
+    <p:sldId id="275" r:id="rId24"/>
+    <p:sldId id="278" r:id="rId25"/>
+    <p:sldId id="269" r:id="rId26"/>
   </p:sldIdLst>
   <p:sldSz cx="12192000" cy="6858000"/>
   <p:notesSz cx="6858000" cy="9144000"/>
@@ -130,6 +131,11 @@
       </a:defRPr>
     </a:lvl9pPr>
   </p:defaultTextStyle>
+  <p:extLst>
+    <p:ext uri="{EFAFB233-063F-42B5-8137-9DF3F51BA10A}">
+      <p15:sldGuideLst xmlns:p15="http://schemas.microsoft.com/office/powerpoint/2012/main"/>
+    </p:ext>
+  </p:extLst>
 </p:presentation>
 </file>
 
@@ -215,7 +221,7 @@
           <a:p>
             <a:fld id="{DBF5F7A3-80FA-4DE8-9E10-D5FD6AAF4E4C}" type="datetimeFigureOut">
               <a:rPr lang="en-US" smtClean="0"/>
-              <a:t>5/2/2019</a:t>
+              <a:t>5/9/2019</a:t>
             </a:fld>
             <a:endParaRPr lang="en-US"/>
           </a:p>
@@ -554,7 +560,7 @@
           <a:p>
             <a:fld id="{2DAAB5DE-4D54-4E1E-B02D-B50369E95D41}" type="slidenum">
               <a:rPr lang="en-US" smtClean="0"/>
-              <a:t>11</a:t>
+              <a:t>12</a:t>
             </a:fld>
             <a:endParaRPr lang="en-US"/>
           </a:p>
@@ -772,7 +778,7 @@
           <a:p>
             <a:fld id="{12D417FB-DB75-4510-8AD7-5416595AADD8}" type="datetime1">
               <a:rPr lang="en-US" smtClean="0"/>
-              <a:t>5/2/2019</a:t>
+              <a:t>5/9/2019</a:t>
             </a:fld>
             <a:endParaRPr lang="en-US"/>
           </a:p>
@@ -3178,7 +3184,7 @@
           <a:p>
             <a:fld id="{EC448E59-F64F-416B-85C7-F58EA54BAF31}" type="datetime1">
               <a:rPr lang="nl-BE" smtClean="0"/>
-              <a:t>2/05/2019</a:t>
+              <a:t>9/05/2019</a:t>
             </a:fld>
             <a:endParaRPr lang="nl-BE"/>
           </a:p>
@@ -5256,6 +5262,503 @@
           <a:p>
             <a:r>
               <a:rPr lang="en-BE" dirty="0" smtClean="0"/>
+              <a:t>Machine learning algorithms</a:t>
+            </a:r>
+            <a:endParaRPr lang="en-US" dirty="0"/>
+          </a:p>
+        </p:txBody>
+      </p:sp>
+      <p:sp>
+        <p:nvSpPr>
+          <p:cNvPr id="3" name="Content Placeholder 2"/>
+          <p:cNvSpPr>
+            <a:spLocks noGrp="1"/>
+          </p:cNvSpPr>
+          <p:nvPr>
+            <p:ph idx="1"/>
+          </p:nvPr>
+        </p:nvSpPr>
+        <p:spPr/>
+        <p:txBody>
+          <a:bodyPr>
+            <a:normAutofit fontScale="92500" lnSpcReduction="10000"/>
+          </a:bodyPr>
+          <a:lstStyle/>
+          <a:p>
+            <a:r>
+              <a:rPr lang="en-BE" dirty="0" smtClean="0"/>
+              <a:t>Regression:</a:t>
+            </a:r>
+            <a:br>
+              <a:rPr lang="en-BE" dirty="0" smtClean="0"/>
+            </a:br>
+            <a:r>
+              <a:rPr lang="en-BE" dirty="0" smtClean="0"/>
+              <a:t>Ridge regression, Support Vector Machines, Random Forest,</a:t>
+            </a:r>
+            <a:br>
+              <a:rPr lang="en-BE" dirty="0" smtClean="0"/>
+            </a:br>
+            <a:r>
+              <a:rPr lang="en-BE" dirty="0" smtClean="0"/>
+              <a:t>Multilayer Neural Networks, Deep Neural Networks, ...</a:t>
+            </a:r>
+          </a:p>
+          <a:p>
+            <a:endParaRPr lang="en-BE" dirty="0" smtClean="0"/>
+          </a:p>
+          <a:p>
+            <a:r>
+              <a:rPr lang="en-BE" dirty="0" smtClean="0"/>
+              <a:t>Classification:</a:t>
+            </a:r>
+            <a:br>
+              <a:rPr lang="en-BE" dirty="0" smtClean="0"/>
+            </a:br>
+            <a:r>
+              <a:rPr lang="en-BE" dirty="0" smtClean="0"/>
+              <a:t>Naive Base, </a:t>
+            </a:r>
+            <a:r>
+              <a:rPr lang="en-BE" dirty="0"/>
+              <a:t>, Support Vector </a:t>
+            </a:r>
+            <a:r>
+              <a:rPr lang="en-BE" dirty="0" smtClean="0"/>
+              <a:t>Machines,</a:t>
+            </a:r>
+            <a:br>
+              <a:rPr lang="en-BE" dirty="0" smtClean="0"/>
+            </a:br>
+            <a:r>
+              <a:rPr lang="en-BE" dirty="0" smtClean="0"/>
+              <a:t>Random Forest, Multilayer </a:t>
+            </a:r>
+            <a:r>
+              <a:rPr lang="en-BE" dirty="0"/>
+              <a:t>Neural Networks</a:t>
+            </a:r>
+            <a:r>
+              <a:rPr lang="en-BE" dirty="0" smtClean="0"/>
+              <a:t>,</a:t>
+            </a:r>
+            <a:br>
+              <a:rPr lang="en-BE" dirty="0" smtClean="0"/>
+            </a:br>
+            <a:r>
+              <a:rPr lang="en-BE" dirty="0" smtClean="0"/>
+              <a:t>Deep </a:t>
+            </a:r>
+            <a:r>
+              <a:rPr lang="en-BE" dirty="0"/>
+              <a:t>Neural Networks, </a:t>
+            </a:r>
+            <a:r>
+              <a:rPr lang="en-BE" dirty="0" smtClean="0"/>
+              <a:t>...</a:t>
+            </a:r>
+          </a:p>
+          <a:p>
+            <a:endParaRPr lang="en-BE" dirty="0" smtClean="0"/>
+          </a:p>
+          <a:p>
+            <a:r>
+              <a:rPr lang="en-BE" dirty="0" smtClean="0"/>
+              <a:t>Clustering:</a:t>
+            </a:r>
+            <a:br>
+              <a:rPr lang="en-BE" dirty="0" smtClean="0"/>
+            </a:br>
+            <a:r>
+              <a:rPr lang="en-BE" dirty="0" smtClean="0"/>
+              <a:t>k-Means, Hierarchical Clustering, ...</a:t>
+            </a:r>
+            <a:endParaRPr lang="en-BE" dirty="0"/>
+          </a:p>
+          <a:p>
+            <a:pPr lvl="1"/>
+            <a:endParaRPr lang="en-US" dirty="0"/>
+          </a:p>
+        </p:txBody>
+      </p:sp>
+      <p:sp>
+        <p:nvSpPr>
+          <p:cNvPr id="4" name="Slide Number Placeholder 3"/>
+          <p:cNvSpPr>
+            <a:spLocks noGrp="1"/>
+          </p:cNvSpPr>
+          <p:nvPr>
+            <p:ph type="sldNum" sz="quarter" idx="12"/>
+          </p:nvPr>
+        </p:nvSpPr>
+        <p:spPr/>
+        <p:txBody>
+          <a:bodyPr/>
+          <a:lstStyle/>
+          <a:p>
+            <a:fld id="{5A209D72-2E9D-49B0-8977-41DCCC66C0BB}" type="slidenum">
+              <a:rPr lang="nl-BE" smtClean="0"/>
+              <a:t>10</a:t>
+            </a:fld>
+            <a:endParaRPr lang="nl-BE"/>
+          </a:p>
+        </p:txBody>
+      </p:sp>
+      <p:sp>
+        <p:nvSpPr>
+          <p:cNvPr id="5" name="Rectangle 4"/>
+          <p:cNvSpPr/>
+          <p:nvPr/>
+        </p:nvSpPr>
+        <p:spPr>
+          <a:xfrm>
+            <a:off x="1140823" y="4319453"/>
+            <a:ext cx="3230880" cy="383175"/>
+          </a:xfrm>
+          <a:prstGeom prst="rect">
+            <a:avLst/>
+          </a:prstGeom>
+          <a:noFill/>
+          <a:ln w="28575"/>
+        </p:spPr>
+        <p:style>
+          <a:lnRef idx="2">
+            <a:schemeClr val="accent1">
+              <a:shade val="50000"/>
+            </a:schemeClr>
+          </a:lnRef>
+          <a:fillRef idx="1">
+            <a:schemeClr val="accent1"/>
+          </a:fillRef>
+          <a:effectRef idx="0">
+            <a:schemeClr val="accent1"/>
+          </a:effectRef>
+          <a:fontRef idx="minor">
+            <a:schemeClr val="lt1"/>
+          </a:fontRef>
+        </p:style>
+        <p:txBody>
+          <a:bodyPr rtlCol="0" anchor="ctr"/>
+          <a:lstStyle/>
+          <a:p>
+            <a:pPr algn="ctr"/>
+            <a:endParaRPr lang="en-US"/>
+          </a:p>
+        </p:txBody>
+      </p:sp>
+      <p:sp>
+        <p:nvSpPr>
+          <p:cNvPr id="9" name="Rectangle 8"/>
+          <p:cNvSpPr/>
+          <p:nvPr/>
+        </p:nvSpPr>
+        <p:spPr>
+          <a:xfrm>
+            <a:off x="1097279" y="2172137"/>
+            <a:ext cx="2438402" cy="300971"/>
+          </a:xfrm>
+          <a:prstGeom prst="rect">
+            <a:avLst/>
+          </a:prstGeom>
+          <a:noFill/>
+          <a:ln w="28575"/>
+        </p:spPr>
+        <p:style>
+          <a:lnRef idx="2">
+            <a:schemeClr val="accent1">
+              <a:shade val="50000"/>
+            </a:schemeClr>
+          </a:lnRef>
+          <a:fillRef idx="1">
+            <a:schemeClr val="accent1"/>
+          </a:fillRef>
+          <a:effectRef idx="0">
+            <a:schemeClr val="accent1"/>
+          </a:effectRef>
+          <a:fontRef idx="minor">
+            <a:schemeClr val="lt1"/>
+          </a:fontRef>
+        </p:style>
+        <p:txBody>
+          <a:bodyPr rtlCol="0" anchor="ctr"/>
+          <a:lstStyle/>
+          <a:p>
+            <a:pPr algn="ctr"/>
+            <a:endParaRPr lang="en-US"/>
+          </a:p>
+        </p:txBody>
+      </p:sp>
+      <p:pic>
+        <p:nvPicPr>
+          <p:cNvPr id="7178" name="Picture 10" descr="Image result for support vector machine"/>
+          <p:cNvPicPr>
+            <a:picLocks noChangeAspect="1" noChangeArrowheads="1"/>
+          </p:cNvPicPr>
+          <p:nvPr/>
+        </p:nvPicPr>
+        <p:blipFill>
+          <a:blip r:embed="rId2">
+            <a:extLst>
+              <a:ext uri="{28A0092B-C50C-407E-A947-70E740481C1C}">
+                <a14:useLocalDpi xmlns:a14="http://schemas.microsoft.com/office/drawing/2010/main" val="0"/>
+              </a:ext>
+            </a:extLst>
+          </a:blip>
+          <a:srcRect/>
+          <a:stretch>
+            <a:fillRect/>
+          </a:stretch>
+        </p:blipFill>
+        <p:spPr bwMode="auto">
+          <a:xfrm>
+            <a:off x="8010778" y="3196046"/>
+            <a:ext cx="2117199" cy="2088970"/>
+          </a:xfrm>
+          <a:prstGeom prst="rect">
+            <a:avLst/>
+          </a:prstGeom>
+          <a:noFill/>
+          <a:extLst>
+            <a:ext uri="{909E8E84-426E-40DD-AFC4-6F175D3DCCD1}">
+              <a14:hiddenFill xmlns:a14="http://schemas.microsoft.com/office/drawing/2010/main">
+                <a:solidFill>
+                  <a:srgbClr val="FFFFFF"/>
+                </a:solidFill>
+              </a14:hiddenFill>
+            </a:ext>
+          </a:extLst>
+        </p:spPr>
+      </p:pic>
+    </p:spTree>
+    <p:extLst>
+      <p:ext uri="{BB962C8B-B14F-4D97-AF65-F5344CB8AC3E}">
+        <p14:creationId xmlns:p14="http://schemas.microsoft.com/office/powerpoint/2010/main" val="1761648139"/>
+      </p:ext>
+    </p:extLst>
+  </p:cSld>
+  <p:clrMapOvr>
+    <a:masterClrMapping/>
+  </p:clrMapOvr>
+  <p:timing>
+    <p:tnLst>
+      <p:par>
+        <p:cTn id="1" dur="indefinite" restart="never" nodeType="tmRoot">
+          <p:childTnLst>
+            <p:seq concurrent="1" nextAc="seek">
+              <p:cTn id="2" dur="indefinite" nodeType="mainSeq">
+                <p:childTnLst>
+                  <p:par>
+                    <p:cTn id="3" fill="hold">
+                      <p:stCondLst>
+                        <p:cond delay="indefinite"/>
+                        <p:cond evt="onBegin" delay="0">
+                          <p:tn val="2"/>
+                        </p:cond>
+                      </p:stCondLst>
+                      <p:childTnLst>
+                        <p:par>
+                          <p:cTn id="4" fill="hold">
+                            <p:stCondLst>
+                              <p:cond delay="0"/>
+                            </p:stCondLst>
+                            <p:childTnLst>
+                              <p:par>
+                                <p:cTn id="5" presetID="1" presetClass="entr" presetSubtype="0" fill="hold" grpId="0" nodeType="withEffect">
+                                  <p:stCondLst>
+                                    <p:cond delay="0"/>
+                                  </p:stCondLst>
+                                  <p:childTnLst>
+                                    <p:set>
+                                      <p:cBhvr>
+                                        <p:cTn id="6" dur="1" fill="hold">
+                                          <p:stCondLst>
+                                            <p:cond delay="0"/>
+                                          </p:stCondLst>
+                                        </p:cTn>
+                                        <p:tgtEl>
+                                          <p:spTgt spid="3">
+                                            <p:txEl>
+                                              <p:pRg st="0" end="0"/>
+                                            </p:txEl>
+                                          </p:spTgt>
+                                        </p:tgtEl>
+                                        <p:attrNameLst>
+                                          <p:attrName>style.visibility</p:attrName>
+                                        </p:attrNameLst>
+                                      </p:cBhvr>
+                                      <p:to>
+                                        <p:strVal val="visible"/>
+                                      </p:to>
+                                    </p:set>
+                                  </p:childTnLst>
+                                </p:cTn>
+                              </p:par>
+                            </p:childTnLst>
+                          </p:cTn>
+                        </p:par>
+                      </p:childTnLst>
+                    </p:cTn>
+                  </p:par>
+                  <p:par>
+                    <p:cTn id="7" fill="hold">
+                      <p:stCondLst>
+                        <p:cond delay="indefinite"/>
+                      </p:stCondLst>
+                      <p:childTnLst>
+                        <p:par>
+                          <p:cTn id="8" fill="hold">
+                            <p:stCondLst>
+                              <p:cond delay="0"/>
+                            </p:stCondLst>
+                            <p:childTnLst>
+                              <p:par>
+                                <p:cTn id="9" presetID="1" presetClass="entr" presetSubtype="0" fill="hold" grpId="0" nodeType="clickEffect">
+                                  <p:stCondLst>
+                                    <p:cond delay="0"/>
+                                  </p:stCondLst>
+                                  <p:childTnLst>
+                                    <p:set>
+                                      <p:cBhvr>
+                                        <p:cTn id="10" dur="1" fill="hold">
+                                          <p:stCondLst>
+                                            <p:cond delay="0"/>
+                                          </p:stCondLst>
+                                        </p:cTn>
+                                        <p:tgtEl>
+                                          <p:spTgt spid="3">
+                                            <p:txEl>
+                                              <p:pRg st="2" end="2"/>
+                                            </p:txEl>
+                                          </p:spTgt>
+                                        </p:tgtEl>
+                                        <p:attrNameLst>
+                                          <p:attrName>style.visibility</p:attrName>
+                                        </p:attrNameLst>
+                                      </p:cBhvr>
+                                      <p:to>
+                                        <p:strVal val="visible"/>
+                                      </p:to>
+                                    </p:set>
+                                  </p:childTnLst>
+                                </p:cTn>
+                              </p:par>
+                            </p:childTnLst>
+                          </p:cTn>
+                        </p:par>
+                      </p:childTnLst>
+                    </p:cTn>
+                  </p:par>
+                  <p:par>
+                    <p:cTn id="11" fill="hold">
+                      <p:stCondLst>
+                        <p:cond delay="indefinite"/>
+                      </p:stCondLst>
+                      <p:childTnLst>
+                        <p:par>
+                          <p:cTn id="12" fill="hold">
+                            <p:stCondLst>
+                              <p:cond delay="0"/>
+                            </p:stCondLst>
+                            <p:childTnLst>
+                              <p:par>
+                                <p:cTn id="13" presetID="1" presetClass="entr" presetSubtype="0" fill="hold" grpId="0" nodeType="clickEffect">
+                                  <p:stCondLst>
+                                    <p:cond delay="0"/>
+                                  </p:stCondLst>
+                                  <p:childTnLst>
+                                    <p:set>
+                                      <p:cBhvr>
+                                        <p:cTn id="14" dur="1" fill="hold">
+                                          <p:stCondLst>
+                                            <p:cond delay="0"/>
+                                          </p:stCondLst>
+                                        </p:cTn>
+                                        <p:tgtEl>
+                                          <p:spTgt spid="3">
+                                            <p:txEl>
+                                              <p:pRg st="4" end="4"/>
+                                            </p:txEl>
+                                          </p:spTgt>
+                                        </p:tgtEl>
+                                        <p:attrNameLst>
+                                          <p:attrName>style.visibility</p:attrName>
+                                        </p:attrNameLst>
+                                      </p:cBhvr>
+                                      <p:to>
+                                        <p:strVal val="visible"/>
+                                      </p:to>
+                                    </p:set>
+                                  </p:childTnLst>
+                                </p:cTn>
+                              </p:par>
+                            </p:childTnLst>
+                          </p:cTn>
+                        </p:par>
+                      </p:childTnLst>
+                    </p:cTn>
+                  </p:par>
+                </p:childTnLst>
+              </p:cTn>
+              <p:prevCondLst>
+                <p:cond evt="onPrev" delay="0">
+                  <p:tgtEl>
+                    <p:sldTgt/>
+                  </p:tgtEl>
+                </p:cond>
+              </p:prevCondLst>
+              <p:nextCondLst>
+                <p:cond evt="onNext" delay="0">
+                  <p:tgtEl>
+                    <p:sldTgt/>
+                  </p:tgtEl>
+                </p:cond>
+              </p:nextCondLst>
+            </p:seq>
+          </p:childTnLst>
+        </p:cTn>
+      </p:par>
+    </p:tnLst>
+    <p:bldLst>
+      <p:bldP spid="3" grpId="0" uiExpand="1" build="p"/>
+    </p:bldLst>
+  </p:timing>
+</p:sld>
+</file>
+
+<file path=ppt/slides/slide11.xml><?xml version="1.0" encoding="utf-8"?>
+<p:sld xmlns:a="http://schemas.openxmlformats.org/drawingml/2006/main" xmlns:r="http://schemas.openxmlformats.org/officeDocument/2006/relationships" xmlns:p="http://schemas.openxmlformats.org/presentationml/2006/main">
+  <p:cSld>
+    <p:spTree>
+      <p:nvGrpSpPr>
+        <p:cNvPr id="1" name=""/>
+        <p:cNvGrpSpPr/>
+        <p:nvPr/>
+      </p:nvGrpSpPr>
+      <p:grpSpPr>
+        <a:xfrm>
+          <a:off x="0" y="0"/>
+          <a:ext cx="0" cy="0"/>
+          <a:chOff x="0" y="0"/>
+          <a:chExt cx="0" cy="0"/>
+        </a:xfrm>
+      </p:grpSpPr>
+      <p:sp>
+        <p:nvSpPr>
+          <p:cNvPr id="2" name="Title 1"/>
+          <p:cNvSpPr>
+            <a:spLocks noGrp="1"/>
+          </p:cNvSpPr>
+          <p:nvPr>
+            <p:ph type="title"/>
+          </p:nvPr>
+        </p:nvSpPr>
+        <p:spPr/>
+        <p:txBody>
+          <a:bodyPr/>
+          <a:lstStyle/>
+          <a:p>
+            <a:r>
+              <a:rPr lang="en-BE" dirty="0" smtClean="0"/>
               <a:t>Issues</a:t>
             </a:r>
             <a:endParaRPr lang="en-US" dirty="0"/>
@@ -5338,7 +5841,7 @@
           <a:p>
             <a:fld id="{5A209D72-2E9D-49B0-8977-41DCCC66C0BB}" type="slidenum">
               <a:rPr lang="nl-BE" smtClean="0"/>
-              <a:t>10</a:t>
+              <a:t>11</a:t>
             </a:fld>
             <a:endParaRPr lang="nl-BE"/>
           </a:p>
@@ -5600,7 +6103,7 @@
 </p:sld>
 </file>
 
-<file path=ppt/slides/slide11.xml><?xml version="1.0" encoding="utf-8"?>
+<file path=ppt/slides/slide12.xml><?xml version="1.0" encoding="utf-8"?>
 <p:sld xmlns:a="http://schemas.openxmlformats.org/drawingml/2006/main" xmlns:r="http://schemas.openxmlformats.org/officeDocument/2006/relationships" xmlns:p="http://schemas.openxmlformats.org/presentationml/2006/main">
   <p:cSld>
     <p:spTree>
@@ -5730,7 +6233,7 @@
           <a:p>
             <a:fld id="{5A209D72-2E9D-49B0-8977-41DCCC66C0BB}" type="slidenum">
               <a:rPr lang="nl-BE" smtClean="0"/>
-              <a:t>11</a:t>
+              <a:t>12</a:t>
             </a:fld>
             <a:endParaRPr lang="nl-BE"/>
           </a:p>
@@ -6552,7 +7055,7 @@
 </p:sld>
 </file>
 
-<file path=ppt/slides/slide12.xml><?xml version="1.0" encoding="utf-8"?>
+<file path=ppt/slides/slide13.xml><?xml version="1.0" encoding="utf-8"?>
 <p:sld xmlns:a="http://schemas.openxmlformats.org/drawingml/2006/main" xmlns:r="http://schemas.openxmlformats.org/officeDocument/2006/relationships" xmlns:p="http://schemas.openxmlformats.org/presentationml/2006/main">
   <p:cSld>
     <p:spTree>
@@ -6613,7 +7116,6 @@
               <a:rPr lang="en-US" dirty="0" smtClean="0"/>
               <a:t>Programming languages</a:t>
             </a:r>
-            <a:endParaRPr lang="en-US" dirty="0" smtClean="0"/>
           </a:p>
           <a:p>
             <a:pPr lvl="1"/>
@@ -6628,7 +7130,6 @@
               <a:rPr lang="en-US" dirty="0" smtClean="0"/>
               <a:t>R</a:t>
             </a:r>
-            <a:endParaRPr lang="en-US" dirty="0" smtClean="0"/>
           </a:p>
           <a:p>
             <a:pPr lvl="1"/>
@@ -6714,7 +7215,7 @@
           <a:p>
             <a:fld id="{5A209D72-2E9D-49B0-8977-41DCCC66C0BB}" type="slidenum">
               <a:rPr lang="nl-BE" smtClean="0"/>
-              <a:t>12</a:t>
+              <a:t>13</a:t>
             </a:fld>
             <a:endParaRPr lang="nl-BE"/>
           </a:p>
@@ -6763,13 +7264,8 @@
             <a:p>
               <a:r>
                 <a:rPr lang="en-US" sz="2000" dirty="0"/>
-                <a:t>classic machine </a:t>
+                <a:t>classic machine learning</a:t>
               </a:r>
-              <a:r>
-                <a:rPr lang="en-US" sz="2000" dirty="0"/>
-                <a:t>learning</a:t>
-              </a:r>
-              <a:endParaRPr lang="en-US" sz="2000" dirty="0"/>
             </a:p>
           </p:txBody>
         </p:sp>
@@ -6871,7 +7367,6 @@
                   <a:rPr lang="en-US" sz="2000" dirty="0"/>
                   <a:t>deep learning frameworks</a:t>
                 </a:r>
-                <a:endParaRPr lang="en-US" sz="2000" dirty="0"/>
               </a:p>
             </p:txBody>
           </p:sp>
@@ -7001,7 +7496,6 @@
               <a:rPr lang="en-US" sz="2400" dirty="0"/>
               <a:t>Fast-evolving ecosystem!</a:t>
             </a:r>
-            <a:endParaRPr lang="en-US" sz="2400" dirty="0"/>
           </a:p>
         </p:txBody>
       </p:sp>
@@ -7843,7 +8337,7 @@
 </p:sld>
 </file>
 
-<file path=ppt/slides/slide13.xml><?xml version="1.0" encoding="utf-8"?>
+<file path=ppt/slides/slide14.xml><?xml version="1.0" encoding="utf-8"?>
 <p:sld xmlns:a="http://schemas.openxmlformats.org/drawingml/2006/main" xmlns:r="http://schemas.openxmlformats.org/officeDocument/2006/relationships" xmlns:p="http://schemas.openxmlformats.org/presentationml/2006/main">
   <p:cSld>
     <p:spTree>
@@ -8000,7 +8494,7 @@
           <a:p>
             <a:fld id="{5A209D72-2E9D-49B0-8977-41DCCC66C0BB}" type="slidenum">
               <a:rPr lang="nl-BE" smtClean="0"/>
-              <a:t>13</a:t>
+              <a:t>14</a:t>
             </a:fld>
             <a:endParaRPr lang="nl-BE"/>
           </a:p>
@@ -8550,7 +9044,7 @@
 </p:sld>
 </file>
 
-<file path=ppt/slides/slide14.xml><?xml version="1.0" encoding="utf-8"?>
+<file path=ppt/slides/slide15.xml><?xml version="1.0" encoding="utf-8"?>
 <p:sld xmlns:a="http://schemas.openxmlformats.org/drawingml/2006/main" xmlns:r="http://schemas.openxmlformats.org/officeDocument/2006/relationships" xmlns:p="http://schemas.openxmlformats.org/presentationml/2006/main">
   <p:cSld>
     <p:spTree>
@@ -8705,7 +9199,7 @@
           <a:p>
             <a:fld id="{5A209D72-2E9D-49B0-8977-41DCCC66C0BB}" type="slidenum">
               <a:rPr lang="nl-BE" smtClean="0"/>
-              <a:t>14</a:t>
+              <a:t>15</a:t>
             </a:fld>
             <a:endParaRPr lang="nl-BE"/>
           </a:p>
@@ -8852,7 +9346,7 @@
 </p:sld>
 </file>
 
-<file path=ppt/slides/slide15.xml><?xml version="1.0" encoding="utf-8"?>
+<file path=ppt/slides/slide16.xml><?xml version="1.0" encoding="utf-8"?>
 <p:sld xmlns:a="http://schemas.openxmlformats.org/drawingml/2006/main" xmlns:r="http://schemas.openxmlformats.org/officeDocument/2006/relationships" xmlns:p="http://schemas.openxmlformats.org/presentationml/2006/main">
   <p:cSld>
     <p:spTree>
@@ -8994,7 +9488,7 @@
           <a:p>
             <a:fld id="{5A209D72-2E9D-49B0-8977-41DCCC66C0BB}" type="slidenum">
               <a:rPr lang="nl-BE" smtClean="0"/>
-              <a:t>15</a:t>
+              <a:t>16</a:t>
             </a:fld>
             <a:endParaRPr lang="nl-BE"/>
           </a:p>
@@ -9190,7 +9684,7 @@
 </p:sld>
 </file>
 
-<file path=ppt/slides/slide16.xml><?xml version="1.0" encoding="utf-8"?>
+<file path=ppt/slides/slide17.xml><?xml version="1.0" encoding="utf-8"?>
 <p:sld xmlns:a="http://schemas.openxmlformats.org/drawingml/2006/main" xmlns:r="http://schemas.openxmlformats.org/officeDocument/2006/relationships" xmlns:p="http://schemas.openxmlformats.org/presentationml/2006/main">
   <p:cSld>
     <p:spTree>
@@ -9393,7 +9887,7 @@
           <a:p>
             <a:fld id="{5A209D72-2E9D-49B0-8977-41DCCC66C0BB}" type="slidenum">
               <a:rPr lang="nl-BE" smtClean="0"/>
-              <a:t>16</a:t>
+              <a:t>17</a:t>
             </a:fld>
             <a:endParaRPr lang="nl-BE"/>
           </a:p>
@@ -9440,6 +9934,60 @@
           </a:extLst>
         </p:spPr>
       </p:pic>
+      <p:sp>
+        <p:nvSpPr>
+          <p:cNvPr id="6" name="TextBox 5"/>
+          <p:cNvSpPr txBox="1"/>
+          <p:nvPr/>
+        </p:nvSpPr>
+        <p:spPr>
+          <a:xfrm>
+            <a:off x="7226038" y="5172892"/>
+            <a:ext cx="4629794" cy="646331"/>
+          </a:xfrm>
+          <a:prstGeom prst="rect">
+            <a:avLst/>
+          </a:prstGeom>
+          <a:ln/>
+        </p:spPr>
+        <p:style>
+          <a:lnRef idx="1">
+            <a:schemeClr val="accent2"/>
+          </a:lnRef>
+          <a:fillRef idx="2">
+            <a:schemeClr val="accent2"/>
+          </a:fillRef>
+          <a:effectRef idx="1">
+            <a:schemeClr val="accent2"/>
+          </a:effectRef>
+          <a:fontRef idx="minor">
+            <a:schemeClr val="dk1"/>
+          </a:fontRef>
+        </p:style>
+        <p:txBody>
+          <a:bodyPr wrap="none" rtlCol="0">
+            <a:spAutoFit/>
+          </a:bodyPr>
+          <a:lstStyle/>
+          <a:p>
+            <a:r>
+              <a:rPr lang="en-BE" dirty="0" smtClean="0"/>
+              <a:t>Experiment with underfitting and overfitting:</a:t>
+            </a:r>
+          </a:p>
+          <a:p>
+            <a:r>
+              <a:rPr lang="en-BE" dirty="0" smtClean="0">
+                <a:latin typeface="Inconsolata" panose="00000509000000000000" pitchFamily="49" charset="0"/>
+              </a:rPr>
+              <a:t>010_underfitting_overfitting.ipynb</a:t>
+            </a:r>
+            <a:endParaRPr lang="en-US" dirty="0">
+              <a:latin typeface="Inconsolata" panose="00000509000000000000" pitchFamily="49" charset="0"/>
+            </a:endParaRPr>
+          </a:p>
+        </p:txBody>
+      </p:sp>
     </p:spTree>
     <p:extLst>
       <p:ext uri="{BB962C8B-B14F-4D97-AF65-F5344CB8AC3E}">
@@ -9460,7 +10008,7 @@
 </p:sld>
 </file>
 
-<file path=ppt/slides/slide17.xml><?xml version="1.0" encoding="utf-8"?>
+<file path=ppt/slides/slide18.xml><?xml version="1.0" encoding="utf-8"?>
 <p:sld xmlns:a="http://schemas.openxmlformats.org/drawingml/2006/main" xmlns:r="http://schemas.openxmlformats.org/officeDocument/2006/relationships" xmlns:p="http://schemas.openxmlformats.org/presentationml/2006/main">
   <p:cSld>
     <p:spTree>
@@ -9517,7 +10065,7 @@
           <a:p>
             <a:fld id="{A2912448-FEEC-49E8-9588-2DF1F90D57C2}" type="slidenum">
               <a:rPr lang="en-US" smtClean="0"/>
-              <a:t>17</a:t>
+              <a:t>18</a:t>
             </a:fld>
             <a:endParaRPr lang="en-US"/>
           </a:p>
@@ -9593,8 +10141,8 @@
           </a:extLst>
         </p:spPr>
       </p:pic>
-      <mc:AlternateContent xmlns:mc="http://schemas.openxmlformats.org/markup-compatibility/2006">
-        <mc:Choice xmlns:a14="http://schemas.microsoft.com/office/drawing/2010/main" Requires="a14">
+      <mc:AlternateContent xmlns:mc="http://schemas.openxmlformats.org/markup-compatibility/2006" xmlns:a14="http://schemas.microsoft.com/office/drawing/2010/main">
+        <mc:Choice Requires="a14">
           <p:sp>
             <p:nvSpPr>
               <p:cNvPr id="10255" name="TextBox 10254"/>
@@ -9617,6 +10165,7 @@
               </a:bodyPr>
               <a:lstStyle/>
               <a:p>
+                <a:pPr/>
                 <a14:m>
                   <m:oMathPara xmlns:m="http://schemas.openxmlformats.org/officeDocument/2006/math">
                     <m:oMathParaPr>
@@ -9774,7 +10323,7 @@
             </p:txBody>
           </p:sp>
         </mc:Choice>
-        <mc:Fallback>
+        <mc:Fallback xmlns="">
           <p:sp>
             <p:nvSpPr>
               <p:cNvPr id="10255" name="TextBox 10254"/>
@@ -9882,8 +10431,8 @@
               </a:extLst>
             </p:spPr>
           </p:pic>
-          <mc:AlternateContent xmlns:mc="http://schemas.openxmlformats.org/markup-compatibility/2006">
-            <mc:Choice xmlns:a14="http://schemas.microsoft.com/office/drawing/2010/main" Requires="a14">
+          <mc:AlternateContent xmlns:mc="http://schemas.openxmlformats.org/markup-compatibility/2006" xmlns:a14="http://schemas.microsoft.com/office/drawing/2010/main">
+            <mc:Choice Requires="a14">
               <p:sp>
                 <p:nvSpPr>
                   <p:cNvPr id="10258" name="TextBox 10257"/>
@@ -9906,6 +10455,7 @@
                   </a:bodyPr>
                   <a:lstStyle/>
                   <a:p>
+                    <a:pPr/>
                     <a14:m>
                       <m:oMathPara xmlns:m="http://schemas.openxmlformats.org/officeDocument/2006/math">
                         <m:oMathParaPr>
@@ -9926,7 +10476,7 @@
                 </p:txBody>
               </p:sp>
             </mc:Choice>
-            <mc:Fallback>
+            <mc:Fallback xmlns="">
               <p:sp>
                 <p:nvSpPr>
                   <p:cNvPr id="10258" name="TextBox 10257"/>
@@ -9965,8 +10515,8 @@
               </p:sp>
             </mc:Fallback>
           </mc:AlternateContent>
-          <mc:AlternateContent xmlns:mc="http://schemas.openxmlformats.org/markup-compatibility/2006">
-            <mc:Choice xmlns:a14="http://schemas.microsoft.com/office/drawing/2010/main" Requires="a14">
+          <mc:AlternateContent xmlns:mc="http://schemas.openxmlformats.org/markup-compatibility/2006" xmlns:a14="http://schemas.microsoft.com/office/drawing/2010/main">
+            <mc:Choice Requires="a14">
               <p:sp>
                 <p:nvSpPr>
                   <p:cNvPr id="10259" name="TextBox 10258"/>
@@ -9989,6 +10539,7 @@
                   </a:bodyPr>
                   <a:lstStyle/>
                   <a:p>
+                    <a:pPr/>
                     <a14:m>
                       <m:oMathPara xmlns:m="http://schemas.openxmlformats.org/officeDocument/2006/math">
                         <m:oMathParaPr>
@@ -10029,7 +10580,7 @@
                 </p:txBody>
               </p:sp>
             </mc:Choice>
-            <mc:Fallback>
+            <mc:Fallback xmlns="">
               <p:sp>
                 <p:nvSpPr>
                   <p:cNvPr id="10259" name="TextBox 10258"/>
@@ -10128,8 +10679,8 @@
               <a:chExt cx="2258759" cy="2314859"/>
             </a:xfrm>
           </p:grpSpPr>
-          <mc:AlternateContent xmlns:mc="http://schemas.openxmlformats.org/markup-compatibility/2006">
-            <mc:Choice xmlns:a14="http://schemas.microsoft.com/office/drawing/2010/main" Requires="a14">
+          <mc:AlternateContent xmlns:mc="http://schemas.openxmlformats.org/markup-compatibility/2006" xmlns:a14="http://schemas.microsoft.com/office/drawing/2010/main">
+            <mc:Choice Requires="a14">
               <p:sp>
                 <p:nvSpPr>
                   <p:cNvPr id="10246" name="TextBox 10245"/>
@@ -10152,6 +10703,7 @@
                   </a:bodyPr>
                   <a:lstStyle/>
                   <a:p>
+                    <a:pPr/>
                     <a14:m>
                       <m:oMathPara xmlns:m="http://schemas.openxmlformats.org/officeDocument/2006/math">
                         <m:oMathParaPr>
@@ -10191,7 +10743,7 @@
                 </p:txBody>
               </p:sp>
             </mc:Choice>
-            <mc:Fallback>
+            <mc:Fallback xmlns="">
               <p:sp>
                 <p:nvSpPr>
                   <p:cNvPr id="10246" name="TextBox 10245"/>
@@ -10230,8 +10782,8 @@
               </p:sp>
             </mc:Fallback>
           </mc:AlternateContent>
-          <mc:AlternateContent xmlns:mc="http://schemas.openxmlformats.org/markup-compatibility/2006">
-            <mc:Choice xmlns:a14="http://schemas.microsoft.com/office/drawing/2010/main" Requires="a14">
+          <mc:AlternateContent xmlns:mc="http://schemas.openxmlformats.org/markup-compatibility/2006" xmlns:a14="http://schemas.microsoft.com/office/drawing/2010/main">
+            <mc:Choice Requires="a14">
               <p:sp>
                 <p:nvSpPr>
                   <p:cNvPr id="39" name="TextBox 38"/>
@@ -10254,6 +10806,7 @@
                   </a:bodyPr>
                   <a:lstStyle/>
                   <a:p>
+                    <a:pPr/>
                     <a14:m>
                       <m:oMathPara xmlns:m="http://schemas.openxmlformats.org/officeDocument/2006/math">
                         <m:oMathParaPr>
@@ -10293,7 +10846,7 @@
                 </p:txBody>
               </p:sp>
             </mc:Choice>
-            <mc:Fallback>
+            <mc:Fallback xmlns="">
               <p:sp>
                 <p:nvSpPr>
                   <p:cNvPr id="39" name="TextBox 38"/>
@@ -10332,8 +10885,8 @@
               </p:sp>
             </mc:Fallback>
           </mc:AlternateContent>
-          <mc:AlternateContent xmlns:mc="http://schemas.openxmlformats.org/markup-compatibility/2006">
-            <mc:Choice xmlns:a14="http://schemas.microsoft.com/office/drawing/2010/main" Requires="a14">
+          <mc:AlternateContent xmlns:mc="http://schemas.openxmlformats.org/markup-compatibility/2006" xmlns:a14="http://schemas.microsoft.com/office/drawing/2010/main">
+            <mc:Choice Requires="a14">
               <p:sp>
                 <p:nvSpPr>
                   <p:cNvPr id="41" name="TextBox 40"/>
@@ -10356,6 +10909,7 @@
                   </a:bodyPr>
                   <a:lstStyle/>
                   <a:p>
+                    <a:pPr/>
                     <a14:m>
                       <m:oMathPara xmlns:m="http://schemas.openxmlformats.org/officeDocument/2006/math">
                         <m:oMathParaPr>
@@ -10395,7 +10949,7 @@
                 </p:txBody>
               </p:sp>
             </mc:Choice>
-            <mc:Fallback>
+            <mc:Fallback xmlns="">
               <p:sp>
                 <p:nvSpPr>
                   <p:cNvPr id="41" name="TextBox 40"/>
@@ -10434,8 +10988,8 @@
               </p:sp>
             </mc:Fallback>
           </mc:AlternateContent>
-          <mc:AlternateContent xmlns:mc="http://schemas.openxmlformats.org/markup-compatibility/2006">
-            <mc:Choice xmlns:a14="http://schemas.microsoft.com/office/drawing/2010/main" Requires="a14">
+          <mc:AlternateContent xmlns:mc="http://schemas.openxmlformats.org/markup-compatibility/2006" xmlns:a14="http://schemas.microsoft.com/office/drawing/2010/main">
+            <mc:Choice Requires="a14">
               <p:sp>
                 <p:nvSpPr>
                   <p:cNvPr id="42" name="TextBox 41"/>
@@ -10458,6 +11012,7 @@
                   </a:bodyPr>
                   <a:lstStyle/>
                   <a:p>
+                    <a:pPr/>
                     <a14:m>
                       <m:oMathPara xmlns:m="http://schemas.openxmlformats.org/officeDocument/2006/math">
                         <m:oMathParaPr>
@@ -10497,7 +11052,7 @@
                 </p:txBody>
               </p:sp>
             </mc:Choice>
-            <mc:Fallback>
+            <mc:Fallback xmlns="">
               <p:sp>
                 <p:nvSpPr>
                   <p:cNvPr id="42" name="TextBox 41"/>
@@ -10536,8 +11091,8 @@
               </p:sp>
             </mc:Fallback>
           </mc:AlternateContent>
-          <mc:AlternateContent xmlns:mc="http://schemas.openxmlformats.org/markup-compatibility/2006">
-            <mc:Choice xmlns:a14="http://schemas.microsoft.com/office/drawing/2010/main" Requires="a14">
+          <mc:AlternateContent xmlns:mc="http://schemas.openxmlformats.org/markup-compatibility/2006" xmlns:a14="http://schemas.microsoft.com/office/drawing/2010/main">
+            <mc:Choice Requires="a14">
               <p:sp>
                 <p:nvSpPr>
                   <p:cNvPr id="47" name="TextBox 46"/>
@@ -10560,6 +11115,7 @@
                   </a:bodyPr>
                   <a:lstStyle/>
                   <a:p>
+                    <a:pPr/>
                     <a14:m>
                       <m:oMathPara xmlns:m="http://schemas.openxmlformats.org/officeDocument/2006/math">
                         <m:oMathParaPr>
@@ -10599,7 +11155,7 @@
                 </p:txBody>
               </p:sp>
             </mc:Choice>
-            <mc:Fallback>
+            <mc:Fallback xmlns="">
               <p:sp>
                 <p:nvSpPr>
                   <p:cNvPr id="47" name="TextBox 46"/>
@@ -10638,8 +11194,8 @@
               </p:sp>
             </mc:Fallback>
           </mc:AlternateContent>
-          <mc:AlternateContent xmlns:mc="http://schemas.openxmlformats.org/markup-compatibility/2006">
-            <mc:Choice xmlns:a14="http://schemas.microsoft.com/office/drawing/2010/main" Requires="a14">
+          <mc:AlternateContent xmlns:mc="http://schemas.openxmlformats.org/markup-compatibility/2006" xmlns:a14="http://schemas.microsoft.com/office/drawing/2010/main">
+            <mc:Choice Requires="a14">
               <p:sp>
                 <p:nvSpPr>
                   <p:cNvPr id="48" name="TextBox 47"/>
@@ -10662,6 +11218,7 @@
                   </a:bodyPr>
                   <a:lstStyle/>
                   <a:p>
+                    <a:pPr/>
                     <a14:m>
                       <m:oMathPara xmlns:m="http://schemas.openxmlformats.org/officeDocument/2006/math">
                         <m:oMathParaPr>
@@ -10701,7 +11258,7 @@
                 </p:txBody>
               </p:sp>
             </mc:Choice>
-            <mc:Fallback>
+            <mc:Fallback xmlns="">
               <p:sp>
                 <p:nvSpPr>
                   <p:cNvPr id="48" name="TextBox 47"/>
@@ -10740,8 +11297,8 @@
               </p:sp>
             </mc:Fallback>
           </mc:AlternateContent>
-          <mc:AlternateContent xmlns:mc="http://schemas.openxmlformats.org/markup-compatibility/2006">
-            <mc:Choice xmlns:a14="http://schemas.microsoft.com/office/drawing/2010/main" Requires="a14">
+          <mc:AlternateContent xmlns:mc="http://schemas.openxmlformats.org/markup-compatibility/2006" xmlns:a14="http://schemas.microsoft.com/office/drawing/2010/main">
+            <mc:Choice Requires="a14">
               <p:sp>
                 <p:nvSpPr>
                   <p:cNvPr id="49" name="TextBox 48"/>
@@ -10764,6 +11321,7 @@
                   </a:bodyPr>
                   <a:lstStyle/>
                   <a:p>
+                    <a:pPr/>
                     <a14:m>
                       <m:oMathPara xmlns:m="http://schemas.openxmlformats.org/officeDocument/2006/math">
                         <m:oMathParaPr>
@@ -10803,7 +11361,7 @@
                 </p:txBody>
               </p:sp>
             </mc:Choice>
-            <mc:Fallback>
+            <mc:Fallback xmlns="">
               <p:sp>
                 <p:nvSpPr>
                   <p:cNvPr id="49" name="TextBox 48"/>
@@ -10842,8 +11400,8 @@
               </p:sp>
             </mc:Fallback>
           </mc:AlternateContent>
-          <mc:AlternateContent xmlns:mc="http://schemas.openxmlformats.org/markup-compatibility/2006">
-            <mc:Choice xmlns:a14="http://schemas.microsoft.com/office/drawing/2010/main" Requires="a14">
+          <mc:AlternateContent xmlns:mc="http://schemas.openxmlformats.org/markup-compatibility/2006" xmlns:a14="http://schemas.microsoft.com/office/drawing/2010/main">
+            <mc:Choice Requires="a14">
               <p:sp>
                 <p:nvSpPr>
                   <p:cNvPr id="50" name="TextBox 49"/>
@@ -10866,6 +11424,7 @@
                   </a:bodyPr>
                   <a:lstStyle/>
                   <a:p>
+                    <a:pPr/>
                     <a14:m>
                       <m:oMathPara xmlns:m="http://schemas.openxmlformats.org/officeDocument/2006/math">
                         <m:oMathParaPr>
@@ -10905,7 +11464,7 @@
                 </p:txBody>
               </p:sp>
             </mc:Choice>
-            <mc:Fallback>
+            <mc:Fallback xmlns="">
               <p:sp>
                 <p:nvSpPr>
                   <p:cNvPr id="50" name="TextBox 49"/>
@@ -11513,8 +12072,8 @@
               </p:style>
             </p:cxnSp>
           </p:grpSp>
-          <mc:AlternateContent xmlns:mc="http://schemas.openxmlformats.org/markup-compatibility/2006">
-            <mc:Choice xmlns:a14="http://schemas.microsoft.com/office/drawing/2010/main" Requires="a14">
+          <mc:AlternateContent xmlns:mc="http://schemas.openxmlformats.org/markup-compatibility/2006" xmlns:a14="http://schemas.microsoft.com/office/drawing/2010/main">
+            <mc:Choice Requires="a14">
               <p:sp>
                 <p:nvSpPr>
                   <p:cNvPr id="56" name="TextBox 55"/>
@@ -11537,6 +12096,7 @@
                   </a:bodyPr>
                   <a:lstStyle/>
                   <a:p>
+                    <a:pPr/>
                     <a14:m>
                       <m:oMathPara xmlns:m="http://schemas.openxmlformats.org/officeDocument/2006/math">
                         <m:oMathParaPr>
@@ -11557,7 +12117,7 @@
                 </p:txBody>
               </p:sp>
             </mc:Choice>
-            <mc:Fallback>
+            <mc:Fallback xmlns="">
               <p:sp>
                 <p:nvSpPr>
                   <p:cNvPr id="56" name="TextBox 55"/>
@@ -11596,8 +12156,8 @@
               </p:sp>
             </mc:Fallback>
           </mc:AlternateContent>
-          <mc:AlternateContent xmlns:mc="http://schemas.openxmlformats.org/markup-compatibility/2006">
-            <mc:Choice xmlns:a14="http://schemas.microsoft.com/office/drawing/2010/main" Requires="a14">
+          <mc:AlternateContent xmlns:mc="http://schemas.openxmlformats.org/markup-compatibility/2006" xmlns:a14="http://schemas.microsoft.com/office/drawing/2010/main">
+            <mc:Choice Requires="a14">
               <p:sp>
                 <p:nvSpPr>
                   <p:cNvPr id="57" name="TextBox 56"/>
@@ -11620,6 +12180,7 @@
                   </a:bodyPr>
                   <a:lstStyle/>
                   <a:p>
+                    <a:pPr/>
                     <a14:m>
                       <m:oMathPara xmlns:m="http://schemas.openxmlformats.org/officeDocument/2006/math">
                         <m:oMathParaPr>
@@ -11640,7 +12201,7 @@
                 </p:txBody>
               </p:sp>
             </mc:Choice>
-            <mc:Fallback>
+            <mc:Fallback xmlns="">
               <p:sp>
                 <p:nvSpPr>
                   <p:cNvPr id="57" name="TextBox 56"/>
@@ -11680,8 +12241,8 @@
             </mc:Fallback>
           </mc:AlternateContent>
         </p:grpSp>
-        <mc:AlternateContent xmlns:mc="http://schemas.openxmlformats.org/markup-compatibility/2006">
-          <mc:Choice xmlns:a14="http://schemas.microsoft.com/office/drawing/2010/main" Requires="a14">
+        <mc:AlternateContent xmlns:mc="http://schemas.openxmlformats.org/markup-compatibility/2006" xmlns:a14="http://schemas.microsoft.com/office/drawing/2010/main">
+          <mc:Choice Requires="a14">
             <p:sp>
               <p:nvSpPr>
                 <p:cNvPr id="68" name="TextBox 67"/>
@@ -11704,6 +12265,7 @@
                 </a:bodyPr>
                 <a:lstStyle/>
                 <a:p>
+                  <a:pPr/>
                   <a14:m>
                     <m:oMathPara xmlns:m="http://schemas.openxmlformats.org/officeDocument/2006/math">
                       <m:oMathParaPr>
@@ -11730,7 +12292,7 @@
               </p:txBody>
             </p:sp>
           </mc:Choice>
-          <mc:Fallback>
+          <mc:Fallback xmlns="">
             <p:sp>
               <p:nvSpPr>
                 <p:cNvPr id="68" name="TextBox 67"/>
@@ -12049,7 +12611,7 @@
 </p:sld>
 </file>
 
-<file path=ppt/slides/slide18.xml><?xml version="1.0" encoding="utf-8"?>
+<file path=ppt/slides/slide19.xml><?xml version="1.0" encoding="utf-8"?>
 <p:sld xmlns:a="http://schemas.openxmlformats.org/drawingml/2006/main" xmlns:r="http://schemas.openxmlformats.org/officeDocument/2006/relationships" xmlns:p="http://schemas.openxmlformats.org/presentationml/2006/main">
   <p:cSld>
     <p:spTree>
@@ -12106,7 +12668,7 @@
           <a:p>
             <a:fld id="{A2912448-FEEC-49E8-9588-2DF1F90D57C2}" type="slidenum">
               <a:rPr lang="en-US" smtClean="0"/>
-              <a:t>18</a:t>
+              <a:t>19</a:t>
             </a:fld>
             <a:endParaRPr lang="en-US"/>
           </a:p>
@@ -12226,182 +12788,6 @@
 </p:sld>
 </file>
 
-<file path=ppt/slides/slide19.xml><?xml version="1.0" encoding="utf-8"?>
-<p:sld xmlns:a="http://schemas.openxmlformats.org/drawingml/2006/main" xmlns:r="http://schemas.openxmlformats.org/officeDocument/2006/relationships" xmlns:p="http://schemas.openxmlformats.org/presentationml/2006/main">
-  <p:cSld>
-    <p:spTree>
-      <p:nvGrpSpPr>
-        <p:cNvPr id="1" name=""/>
-        <p:cNvGrpSpPr/>
-        <p:nvPr/>
-      </p:nvGrpSpPr>
-      <p:grpSpPr>
-        <a:xfrm>
-          <a:off x="0" y="0"/>
-          <a:ext cx="0" cy="0"/>
-          <a:chOff x="0" y="0"/>
-          <a:chExt cx="0" cy="0"/>
-        </a:xfrm>
-      </p:grpSpPr>
-      <p:sp>
-        <p:nvSpPr>
-          <p:cNvPr id="2" name="Title 1"/>
-          <p:cNvSpPr>
-            <a:spLocks noGrp="1"/>
-          </p:cNvSpPr>
-          <p:nvPr>
-            <p:ph type="title"/>
-          </p:nvPr>
-        </p:nvSpPr>
-        <p:spPr/>
-        <p:txBody>
-          <a:bodyPr/>
-          <a:lstStyle/>
-          <a:p>
-            <a:r>
-              <a:rPr lang="en-BE" dirty="0" smtClean="0"/>
-              <a:t>Deep neural networks</a:t>
-            </a:r>
-            <a:endParaRPr lang="en-US" dirty="0"/>
-          </a:p>
-        </p:txBody>
-      </p:sp>
-      <p:sp>
-        <p:nvSpPr>
-          <p:cNvPr id="3" name="Content Placeholder 2"/>
-          <p:cNvSpPr>
-            <a:spLocks noGrp="1"/>
-          </p:cNvSpPr>
-          <p:nvPr>
-            <p:ph idx="1"/>
-          </p:nvPr>
-        </p:nvSpPr>
-        <p:spPr/>
-        <p:txBody>
-          <a:bodyPr/>
-          <a:lstStyle/>
-          <a:p>
-            <a:r>
-              <a:rPr lang="en-BE" dirty="0" smtClean="0"/>
-              <a:t>Many layers</a:t>
-            </a:r>
-          </a:p>
-          <a:p>
-            <a:r>
-              <a:rPr lang="en-BE" dirty="0" smtClean="0"/>
-              <a:t>Features are </a:t>
-            </a:r>
-            <a:r>
-              <a:rPr lang="en-BE" i="1" dirty="0" smtClean="0"/>
-              <a:t>learned</a:t>
-            </a:r>
-            <a:r>
-              <a:rPr lang="en-BE" dirty="0" smtClean="0"/>
-              <a:t>, not given</a:t>
-            </a:r>
-          </a:p>
-          <a:p>
-            <a:r>
-              <a:rPr lang="en-BE" dirty="0" smtClean="0"/>
-              <a:t>Low-level features combined into</a:t>
-            </a:r>
-            <a:br>
-              <a:rPr lang="en-BE" dirty="0" smtClean="0"/>
-            </a:br>
-            <a:r>
-              <a:rPr lang="en-BE" dirty="0" smtClean="0"/>
-              <a:t>high-level features</a:t>
-            </a:r>
-          </a:p>
-          <a:p>
-            <a:endParaRPr lang="en-US" dirty="0"/>
-          </a:p>
-        </p:txBody>
-      </p:sp>
-      <p:sp>
-        <p:nvSpPr>
-          <p:cNvPr id="4" name="Slide Number Placeholder 3"/>
-          <p:cNvSpPr>
-            <a:spLocks noGrp="1"/>
-          </p:cNvSpPr>
-          <p:nvPr>
-            <p:ph type="sldNum" sz="quarter" idx="12"/>
-          </p:nvPr>
-        </p:nvSpPr>
-        <p:spPr/>
-        <p:txBody>
-          <a:bodyPr/>
-          <a:lstStyle/>
-          <a:p>
-            <a:fld id="{5A209D72-2E9D-49B0-8977-41DCCC66C0BB}" type="slidenum">
-              <a:rPr lang="nl-BE" smtClean="0"/>
-              <a:t>19</a:t>
-            </a:fld>
-            <a:endParaRPr lang="nl-BE"/>
-          </a:p>
-        </p:txBody>
-      </p:sp>
-      <p:pic>
-        <p:nvPicPr>
-          <p:cNvPr id="14338" name="Picture 2" descr="deep residual networks"/>
-          <p:cNvPicPr>
-            <a:picLocks noChangeAspect="1" noChangeArrowheads="1"/>
-          </p:cNvPicPr>
-          <p:nvPr/>
-        </p:nvPicPr>
-        <p:blipFill>
-          <a:blip r:embed="rId2" cstate="print">
-            <a:extLst>
-              <a:ext uri="{28A0092B-C50C-407E-A947-70E740481C1C}">
-                <a14:useLocalDpi xmlns:a14="http://schemas.microsoft.com/office/drawing/2010/main" val="0"/>
-              </a:ext>
-            </a:extLst>
-          </a:blip>
-          <a:srcRect/>
-          <a:stretch>
-            <a:fillRect/>
-          </a:stretch>
-        </p:blipFill>
-        <p:spPr bwMode="auto">
-          <a:xfrm>
-            <a:off x="6579881" y="2480486"/>
-            <a:ext cx="5612119" cy="3221503"/>
-          </a:xfrm>
-          <a:prstGeom prst="rect">
-            <a:avLst/>
-          </a:prstGeom>
-          <a:noFill/>
-          <a:extLst>
-            <a:ext uri="{909E8E84-426E-40DD-AFC4-6F175D3DCCD1}">
-              <a14:hiddenFill xmlns:a14="http://schemas.microsoft.com/office/drawing/2010/main">
-                <a:solidFill>
-                  <a:srgbClr val="FFFFFF"/>
-                </a:solidFill>
-              </a14:hiddenFill>
-            </a:ext>
-          </a:extLst>
-        </p:spPr>
-      </p:pic>
-    </p:spTree>
-    <p:extLst>
-      <p:ext uri="{BB962C8B-B14F-4D97-AF65-F5344CB8AC3E}">
-        <p14:creationId xmlns:p14="http://schemas.microsoft.com/office/powerpoint/2010/main" val="105296069"/>
-      </p:ext>
-    </p:extLst>
-  </p:cSld>
-  <p:clrMapOvr>
-    <a:masterClrMapping/>
-  </p:clrMapOvr>
-  <p:timing>
-    <p:tnLst>
-      <p:par>
-        <p:cTn id="1" dur="indefinite" restart="never" nodeType="tmRoot"/>
-      </p:par>
-    </p:tnLst>
-  </p:timing>
-</p:sld>
-</file>
-
 <file path=ppt/slides/slide2.xml><?xml version="1.0" encoding="utf-8"?>
 <p:sld xmlns:a="http://schemas.openxmlformats.org/drawingml/2006/main" xmlns:r="http://schemas.openxmlformats.org/officeDocument/2006/relationships" xmlns:p="http://schemas.openxmlformats.org/presentationml/2006/main">
   <p:cSld>
@@ -12435,8 +12821,8 @@
           <a:lstStyle/>
           <a:p>
             <a:r>
-              <a:rPr lang="en-US" dirty="0" smtClean="0"/>
-              <a:t>Introduction</a:t>
+              <a:rPr lang="en-BE" dirty="0" smtClean="0"/>
+              <a:t>Material</a:t>
             </a:r>
             <a:endParaRPr lang="en-US" dirty="0"/>
           </a:p>
@@ -12454,90 +12840,34 @@
         </p:nvSpPr>
         <p:spPr/>
         <p:txBody>
-          <a:bodyPr>
-            <a:normAutofit/>
-          </a:bodyPr>
+          <a:bodyPr/>
           <a:lstStyle/>
           <a:p>
             <a:r>
-              <a:rPr lang="en-US" dirty="0" smtClean="0"/>
-              <a:t>Machine learning is making great strides</a:t>
+              <a:rPr lang="en-BE" dirty="0" smtClean="0"/>
+              <a:t>All material available on GitHub</a:t>
             </a:r>
           </a:p>
           <a:p>
             <a:pPr lvl="1"/>
             <a:r>
-              <a:rPr lang="en-US" dirty="0" smtClean="0"/>
-              <a:t>Large, good data </a:t>
-            </a:r>
-            <a:r>
-              <a:rPr lang="en-US" dirty="0" smtClean="0"/>
-              <a:t>sets</a:t>
+              <a:rPr lang="en-BE" dirty="0" smtClean="0"/>
+              <a:t>this presentation</a:t>
             </a:r>
           </a:p>
           <a:p>
             <a:pPr lvl="1"/>
             <a:r>
-              <a:rPr lang="en-US" dirty="0" smtClean="0"/>
-              <a:t>Compute power</a:t>
-            </a:r>
-            <a:endParaRPr lang="en-US" dirty="0" smtClean="0"/>
+              <a:rPr lang="en-BE" dirty="0" smtClean="0"/>
+              <a:t>conda environments</a:t>
+            </a:r>
           </a:p>
           <a:p>
             <a:pPr lvl="1"/>
             <a:r>
-              <a:rPr lang="en-US" dirty="0" smtClean="0"/>
-              <a:t>Progress in algorithms</a:t>
-            </a:r>
-          </a:p>
-          <a:p>
-            <a:r>
-              <a:rPr lang="en-US" dirty="0" smtClean="0"/>
-              <a:t>Many </a:t>
-            </a:r>
-            <a:r>
-              <a:rPr lang="en-US" dirty="0" smtClean="0"/>
-              <a:t>interesting applications</a:t>
-            </a:r>
-          </a:p>
-          <a:p>
-            <a:pPr lvl="1"/>
-            <a:r>
-              <a:rPr lang="en-US" dirty="0" err="1" smtClean="0"/>
-              <a:t>commericial</a:t>
-            </a:r>
-            <a:endParaRPr lang="en-US" dirty="0" smtClean="0"/>
-          </a:p>
-          <a:p>
-            <a:pPr lvl="1"/>
-            <a:r>
-              <a:rPr lang="en-US" dirty="0" smtClean="0"/>
-              <a:t>scientific</a:t>
-            </a:r>
-          </a:p>
-          <a:p>
-            <a:r>
-              <a:rPr lang="en-US" dirty="0" smtClean="0"/>
-              <a:t>Links with artificial intelligence</a:t>
-            </a:r>
-          </a:p>
-          <a:p>
-            <a:pPr lvl="1"/>
-            <a:r>
-              <a:rPr lang="en-US" dirty="0" smtClean="0"/>
-              <a:t>However, AI </a:t>
-            </a:r>
-            <a:r>
-              <a:rPr lang="en-US" dirty="0" smtClean="0">
-                <a:sym typeface="Symbol" panose="05050102010706020507" pitchFamily="18" charset="2"/>
-              </a:rPr>
-              <a:t></a:t>
-            </a:r>
-            <a:r>
-              <a:rPr lang="en-US" dirty="0" smtClean="0"/>
-              <a:t> machine learning</a:t>
-            </a:r>
-            <a:endParaRPr lang="en-US" dirty="0" smtClean="0"/>
+              <a:rPr lang="en-BE" dirty="0" smtClean="0"/>
+              <a:t>Jupyter notebooks</a:t>
+            </a:r>
           </a:p>
         </p:txBody>
       </p:sp>
@@ -12564,16 +12894,79 @@
           </a:p>
         </p:txBody>
       </p:sp>
+      <p:sp>
+        <p:nvSpPr>
+          <p:cNvPr id="5" name="TextBox 4"/>
+          <p:cNvSpPr txBox="1"/>
+          <p:nvPr/>
+        </p:nvSpPr>
+        <p:spPr>
+          <a:xfrm>
+            <a:off x="2393705" y="4001294"/>
+            <a:ext cx="7404591" cy="1754326"/>
+          </a:xfrm>
+          <a:prstGeom prst="rect">
+            <a:avLst/>
+          </a:prstGeom>
+          <a:noFill/>
+        </p:spPr>
+        <p:txBody>
+          <a:bodyPr wrap="none" rtlCol="0">
+            <a:spAutoFit/>
+          </a:bodyPr>
+          <a:lstStyle/>
+          <a:p>
+            <a:pPr algn="ctr"/>
+            <a:r>
+              <a:rPr lang="en-US" sz="3600" dirty="0">
+                <a:hlinkClick r:id="rId2"/>
+              </a:rPr>
+              <a:t>https://github.com/gjbex/PRACE_ML</a:t>
+            </a:r>
+            <a:r>
+              <a:rPr lang="en-BE" sz="3600" dirty="0"/>
+              <a:t/>
+            </a:r>
+            <a:br>
+              <a:rPr lang="en-BE" sz="3600" dirty="0"/>
+            </a:br>
+            <a:r>
+              <a:rPr lang="en-BE" sz="3600" dirty="0"/>
+              <a:t>or</a:t>
+            </a:r>
+            <a:br>
+              <a:rPr lang="en-BE" sz="3600" dirty="0"/>
+            </a:br>
+            <a:r>
+              <a:rPr lang="en-BE" sz="3600" dirty="0">
+                <a:hlinkClick r:id="rId3"/>
+              </a:rPr>
+              <a:t>https://</a:t>
+            </a:r>
+            <a:r>
+              <a:rPr lang="en-US" sz="3600" dirty="0">
+                <a:hlinkClick r:id="rId3"/>
+              </a:rPr>
+              <a:t>bit.ly/prace2019_ml</a:t>
+            </a:r>
+            <a:r>
+              <a:rPr lang="en-BE" sz="3600" dirty="0"/>
+              <a:t> </a:t>
+            </a:r>
+            <a:endParaRPr lang="en-US" sz="3600" dirty="0"/>
+          </a:p>
+        </p:txBody>
+      </p:sp>
       <p:pic>
         <p:nvPicPr>
-          <p:cNvPr id="3074" name="Picture 2" descr="Image result for artificial intelligence"/>
+          <p:cNvPr id="1030" name="Picture 6" descr="GitHub Logomark"/>
           <p:cNvPicPr>
             <a:picLocks noChangeAspect="1" noChangeArrowheads="1"/>
           </p:cNvPicPr>
           <p:nvPr/>
         </p:nvPicPr>
         <p:blipFill>
-          <a:blip r:embed="rId2">
+          <a:blip r:embed="rId4" cstate="print">
             <a:extLst>
               <a:ext uri="{28A0092B-C50C-407E-A947-70E740481C1C}">
                 <a14:useLocalDpi xmlns:a14="http://schemas.microsoft.com/office/drawing/2010/main" val="0"/>
@@ -12587,8 +12980,8 @@
         </p:blipFill>
         <p:spPr bwMode="auto">
           <a:xfrm>
-            <a:off x="6669246" y="2597524"/>
-            <a:ext cx="4591779" cy="2638953"/>
+            <a:off x="7916091" y="1364799"/>
+            <a:ext cx="2215152" cy="2215152"/>
           </a:xfrm>
           <a:prstGeom prst="rect">
             <a:avLst/>
@@ -12608,382 +13001,13 @@
     </p:spTree>
     <p:extLst>
       <p:ext uri="{BB962C8B-B14F-4D97-AF65-F5344CB8AC3E}">
-        <p14:creationId xmlns:p14="http://schemas.microsoft.com/office/powerpoint/2010/main" val="2819944991"/>
+        <p14:creationId xmlns:p14="http://schemas.microsoft.com/office/powerpoint/2010/main" val="2028728043"/>
       </p:ext>
     </p:extLst>
   </p:cSld>
   <p:clrMapOvr>
     <a:masterClrMapping/>
   </p:clrMapOvr>
-  <p:timing>
-    <p:tnLst>
-      <p:par>
-        <p:cTn id="1" dur="indefinite" restart="never" nodeType="tmRoot">
-          <p:childTnLst>
-            <p:seq concurrent="1" nextAc="seek">
-              <p:cTn id="2" dur="indefinite" nodeType="mainSeq">
-                <p:childTnLst>
-                  <p:par>
-                    <p:cTn id="3" fill="hold">
-                      <p:stCondLst>
-                        <p:cond delay="indefinite"/>
-                        <p:cond evt="onBegin" delay="0">
-                          <p:tn val="2"/>
-                        </p:cond>
-                      </p:stCondLst>
-                      <p:childTnLst>
-                        <p:par>
-                          <p:cTn id="4" fill="hold">
-                            <p:stCondLst>
-                              <p:cond delay="0"/>
-                            </p:stCondLst>
-                            <p:childTnLst>
-                              <p:par>
-                                <p:cTn id="5" presetID="1" presetClass="entr" presetSubtype="0" fill="hold" grpId="0" nodeType="withEffect">
-                                  <p:stCondLst>
-                                    <p:cond delay="0"/>
-                                  </p:stCondLst>
-                                  <p:childTnLst>
-                                    <p:set>
-                                      <p:cBhvr>
-                                        <p:cTn id="6" dur="1" fill="hold">
-                                          <p:stCondLst>
-                                            <p:cond delay="0"/>
-                                          </p:stCondLst>
-                                        </p:cTn>
-                                        <p:tgtEl>
-                                          <p:spTgt spid="3">
-                                            <p:txEl>
-                                              <p:pRg st="0" end="0"/>
-                                            </p:txEl>
-                                          </p:spTgt>
-                                        </p:tgtEl>
-                                        <p:attrNameLst>
-                                          <p:attrName>style.visibility</p:attrName>
-                                        </p:attrNameLst>
-                                      </p:cBhvr>
-                                      <p:to>
-                                        <p:strVal val="visible"/>
-                                      </p:to>
-                                    </p:set>
-                                  </p:childTnLst>
-                                </p:cTn>
-                              </p:par>
-                              <p:par>
-                                <p:cTn id="7" presetID="1" presetClass="entr" presetSubtype="0" fill="hold" grpId="0" nodeType="withEffect">
-                                  <p:stCondLst>
-                                    <p:cond delay="0"/>
-                                  </p:stCondLst>
-                                  <p:childTnLst>
-                                    <p:set>
-                                      <p:cBhvr>
-                                        <p:cTn id="8" dur="1" fill="hold">
-                                          <p:stCondLst>
-                                            <p:cond delay="0"/>
-                                          </p:stCondLst>
-                                        </p:cTn>
-                                        <p:tgtEl>
-                                          <p:spTgt spid="3">
-                                            <p:txEl>
-                                              <p:pRg st="1" end="1"/>
-                                            </p:txEl>
-                                          </p:spTgt>
-                                        </p:tgtEl>
-                                        <p:attrNameLst>
-                                          <p:attrName>style.visibility</p:attrName>
-                                        </p:attrNameLst>
-                                      </p:cBhvr>
-                                      <p:to>
-                                        <p:strVal val="visible"/>
-                                      </p:to>
-                                    </p:set>
-                                  </p:childTnLst>
-                                </p:cTn>
-                              </p:par>
-                              <p:par>
-                                <p:cTn id="9" presetID="1" presetClass="entr" presetSubtype="0" fill="hold" grpId="0" nodeType="withEffect">
-                                  <p:stCondLst>
-                                    <p:cond delay="0"/>
-                                  </p:stCondLst>
-                                  <p:childTnLst>
-                                    <p:set>
-                                      <p:cBhvr>
-                                        <p:cTn id="10" dur="1" fill="hold">
-                                          <p:stCondLst>
-                                            <p:cond delay="0"/>
-                                          </p:stCondLst>
-                                        </p:cTn>
-                                        <p:tgtEl>
-                                          <p:spTgt spid="3">
-                                            <p:txEl>
-                                              <p:pRg st="2" end="2"/>
-                                            </p:txEl>
-                                          </p:spTgt>
-                                        </p:tgtEl>
-                                        <p:attrNameLst>
-                                          <p:attrName>style.visibility</p:attrName>
-                                        </p:attrNameLst>
-                                      </p:cBhvr>
-                                      <p:to>
-                                        <p:strVal val="visible"/>
-                                      </p:to>
-                                    </p:set>
-                                  </p:childTnLst>
-                                </p:cTn>
-                              </p:par>
-                              <p:par>
-                                <p:cTn id="11" presetID="1" presetClass="entr" presetSubtype="0" fill="hold" grpId="0" nodeType="withEffect">
-                                  <p:stCondLst>
-                                    <p:cond delay="0"/>
-                                  </p:stCondLst>
-                                  <p:childTnLst>
-                                    <p:set>
-                                      <p:cBhvr>
-                                        <p:cTn id="12" dur="1" fill="hold">
-                                          <p:stCondLst>
-                                            <p:cond delay="0"/>
-                                          </p:stCondLst>
-                                        </p:cTn>
-                                        <p:tgtEl>
-                                          <p:spTgt spid="3">
-                                            <p:txEl>
-                                              <p:pRg st="3" end="3"/>
-                                            </p:txEl>
-                                          </p:spTgt>
-                                        </p:tgtEl>
-                                        <p:attrNameLst>
-                                          <p:attrName>style.visibility</p:attrName>
-                                        </p:attrNameLst>
-                                      </p:cBhvr>
-                                      <p:to>
-                                        <p:strVal val="visible"/>
-                                      </p:to>
-                                    </p:set>
-                                  </p:childTnLst>
-                                </p:cTn>
-                              </p:par>
-                            </p:childTnLst>
-                          </p:cTn>
-                        </p:par>
-                      </p:childTnLst>
-                    </p:cTn>
-                  </p:par>
-                  <p:par>
-                    <p:cTn id="13" fill="hold">
-                      <p:stCondLst>
-                        <p:cond delay="indefinite"/>
-                      </p:stCondLst>
-                      <p:childTnLst>
-                        <p:par>
-                          <p:cTn id="14" fill="hold">
-                            <p:stCondLst>
-                              <p:cond delay="0"/>
-                            </p:stCondLst>
-                            <p:childTnLst>
-                              <p:par>
-                                <p:cTn id="15" presetID="1" presetClass="entr" presetSubtype="0" fill="hold" grpId="0" nodeType="clickEffect">
-                                  <p:stCondLst>
-                                    <p:cond delay="0"/>
-                                  </p:stCondLst>
-                                  <p:childTnLst>
-                                    <p:set>
-                                      <p:cBhvr>
-                                        <p:cTn id="16" dur="1" fill="hold">
-                                          <p:stCondLst>
-                                            <p:cond delay="0"/>
-                                          </p:stCondLst>
-                                        </p:cTn>
-                                        <p:tgtEl>
-                                          <p:spTgt spid="3">
-                                            <p:txEl>
-                                              <p:pRg st="4" end="4"/>
-                                            </p:txEl>
-                                          </p:spTgt>
-                                        </p:tgtEl>
-                                        <p:attrNameLst>
-                                          <p:attrName>style.visibility</p:attrName>
-                                        </p:attrNameLst>
-                                      </p:cBhvr>
-                                      <p:to>
-                                        <p:strVal val="visible"/>
-                                      </p:to>
-                                    </p:set>
-                                  </p:childTnLst>
-                                </p:cTn>
-                              </p:par>
-                              <p:par>
-                                <p:cTn id="17" presetID="1" presetClass="entr" presetSubtype="0" fill="hold" grpId="0" nodeType="withEffect">
-                                  <p:stCondLst>
-                                    <p:cond delay="0"/>
-                                  </p:stCondLst>
-                                  <p:childTnLst>
-                                    <p:set>
-                                      <p:cBhvr>
-                                        <p:cTn id="18" dur="1" fill="hold">
-                                          <p:stCondLst>
-                                            <p:cond delay="0"/>
-                                          </p:stCondLst>
-                                        </p:cTn>
-                                        <p:tgtEl>
-                                          <p:spTgt spid="3">
-                                            <p:txEl>
-                                              <p:pRg st="5" end="5"/>
-                                            </p:txEl>
-                                          </p:spTgt>
-                                        </p:tgtEl>
-                                        <p:attrNameLst>
-                                          <p:attrName>style.visibility</p:attrName>
-                                        </p:attrNameLst>
-                                      </p:cBhvr>
-                                      <p:to>
-                                        <p:strVal val="visible"/>
-                                      </p:to>
-                                    </p:set>
-                                  </p:childTnLst>
-                                </p:cTn>
-                              </p:par>
-                              <p:par>
-                                <p:cTn id="19" presetID="1" presetClass="entr" presetSubtype="0" fill="hold" grpId="0" nodeType="withEffect">
-                                  <p:stCondLst>
-                                    <p:cond delay="0"/>
-                                  </p:stCondLst>
-                                  <p:childTnLst>
-                                    <p:set>
-                                      <p:cBhvr>
-                                        <p:cTn id="20" dur="1" fill="hold">
-                                          <p:stCondLst>
-                                            <p:cond delay="0"/>
-                                          </p:stCondLst>
-                                        </p:cTn>
-                                        <p:tgtEl>
-                                          <p:spTgt spid="3">
-                                            <p:txEl>
-                                              <p:pRg st="6" end="6"/>
-                                            </p:txEl>
-                                          </p:spTgt>
-                                        </p:tgtEl>
-                                        <p:attrNameLst>
-                                          <p:attrName>style.visibility</p:attrName>
-                                        </p:attrNameLst>
-                                      </p:cBhvr>
-                                      <p:to>
-                                        <p:strVal val="visible"/>
-                                      </p:to>
-                                    </p:set>
-                                  </p:childTnLst>
-                                </p:cTn>
-                              </p:par>
-                            </p:childTnLst>
-                          </p:cTn>
-                        </p:par>
-                      </p:childTnLst>
-                    </p:cTn>
-                  </p:par>
-                  <p:par>
-                    <p:cTn id="21" fill="hold">
-                      <p:stCondLst>
-                        <p:cond delay="indefinite"/>
-                      </p:stCondLst>
-                      <p:childTnLst>
-                        <p:par>
-                          <p:cTn id="22" fill="hold">
-                            <p:stCondLst>
-                              <p:cond delay="0"/>
-                            </p:stCondLst>
-                            <p:childTnLst>
-                              <p:par>
-                                <p:cTn id="23" presetID="1" presetClass="entr" presetSubtype="0" fill="hold" grpId="0" nodeType="clickEffect">
-                                  <p:stCondLst>
-                                    <p:cond delay="0"/>
-                                  </p:stCondLst>
-                                  <p:childTnLst>
-                                    <p:set>
-                                      <p:cBhvr>
-                                        <p:cTn id="24" dur="1" fill="hold">
-                                          <p:stCondLst>
-                                            <p:cond delay="0"/>
-                                          </p:stCondLst>
-                                        </p:cTn>
-                                        <p:tgtEl>
-                                          <p:spTgt spid="3">
-                                            <p:txEl>
-                                              <p:pRg st="7" end="7"/>
-                                            </p:txEl>
-                                          </p:spTgt>
-                                        </p:tgtEl>
-                                        <p:attrNameLst>
-                                          <p:attrName>style.visibility</p:attrName>
-                                        </p:attrNameLst>
-                                      </p:cBhvr>
-                                      <p:to>
-                                        <p:strVal val="visible"/>
-                                      </p:to>
-                                    </p:set>
-                                  </p:childTnLst>
-                                </p:cTn>
-                              </p:par>
-                              <p:par>
-                                <p:cTn id="25" presetID="1" presetClass="entr" presetSubtype="0" fill="hold" grpId="0" nodeType="withEffect">
-                                  <p:stCondLst>
-                                    <p:cond delay="0"/>
-                                  </p:stCondLst>
-                                  <p:childTnLst>
-                                    <p:set>
-                                      <p:cBhvr>
-                                        <p:cTn id="26" dur="1" fill="hold">
-                                          <p:stCondLst>
-                                            <p:cond delay="0"/>
-                                          </p:stCondLst>
-                                        </p:cTn>
-                                        <p:tgtEl>
-                                          <p:spTgt spid="3">
-                                            <p:txEl>
-                                              <p:pRg st="8" end="8"/>
-                                            </p:txEl>
-                                          </p:spTgt>
-                                        </p:tgtEl>
-                                        <p:attrNameLst>
-                                          <p:attrName>style.visibility</p:attrName>
-                                        </p:attrNameLst>
-                                      </p:cBhvr>
-                                      <p:to>
-                                        <p:strVal val="visible"/>
-                                      </p:to>
-                                    </p:set>
-                                  </p:childTnLst>
-                                </p:cTn>
-                              </p:par>
-                            </p:childTnLst>
-                          </p:cTn>
-                        </p:par>
-                      </p:childTnLst>
-                    </p:cTn>
-                  </p:par>
-                </p:childTnLst>
-              </p:cTn>
-              <p:prevCondLst>
-                <p:cond evt="onPrev" delay="0">
-                  <p:tgtEl>
-                    <p:sldTgt/>
-                  </p:tgtEl>
-                </p:cond>
-              </p:prevCondLst>
-              <p:nextCondLst>
-                <p:cond evt="onNext" delay="0">
-                  <p:tgtEl>
-                    <p:sldTgt/>
-                  </p:tgtEl>
-                </p:cond>
-              </p:nextCondLst>
-            </p:seq>
-          </p:childTnLst>
-        </p:cTn>
-      </p:par>
-    </p:tnLst>
-    <p:bldLst>
-      <p:bldP spid="3" grpId="0" uiExpand="1" build="p"/>
-    </p:bldLst>
-  </p:timing>
 </p:sld>
 </file>
 
@@ -13247,25 +13271,9 @@
             <a:pPr lvl="1"/>
             <a:r>
               <a:rPr lang="en-BE" dirty="0" smtClean="0"/>
-              <a:t>28 </a:t>
-            </a:r>
-            <a:r>
-              <a:rPr lang="en-BE" dirty="0" smtClean="0">
-                <a:sym typeface="Symbol" panose="05050102010706020507" pitchFamily="18" charset="2"/>
-              </a:rPr>
-              <a:t></a:t>
-            </a:r>
-            <a:r>
-              <a:rPr lang="en-BE" dirty="0" smtClean="0"/>
-              <a:t> 28 pixel images</a:t>
-            </a:r>
-          </a:p>
-          <a:p>
-            <a:pPr lvl="1"/>
-            <a:r>
-              <a:rPr lang="en-BE" dirty="0" smtClean="0"/>
-              <a:t>grayscale: integer 0, 1, ..., 255</a:t>
-            </a:r>
+              <a:t>grayscale image</a:t>
+            </a:r>
+            <a:endParaRPr lang="en-BE" dirty="0" smtClean="0"/>
           </a:p>
           <a:p>
             <a:r>
@@ -13277,19 +13285,35 @@
             <a:pPr lvl="1"/>
             <a:r>
               <a:rPr lang="en-BE" dirty="0" smtClean="0"/>
-              <a:t>integer 0, 1, ..., 9</a:t>
-            </a:r>
-          </a:p>
-          <a:p>
+              <a:t>digit </a:t>
+            </a:r>
             <a:r>
               <a:rPr lang="en-BE" dirty="0" smtClean="0"/>
-              <a:t>60,000 training examples</a:t>
-            </a:r>
-          </a:p>
-          <a:p>
+              <a:t>0, 1, ..., 9</a:t>
+            </a:r>
+          </a:p>
+          <a:p>
+            <a:r>
+              <a:rPr lang="en-BE" dirty="0"/>
+              <a:t>T</a:t>
+            </a:r>
             <a:r>
               <a:rPr lang="en-BE" dirty="0" smtClean="0"/>
-              <a:t>10,000 test examples</a:t>
+              <a:t>raining </a:t>
+            </a:r>
+            <a:r>
+              <a:rPr lang="en-BE" dirty="0" smtClean="0"/>
+              <a:t>examples</a:t>
+            </a:r>
+          </a:p>
+          <a:p>
+            <a:r>
+              <a:rPr lang="en-BE" dirty="0" smtClean="0"/>
+              <a:t>Test </a:t>
+            </a:r>
+            <a:r>
+              <a:rPr lang="en-BE" dirty="0" smtClean="0"/>
+              <a:t>examples</a:t>
             </a:r>
           </a:p>
           <a:p>
@@ -13344,6 +13368,57 @@
           </a:prstGeom>
         </p:spPr>
       </p:pic>
+      <p:sp>
+        <p:nvSpPr>
+          <p:cNvPr id="6" name="TextBox 5"/>
+          <p:cNvSpPr txBox="1"/>
+          <p:nvPr/>
+        </p:nvSpPr>
+        <p:spPr>
+          <a:xfrm>
+            <a:off x="1158240" y="5408023"/>
+            <a:ext cx="5604419" cy="369332"/>
+          </a:xfrm>
+          <a:prstGeom prst="rect">
+            <a:avLst/>
+          </a:prstGeom>
+        </p:spPr>
+        <p:style>
+          <a:lnRef idx="1">
+            <a:schemeClr val="accent2"/>
+          </a:lnRef>
+          <a:fillRef idx="2">
+            <a:schemeClr val="accent2"/>
+          </a:fillRef>
+          <a:effectRef idx="1">
+            <a:schemeClr val="accent2"/>
+          </a:effectRef>
+          <a:fontRef idx="minor">
+            <a:schemeClr val="dk1"/>
+          </a:fontRef>
+        </p:style>
+        <p:txBody>
+          <a:bodyPr wrap="none" rtlCol="0">
+            <a:spAutoFit/>
+          </a:bodyPr>
+          <a:lstStyle/>
+          <a:p>
+            <a:r>
+              <a:rPr lang="en-BE" dirty="0" smtClean="0"/>
+              <a:t>Explore the data: </a:t>
+            </a:r>
+            <a:r>
+              <a:rPr lang="en-BE" dirty="0" smtClean="0">
+                <a:latin typeface="Inconsolata" panose="00000509000000000000" pitchFamily="49" charset="0"/>
+              </a:rPr>
+              <a:t>020_mnist_data_exploration.ipynb</a:t>
+            </a:r>
+            <a:endParaRPr lang="en-US" dirty="0">
+              <a:latin typeface="Inconsolata" panose="00000509000000000000" pitchFamily="49" charset="0"/>
+            </a:endParaRPr>
+          </a:p>
+        </p:txBody>
+      </p:sp>
     </p:spTree>
     <p:extLst>
       <p:ext uri="{BB962C8B-B14F-4D97-AF65-F5344CB8AC3E}">
@@ -13406,25 +13481,6 @@
       </p:sp>
       <p:sp>
         <p:nvSpPr>
-          <p:cNvPr id="3" name="Content Placeholder 2"/>
-          <p:cNvSpPr>
-            <a:spLocks noGrp="1"/>
-          </p:cNvSpPr>
-          <p:nvPr>
-            <p:ph idx="1"/>
-          </p:nvPr>
-        </p:nvSpPr>
-        <p:spPr/>
-        <p:txBody>
-          <a:bodyPr/>
-          <a:lstStyle/>
-          <a:p>
-            <a:endParaRPr lang="en-US"/>
-          </a:p>
-        </p:txBody>
-      </p:sp>
-      <p:sp>
-        <p:nvSpPr>
           <p:cNvPr id="4" name="Text Placeholder 3"/>
           <p:cNvSpPr>
             <a:spLocks noGrp="1"/>
@@ -13433,16 +13489,141 @@
             <p:ph type="body" sz="half" idx="2"/>
           </p:nvPr>
         </p:nvSpPr>
-        <p:spPr/>
+        <p:spPr>
+          <a:xfrm>
+            <a:off x="839788" y="2057400"/>
+            <a:ext cx="4406915" cy="3811588"/>
+          </a:xfrm>
+        </p:spPr>
         <p:txBody>
-          <a:bodyPr/>
+          <a:bodyPr>
+            <a:noAutofit/>
+          </a:bodyPr>
           <a:lstStyle/>
           <a:p>
-            <a:r>
-              <a:rPr lang="en-BE" dirty="0" smtClean="0"/>
-              <a:t>Multilayer neural network</a:t>
-            </a:r>
-            <a:endParaRPr lang="en-US" dirty="0"/>
+            <a:pPr marL="285750" indent="-285750">
+              <a:buFont typeface="Arial" panose="020B0604020202020204" pitchFamily="34" charset="0"/>
+              <a:buChar char="•"/>
+            </a:pPr>
+            <a:r>
+              <a:rPr lang="en-BE" sz="2000" dirty="0" smtClean="0"/>
+              <a:t>Data preprocessing</a:t>
+            </a:r>
+          </a:p>
+          <a:p>
+            <a:pPr marL="742950" lvl="1" indent="-285750">
+              <a:buFont typeface="Arial" panose="020B0604020202020204" pitchFamily="34" charset="0"/>
+              <a:buChar char="•"/>
+            </a:pPr>
+            <a:r>
+              <a:rPr lang="en-BE" sz="1800" dirty="0" smtClean="0"/>
+              <a:t>Input data as 1D array</a:t>
+            </a:r>
+          </a:p>
+          <a:p>
+            <a:pPr marL="742950" lvl="1" indent="-285750">
+              <a:buFont typeface="Arial" panose="020B0604020202020204" pitchFamily="34" charset="0"/>
+              <a:buChar char="•"/>
+            </a:pPr>
+            <a:r>
+              <a:rPr lang="en-BE" sz="1800" dirty="0" smtClean="0"/>
+              <a:t>output data as array with</a:t>
+            </a:r>
+            <a:br>
+              <a:rPr lang="en-BE" sz="1800" dirty="0" smtClean="0"/>
+            </a:br>
+            <a:r>
+              <a:rPr lang="en-BE" sz="1800" dirty="0" smtClean="0"/>
+              <a:t>one-hot encoding</a:t>
+            </a:r>
+          </a:p>
+          <a:p>
+            <a:pPr marL="742950" lvl="1" indent="-285750">
+              <a:buFont typeface="Arial" panose="020B0604020202020204" pitchFamily="34" charset="0"/>
+              <a:buChar char="•"/>
+            </a:pPr>
+            <a:endParaRPr lang="en-BE" sz="1800" dirty="0"/>
+          </a:p>
+          <a:p>
+            <a:pPr marL="285750" indent="-285750">
+              <a:buFont typeface="Arial" panose="020B0604020202020204" pitchFamily="34" charset="0"/>
+              <a:buChar char="•"/>
+            </a:pPr>
+            <a:r>
+              <a:rPr lang="en-BE" sz="2000" dirty="0" smtClean="0"/>
+              <a:t>Model: multilayer perceptron</a:t>
+            </a:r>
+          </a:p>
+          <a:p>
+            <a:pPr marL="742950" lvl="1" indent="-285750">
+              <a:buFont typeface="Arial" panose="020B0604020202020204" pitchFamily="34" charset="0"/>
+              <a:buChar char="•"/>
+            </a:pPr>
+            <a:r>
+              <a:rPr lang="en-BE" sz="1800" dirty="0" smtClean="0"/>
+              <a:t>758 inputs</a:t>
+            </a:r>
+          </a:p>
+          <a:p>
+            <a:pPr marL="742950" lvl="1" indent="-285750">
+              <a:buFont typeface="Arial" panose="020B0604020202020204" pitchFamily="34" charset="0"/>
+              <a:buChar char="•"/>
+            </a:pPr>
+            <a:r>
+              <a:rPr lang="en-BE" sz="1800" dirty="0" smtClean="0"/>
+              <a:t>dense hidden layer with 512 units</a:t>
+            </a:r>
+          </a:p>
+          <a:p>
+            <a:pPr marL="742950" lvl="1" indent="-285750">
+              <a:buFont typeface="Arial" panose="020B0604020202020204" pitchFamily="34" charset="0"/>
+              <a:buChar char="•"/>
+            </a:pPr>
+            <a:r>
+              <a:rPr lang="en-BE" sz="1800" dirty="0" smtClean="0"/>
+              <a:t>ReLU activation function</a:t>
+            </a:r>
+          </a:p>
+          <a:p>
+            <a:pPr marL="742950" lvl="1" indent="-285750">
+              <a:buFont typeface="Arial" panose="020B0604020202020204" pitchFamily="34" charset="0"/>
+              <a:buChar char="•"/>
+            </a:pPr>
+            <a:r>
+              <a:rPr lang="en-BE" sz="1800" dirty="0" smtClean="0"/>
+              <a:t>dense layer with 512 units</a:t>
+            </a:r>
+          </a:p>
+          <a:p>
+            <a:pPr marL="742950" lvl="1" indent="-285750">
+              <a:buFont typeface="Arial" panose="020B0604020202020204" pitchFamily="34" charset="0"/>
+              <a:buChar char="•"/>
+            </a:pPr>
+            <a:r>
+              <a:rPr lang="en-BE" sz="1800" dirty="0" smtClean="0"/>
+              <a:t>ReLU activation function</a:t>
+            </a:r>
+          </a:p>
+          <a:p>
+            <a:pPr marL="742950" lvl="1" indent="-285750">
+              <a:buFont typeface="Arial" panose="020B0604020202020204" pitchFamily="34" charset="0"/>
+              <a:buChar char="•"/>
+            </a:pPr>
+            <a:r>
+              <a:rPr lang="en-BE" sz="1800" dirty="0" smtClean="0"/>
+              <a:t>dense layer with 10 units</a:t>
+            </a:r>
+          </a:p>
+          <a:p>
+            <a:pPr marL="742950" lvl="1" indent="-285750">
+              <a:buFont typeface="Arial" panose="020B0604020202020204" pitchFamily="34" charset="0"/>
+              <a:buChar char="•"/>
+            </a:pPr>
+            <a:r>
+              <a:rPr lang="en-BE" sz="1800" dirty="0" smtClean="0"/>
+              <a:t>SoftMax activation function</a:t>
+            </a:r>
+            <a:endParaRPr lang="en-US" sz="1800" dirty="0"/>
           </a:p>
         </p:txBody>
       </p:sp>
@@ -13466,6 +13647,478 @@
               <a:t>22</a:t>
             </a:fld>
             <a:endParaRPr lang="en-US"/>
+          </a:p>
+        </p:txBody>
+      </p:sp>
+      <p:pic>
+        <p:nvPicPr>
+          <p:cNvPr id="6" name="Picture 2" descr="Image result for mnist dataset"/>
+          <p:cNvPicPr>
+            <a:picLocks noChangeAspect="1" noChangeArrowheads="1"/>
+          </p:cNvPicPr>
+          <p:nvPr/>
+        </p:nvPicPr>
+        <p:blipFill rotWithShape="1">
+          <a:blip r:embed="rId2">
+            <a:extLst>
+              <a:ext uri="{28A0092B-C50C-407E-A947-70E740481C1C}">
+                <a14:useLocalDpi xmlns:a14="http://schemas.microsoft.com/office/drawing/2010/main" val="0"/>
+              </a:ext>
+            </a:extLst>
+          </a:blip>
+          <a:srcRect l="4475" t="4111" r="3330" b="4774"/>
+          <a:stretch/>
+        </p:blipFill>
+        <p:spPr bwMode="auto">
+          <a:xfrm>
+            <a:off x="7475958" y="181242"/>
+            <a:ext cx="1055788" cy="1043397"/>
+          </a:xfrm>
+          <a:prstGeom prst="rect">
+            <a:avLst/>
+          </a:prstGeom>
+          <a:noFill/>
+          <a:extLst>
+            <a:ext uri="{909E8E84-426E-40DD-AFC4-6F175D3DCCD1}">
+              <a14:hiddenFill xmlns:a14="http://schemas.microsoft.com/office/drawing/2010/main">
+                <a:solidFill>
+                  <a:srgbClr val="FFFFFF"/>
+                </a:solidFill>
+              </a14:hiddenFill>
+            </a:ext>
+          </a:extLst>
+        </p:spPr>
+      </p:pic>
+      <p:grpSp>
+        <p:nvGrpSpPr>
+          <p:cNvPr id="9" name="Group 8"/>
+          <p:cNvGrpSpPr/>
+          <p:nvPr/>
+        </p:nvGrpSpPr>
+        <p:grpSpPr>
+          <a:xfrm>
+            <a:off x="4275909" y="1341113"/>
+            <a:ext cx="7686720" cy="1318567"/>
+            <a:chOff x="4275909" y="3762102"/>
+            <a:chExt cx="7686720" cy="1318567"/>
+          </a:xfrm>
+        </p:grpSpPr>
+        <p:sp>
+          <p:nvSpPr>
+            <p:cNvPr id="7" name="TextBox 6"/>
+            <p:cNvSpPr txBox="1"/>
+            <p:nvPr/>
+          </p:nvSpPr>
+          <p:spPr>
+            <a:xfrm>
+              <a:off x="4275909" y="4711337"/>
+              <a:ext cx="7686720" cy="369332"/>
+            </a:xfrm>
+            <a:prstGeom prst="rect">
+              <a:avLst/>
+            </a:prstGeom>
+            <a:noFill/>
+          </p:spPr>
+          <p:txBody>
+            <a:bodyPr wrap="none" rtlCol="0">
+              <a:spAutoFit/>
+            </a:bodyPr>
+            <a:lstStyle/>
+            <a:p>
+              <a:r>
+                <a:rPr lang="en-GB" dirty="0">
+                  <a:latin typeface="Inconsolata" panose="00000509000000000000" pitchFamily="49" charset="0"/>
+                </a:rPr>
+                <a:t>array([ </a:t>
+              </a:r>
+              <a:r>
+                <a:rPr lang="en-BE" dirty="0" smtClean="0">
+                  <a:latin typeface="Inconsolata" panose="00000509000000000000" pitchFamily="49" charset="0"/>
+                </a:rPr>
+                <a:t>0.</a:t>
+              </a:r>
+              <a:r>
+                <a:rPr lang="en-GB" dirty="0" smtClean="0">
+                  <a:latin typeface="Inconsolata" panose="00000509000000000000" pitchFamily="49" charset="0"/>
+                </a:rPr>
+                <a:t>0</a:t>
+              </a:r>
+              <a:r>
+                <a:rPr lang="en-GB" dirty="0">
+                  <a:latin typeface="Inconsolata" panose="00000509000000000000" pitchFamily="49" charset="0"/>
+                </a:rPr>
+                <a:t>, </a:t>
+              </a:r>
+              <a:r>
+                <a:rPr lang="en-BE" dirty="0" smtClean="0">
+                  <a:latin typeface="Inconsolata" panose="00000509000000000000" pitchFamily="49" charset="0"/>
+                </a:rPr>
+                <a:t>0.</a:t>
+              </a:r>
+              <a:r>
+                <a:rPr lang="en-GB" dirty="0" smtClean="0">
+                  <a:latin typeface="Inconsolata" panose="00000509000000000000" pitchFamily="49" charset="0"/>
+                </a:rPr>
+                <a:t>0,</a:t>
+              </a:r>
+              <a:r>
+                <a:rPr lang="en-BE" dirty="0" smtClean="0">
+                  <a:latin typeface="Inconsolata" panose="00000509000000000000" pitchFamily="49" charset="0"/>
+                </a:rPr>
+                <a:t>...</a:t>
+              </a:r>
+              <a:r>
+                <a:rPr lang="en-GB" dirty="0" smtClean="0">
+                  <a:latin typeface="Inconsolata" panose="00000509000000000000" pitchFamily="49" charset="0"/>
+                </a:rPr>
+                <a:t>, </a:t>
+              </a:r>
+              <a:r>
+                <a:rPr lang="en-BE" dirty="0" smtClean="0">
+                  <a:latin typeface="Inconsolata" panose="00000509000000000000" pitchFamily="49" charset="0"/>
+                </a:rPr>
+                <a:t>0.951</a:t>
+              </a:r>
+              <a:r>
+                <a:rPr lang="en-GB" dirty="0" smtClean="0">
+                  <a:latin typeface="Inconsolata" panose="00000509000000000000" pitchFamily="49" charset="0"/>
+                </a:rPr>
+                <a:t>, </a:t>
+              </a:r>
+              <a:r>
+                <a:rPr lang="en-BE" dirty="0" smtClean="0">
+                  <a:latin typeface="Inconsolata" panose="00000509000000000000" pitchFamily="49" charset="0"/>
+                </a:rPr>
+                <a:t>0.533</a:t>
+              </a:r>
+              <a:r>
+                <a:rPr lang="nl-NL" dirty="0" smtClean="0">
+                  <a:latin typeface="Inconsolata" panose="00000509000000000000" pitchFamily="49" charset="0"/>
+                </a:rPr>
+                <a:t>,</a:t>
+              </a:r>
+              <a:r>
+                <a:rPr lang="en-BE" dirty="0" smtClean="0">
+                  <a:latin typeface="Inconsolata" panose="00000509000000000000" pitchFamily="49" charset="0"/>
+                </a:rPr>
+                <a:t>...,</a:t>
+              </a:r>
+              <a:r>
+                <a:rPr lang="nl-NL" dirty="0" smtClean="0">
+                  <a:latin typeface="Inconsolata" panose="00000509000000000000" pitchFamily="49" charset="0"/>
+                </a:rPr>
+                <a:t> </a:t>
+              </a:r>
+              <a:r>
+                <a:rPr lang="en-BE" dirty="0" smtClean="0">
+                  <a:latin typeface="Inconsolata" panose="00000509000000000000" pitchFamily="49" charset="0"/>
+                </a:rPr>
+                <a:t>0.</a:t>
+              </a:r>
+              <a:r>
+                <a:rPr lang="nl-NL" dirty="0" smtClean="0">
+                  <a:latin typeface="Inconsolata" panose="00000509000000000000" pitchFamily="49" charset="0"/>
+                </a:rPr>
+                <a:t>0</a:t>
+              </a:r>
+              <a:r>
+                <a:rPr lang="nl-NL" dirty="0">
+                  <a:latin typeface="Inconsolata" panose="00000509000000000000" pitchFamily="49" charset="0"/>
+                </a:rPr>
+                <a:t>, </a:t>
+              </a:r>
+              <a:r>
+                <a:rPr lang="en-BE" dirty="0" smtClean="0">
+                  <a:latin typeface="Inconsolata" panose="00000509000000000000" pitchFamily="49" charset="0"/>
+                </a:rPr>
+                <a:t>0.</a:t>
+              </a:r>
+              <a:r>
+                <a:rPr lang="nl-NL" dirty="0" smtClean="0">
+                  <a:latin typeface="Inconsolata" panose="00000509000000000000" pitchFamily="49" charset="0"/>
+                </a:rPr>
+                <a:t>0</a:t>
+              </a:r>
+              <a:r>
+                <a:rPr lang="nl-NL" dirty="0">
+                  <a:latin typeface="Inconsolata" panose="00000509000000000000" pitchFamily="49" charset="0"/>
+                </a:rPr>
+                <a:t>], </a:t>
+              </a:r>
+              <a:r>
+                <a:rPr lang="nl-NL" dirty="0" smtClean="0">
+                  <a:latin typeface="Inconsolata" panose="00000509000000000000" pitchFamily="49" charset="0"/>
+                </a:rPr>
+                <a:t>dtype=</a:t>
+              </a:r>
+              <a:r>
+                <a:rPr lang="en-BE" dirty="0" smtClean="0">
+                  <a:latin typeface="Inconsolata" panose="00000509000000000000" pitchFamily="49" charset="0"/>
+                </a:rPr>
+                <a:t>float32</a:t>
+              </a:r>
+              <a:r>
+                <a:rPr lang="nl-NL" dirty="0" smtClean="0">
+                  <a:latin typeface="Inconsolata" panose="00000509000000000000" pitchFamily="49" charset="0"/>
+                </a:rPr>
+                <a:t>)</a:t>
+              </a:r>
+              <a:endParaRPr lang="en-US" dirty="0">
+                <a:latin typeface="Inconsolata" panose="00000509000000000000" pitchFamily="49" charset="0"/>
+              </a:endParaRPr>
+            </a:p>
+          </p:txBody>
+        </p:sp>
+        <p:sp>
+          <p:nvSpPr>
+            <p:cNvPr id="8" name="Down Arrow 7"/>
+            <p:cNvSpPr/>
+            <p:nvPr/>
+          </p:nvSpPr>
+          <p:spPr>
+            <a:xfrm>
+              <a:off x="7725178" y="3762102"/>
+              <a:ext cx="557349" cy="870858"/>
+            </a:xfrm>
+            <a:prstGeom prst="downArrow">
+              <a:avLst/>
+            </a:prstGeom>
+          </p:spPr>
+          <p:style>
+            <a:lnRef idx="2">
+              <a:schemeClr val="accent1">
+                <a:shade val="50000"/>
+              </a:schemeClr>
+            </a:lnRef>
+            <a:fillRef idx="1">
+              <a:schemeClr val="accent1"/>
+            </a:fillRef>
+            <a:effectRef idx="0">
+              <a:schemeClr val="accent1"/>
+            </a:effectRef>
+            <a:fontRef idx="minor">
+              <a:schemeClr val="lt1"/>
+            </a:fontRef>
+          </p:style>
+          <p:txBody>
+            <a:bodyPr rtlCol="0" anchor="ctr"/>
+            <a:lstStyle/>
+            <a:p>
+              <a:pPr algn="ctr"/>
+              <a:endParaRPr lang="en-US"/>
+            </a:p>
+          </p:txBody>
+        </p:sp>
+      </p:grpSp>
+      <p:sp>
+        <p:nvSpPr>
+          <p:cNvPr id="10" name="TextBox 9"/>
+          <p:cNvSpPr txBox="1"/>
+          <p:nvPr/>
+        </p:nvSpPr>
+        <p:spPr>
+          <a:xfrm>
+            <a:off x="8610940" y="2671377"/>
+            <a:ext cx="330540" cy="461665"/>
+          </a:xfrm>
+          <a:prstGeom prst="rect">
+            <a:avLst/>
+          </a:prstGeom>
+          <a:noFill/>
+        </p:spPr>
+        <p:txBody>
+          <a:bodyPr wrap="none" rtlCol="0">
+            <a:spAutoFit/>
+          </a:bodyPr>
+          <a:lstStyle/>
+          <a:p>
+            <a:r>
+              <a:rPr lang="en-BE" sz="2400" dirty="0" smtClean="0"/>
+              <a:t>5</a:t>
+            </a:r>
+            <a:endParaRPr lang="en-US" sz="2400" dirty="0"/>
+          </a:p>
+        </p:txBody>
+      </p:sp>
+      <p:grpSp>
+        <p:nvGrpSpPr>
+          <p:cNvPr id="13" name="Group 12"/>
+          <p:cNvGrpSpPr/>
+          <p:nvPr/>
+        </p:nvGrpSpPr>
+        <p:grpSpPr>
+          <a:xfrm>
+            <a:off x="5709687" y="3199712"/>
+            <a:ext cx="6186309" cy="1295504"/>
+            <a:chOff x="4910695" y="3963194"/>
+            <a:chExt cx="6186309" cy="1295504"/>
+          </a:xfrm>
+        </p:grpSpPr>
+        <p:sp>
+          <p:nvSpPr>
+            <p:cNvPr id="11" name="TextBox 10"/>
+            <p:cNvSpPr txBox="1"/>
+            <p:nvPr/>
+          </p:nvSpPr>
+          <p:spPr>
+            <a:xfrm>
+              <a:off x="4910695" y="4889366"/>
+              <a:ext cx="6186309" cy="369332"/>
+            </a:xfrm>
+            <a:prstGeom prst="rect">
+              <a:avLst/>
+            </a:prstGeom>
+            <a:noFill/>
+          </p:spPr>
+          <p:txBody>
+            <a:bodyPr wrap="none" rtlCol="0">
+              <a:spAutoFit/>
+            </a:bodyPr>
+            <a:lstStyle/>
+            <a:p>
+              <a:r>
+                <a:rPr lang="en-GB" dirty="0">
+                  <a:latin typeface="Inconsolata" panose="00000509000000000000" pitchFamily="49" charset="0"/>
+                </a:rPr>
+                <a:t>array([ </a:t>
+              </a:r>
+              <a:r>
+                <a:rPr lang="en-GB" dirty="0" smtClean="0">
+                  <a:latin typeface="Inconsolata" panose="00000509000000000000" pitchFamily="49" charset="0"/>
+                </a:rPr>
+                <a:t>0</a:t>
+              </a:r>
+              <a:r>
+                <a:rPr lang="en-GB" dirty="0">
+                  <a:latin typeface="Inconsolata" panose="00000509000000000000" pitchFamily="49" charset="0"/>
+                </a:rPr>
+                <a:t>, </a:t>
+              </a:r>
+              <a:r>
+                <a:rPr lang="en-GB" dirty="0" smtClean="0">
+                  <a:latin typeface="Inconsolata" panose="00000509000000000000" pitchFamily="49" charset="0"/>
+                </a:rPr>
+                <a:t>0</a:t>
+              </a:r>
+              <a:r>
+                <a:rPr lang="en-GB" dirty="0">
+                  <a:latin typeface="Inconsolata" panose="00000509000000000000" pitchFamily="49" charset="0"/>
+                </a:rPr>
+                <a:t>, </a:t>
+              </a:r>
+              <a:r>
+                <a:rPr lang="en-BE" dirty="0" smtClean="0">
+                  <a:latin typeface="Inconsolata" panose="00000509000000000000" pitchFamily="49" charset="0"/>
+                </a:rPr>
+                <a:t>0, 0, 0, 1, 0, 0, 0, 0</a:t>
+              </a:r>
+              <a:r>
+                <a:rPr lang="nl-NL" dirty="0" smtClean="0">
+                  <a:latin typeface="Inconsolata" panose="00000509000000000000" pitchFamily="49" charset="0"/>
+                </a:rPr>
+                <a:t>], </a:t>
+              </a:r>
+              <a:r>
+                <a:rPr lang="nl-NL" dirty="0">
+                  <a:latin typeface="Inconsolata" panose="00000509000000000000" pitchFamily="49" charset="0"/>
+                </a:rPr>
+                <a:t>dtype=uint8)</a:t>
+              </a:r>
+              <a:endParaRPr lang="en-US" dirty="0">
+                <a:latin typeface="Inconsolata" panose="00000509000000000000" pitchFamily="49" charset="0"/>
+              </a:endParaRPr>
+            </a:p>
+          </p:txBody>
+        </p:sp>
+        <p:sp>
+          <p:nvSpPr>
+            <p:cNvPr id="12" name="Down Arrow 11"/>
+            <p:cNvSpPr/>
+            <p:nvPr/>
+          </p:nvSpPr>
+          <p:spPr>
+            <a:xfrm>
+              <a:off x="7725176" y="3963194"/>
+              <a:ext cx="557349" cy="870858"/>
+            </a:xfrm>
+            <a:prstGeom prst="downArrow">
+              <a:avLst/>
+            </a:prstGeom>
+          </p:spPr>
+          <p:style>
+            <a:lnRef idx="2">
+              <a:schemeClr val="accent1">
+                <a:shade val="50000"/>
+              </a:schemeClr>
+            </a:lnRef>
+            <a:fillRef idx="1">
+              <a:schemeClr val="accent1"/>
+            </a:fillRef>
+            <a:effectRef idx="0">
+              <a:schemeClr val="accent1"/>
+            </a:effectRef>
+            <a:fontRef idx="minor">
+              <a:schemeClr val="lt1"/>
+            </a:fontRef>
+          </p:style>
+          <p:txBody>
+            <a:bodyPr rtlCol="0" anchor="ctr"/>
+            <a:lstStyle/>
+            <a:p>
+              <a:pPr algn="ctr"/>
+              <a:endParaRPr lang="en-US"/>
+            </a:p>
+          </p:txBody>
+        </p:sp>
+      </p:grpSp>
+      <p:sp>
+        <p:nvSpPr>
+          <p:cNvPr id="14" name="TextBox 13"/>
+          <p:cNvSpPr txBox="1"/>
+          <p:nvPr/>
+        </p:nvSpPr>
+        <p:spPr>
+          <a:xfrm>
+            <a:off x="5347063" y="4885782"/>
+            <a:ext cx="5742278" cy="369332"/>
+          </a:xfrm>
+          <a:prstGeom prst="rect">
+            <a:avLst/>
+          </a:prstGeom>
+        </p:spPr>
+        <p:style>
+          <a:lnRef idx="1">
+            <a:schemeClr val="accent2"/>
+          </a:lnRef>
+          <a:fillRef idx="2">
+            <a:schemeClr val="accent2"/>
+          </a:fillRef>
+          <a:effectRef idx="1">
+            <a:schemeClr val="accent2"/>
+          </a:effectRef>
+          <a:fontRef idx="minor">
+            <a:schemeClr val="dk1"/>
+          </a:fontRef>
+        </p:style>
+        <p:txBody>
+          <a:bodyPr wrap="none" rtlCol="0">
+            <a:spAutoFit/>
+          </a:bodyPr>
+          <a:lstStyle/>
+          <a:p>
+            <a:r>
+              <a:rPr lang="en-BE" dirty="0" smtClean="0"/>
+              <a:t>Activation functions: </a:t>
+            </a:r>
+            <a:r>
+              <a:rPr lang="en-BE" dirty="0" smtClean="0">
+                <a:latin typeface="Inconsolata" panose="00000509000000000000" pitchFamily="49" charset="0"/>
+              </a:rPr>
+              <a:t>030_activation_functions.ipynb</a:t>
+            </a:r>
+            <a:endParaRPr lang="en-US" dirty="0">
+              <a:latin typeface="Inconsolata" panose="00000509000000000000" pitchFamily="49" charset="0"/>
+            </a:endParaRPr>
           </a:p>
         </p:txBody>
       </p:sp>
@@ -13523,8 +14176,95 @@
           <a:p>
             <a:r>
               <a:rPr lang="en-BE" dirty="0" smtClean="0"/>
-              <a:t>Convolutional neural networks</a:t>
-            </a:r>
+              <a:t>Deep neural networks</a:t>
+            </a:r>
+            <a:endParaRPr lang="en-US" dirty="0"/>
+          </a:p>
+        </p:txBody>
+      </p:sp>
+      <p:sp>
+        <p:nvSpPr>
+          <p:cNvPr id="3" name="Content Placeholder 2"/>
+          <p:cNvSpPr>
+            <a:spLocks noGrp="1"/>
+          </p:cNvSpPr>
+          <p:nvPr>
+            <p:ph idx="1"/>
+          </p:nvPr>
+        </p:nvSpPr>
+        <p:spPr/>
+        <p:txBody>
+          <a:bodyPr/>
+          <a:lstStyle/>
+          <a:p>
+            <a:r>
+              <a:rPr lang="en-BE" dirty="0" smtClean="0"/>
+              <a:t>Many layers</a:t>
+            </a:r>
+          </a:p>
+          <a:p>
+            <a:r>
+              <a:rPr lang="en-BE" dirty="0" smtClean="0"/>
+              <a:t>Features are </a:t>
+            </a:r>
+            <a:r>
+              <a:rPr lang="en-BE" i="1" dirty="0" smtClean="0"/>
+              <a:t>learned</a:t>
+            </a:r>
+            <a:r>
+              <a:rPr lang="en-BE" dirty="0" smtClean="0"/>
+              <a:t>, not given</a:t>
+            </a:r>
+          </a:p>
+          <a:p>
+            <a:r>
+              <a:rPr lang="en-BE" dirty="0" smtClean="0"/>
+              <a:t>Low-level features combined into</a:t>
+            </a:r>
+            <a:br>
+              <a:rPr lang="en-BE" dirty="0" smtClean="0"/>
+            </a:br>
+            <a:r>
+              <a:rPr lang="en-BE" dirty="0" smtClean="0"/>
+              <a:t>high-level </a:t>
+            </a:r>
+            <a:r>
+              <a:rPr lang="en-BE" dirty="0" smtClean="0"/>
+              <a:t>features</a:t>
+            </a:r>
+          </a:p>
+          <a:p>
+            <a:endParaRPr lang="en-BE" dirty="0"/>
+          </a:p>
+          <a:p>
+            <a:r>
+              <a:rPr lang="en-BE" dirty="0" smtClean="0"/>
+              <a:t>Special types of layers</a:t>
+            </a:r>
+          </a:p>
+          <a:p>
+            <a:pPr lvl="1"/>
+            <a:r>
+              <a:rPr lang="en-BE" dirty="0" smtClean="0"/>
+              <a:t>convolutional</a:t>
+            </a:r>
+          </a:p>
+          <a:p>
+            <a:pPr lvl="1"/>
+            <a:r>
+              <a:rPr lang="en-BE" dirty="0" smtClean="0"/>
+              <a:t>drop-out</a:t>
+            </a:r>
+          </a:p>
+          <a:p>
+            <a:pPr lvl="1"/>
+            <a:r>
+              <a:rPr lang="en-BE" dirty="0" smtClean="0"/>
+              <a:t>...</a:t>
+            </a:r>
+            <a:endParaRPr lang="en-BE" dirty="0" smtClean="0"/>
+          </a:p>
+          <a:p>
             <a:endParaRPr lang="en-US" dirty="0"/>
           </a:p>
         </p:txBody>
@@ -13547,6 +14287,130 @@
             <a:fld id="{5A209D72-2E9D-49B0-8977-41DCCC66C0BB}" type="slidenum">
               <a:rPr lang="nl-BE" smtClean="0"/>
               <a:t>23</a:t>
+            </a:fld>
+            <a:endParaRPr lang="nl-BE"/>
+          </a:p>
+        </p:txBody>
+      </p:sp>
+      <p:pic>
+        <p:nvPicPr>
+          <p:cNvPr id="14338" name="Picture 2" descr="deep residual networks"/>
+          <p:cNvPicPr>
+            <a:picLocks noChangeAspect="1" noChangeArrowheads="1"/>
+          </p:cNvPicPr>
+          <p:nvPr/>
+        </p:nvPicPr>
+        <p:blipFill>
+          <a:blip r:embed="rId2" cstate="print">
+            <a:extLst>
+              <a:ext uri="{28A0092B-C50C-407E-A947-70E740481C1C}">
+                <a14:useLocalDpi xmlns:a14="http://schemas.microsoft.com/office/drawing/2010/main" val="0"/>
+              </a:ext>
+            </a:extLst>
+          </a:blip>
+          <a:srcRect/>
+          <a:stretch>
+            <a:fillRect/>
+          </a:stretch>
+        </p:blipFill>
+        <p:spPr bwMode="auto">
+          <a:xfrm>
+            <a:off x="6579881" y="2480486"/>
+            <a:ext cx="5612119" cy="3221503"/>
+          </a:xfrm>
+          <a:prstGeom prst="rect">
+            <a:avLst/>
+          </a:prstGeom>
+          <a:noFill/>
+          <a:extLst>
+            <a:ext uri="{909E8E84-426E-40DD-AFC4-6F175D3DCCD1}">
+              <a14:hiddenFill xmlns:a14="http://schemas.microsoft.com/office/drawing/2010/main">
+                <a:solidFill>
+                  <a:srgbClr val="FFFFFF"/>
+                </a:solidFill>
+              </a14:hiddenFill>
+            </a:ext>
+          </a:extLst>
+        </p:spPr>
+      </p:pic>
+    </p:spTree>
+    <p:extLst>
+      <p:ext uri="{BB962C8B-B14F-4D97-AF65-F5344CB8AC3E}">
+        <p14:creationId xmlns:p14="http://schemas.microsoft.com/office/powerpoint/2010/main" val="105296069"/>
+      </p:ext>
+    </p:extLst>
+  </p:cSld>
+  <p:clrMapOvr>
+    <a:masterClrMapping/>
+  </p:clrMapOvr>
+  <p:timing>
+    <p:tnLst>
+      <p:par>
+        <p:cTn id="1" dur="indefinite" restart="never" nodeType="tmRoot"/>
+      </p:par>
+    </p:tnLst>
+  </p:timing>
+</p:sld>
+</file>
+
+<file path=ppt/slides/slide24.xml><?xml version="1.0" encoding="utf-8"?>
+<p:sld xmlns:a="http://schemas.openxmlformats.org/drawingml/2006/main" xmlns:r="http://schemas.openxmlformats.org/officeDocument/2006/relationships" xmlns:p="http://schemas.openxmlformats.org/presentationml/2006/main">
+  <p:cSld>
+    <p:spTree>
+      <p:nvGrpSpPr>
+        <p:cNvPr id="1" name=""/>
+        <p:cNvGrpSpPr/>
+        <p:nvPr/>
+      </p:nvGrpSpPr>
+      <p:grpSpPr>
+        <a:xfrm>
+          <a:off x="0" y="0"/>
+          <a:ext cx="0" cy="0"/>
+          <a:chOff x="0" y="0"/>
+          <a:chExt cx="0" cy="0"/>
+        </a:xfrm>
+      </p:grpSpPr>
+      <p:sp>
+        <p:nvSpPr>
+          <p:cNvPr id="2" name="Title 1"/>
+          <p:cNvSpPr>
+            <a:spLocks noGrp="1"/>
+          </p:cNvSpPr>
+          <p:nvPr>
+            <p:ph type="title"/>
+          </p:nvPr>
+        </p:nvSpPr>
+        <p:spPr/>
+        <p:txBody>
+          <a:bodyPr/>
+          <a:lstStyle/>
+          <a:p>
+            <a:r>
+              <a:rPr lang="en-BE" dirty="0" smtClean="0"/>
+              <a:t>Convolutional neural networks</a:t>
+            </a:r>
+            <a:endParaRPr lang="en-US" dirty="0"/>
+          </a:p>
+        </p:txBody>
+      </p:sp>
+      <p:sp>
+        <p:nvSpPr>
+          <p:cNvPr id="4" name="Slide Number Placeholder 3"/>
+          <p:cNvSpPr>
+            <a:spLocks noGrp="1"/>
+          </p:cNvSpPr>
+          <p:nvPr>
+            <p:ph type="sldNum" sz="quarter" idx="12"/>
+          </p:nvPr>
+        </p:nvSpPr>
+        <p:spPr/>
+        <p:txBody>
+          <a:bodyPr/>
+          <a:lstStyle/>
+          <a:p>
+            <a:fld id="{5A209D72-2E9D-49B0-8977-41DCCC66C0BB}" type="slidenum">
+              <a:rPr lang="nl-BE" smtClean="0"/>
+              <a:t>24</a:t>
             </a:fld>
             <a:endParaRPr lang="nl-BE"/>
           </a:p>
@@ -13591,8 +14455,8 @@
           </a:extLst>
         </p:spPr>
       </p:pic>
-      <mc:AlternateContent xmlns:mc="http://schemas.openxmlformats.org/markup-compatibility/2006">
-        <mc:Choice xmlns:a14="http://schemas.microsoft.com/office/drawing/2010/main" Requires="a14">
+      <mc:AlternateContent xmlns:mc="http://schemas.openxmlformats.org/markup-compatibility/2006" xmlns:a14="http://schemas.microsoft.com/office/drawing/2010/main">
+        <mc:Choice Requires="a14">
           <p:sp>
             <p:nvSpPr>
               <p:cNvPr id="6" name="TextBox 5"/>
@@ -13615,6 +14479,7 @@
               </a:bodyPr>
               <a:lstStyle/>
               <a:p>
+                <a:pPr/>
                 <a14:m>
                   <m:oMathPara xmlns:m="http://schemas.openxmlformats.org/officeDocument/2006/math">
                     <m:oMathParaPr>
@@ -13740,7 +14605,7 @@
             </p:txBody>
           </p:sp>
         </mc:Choice>
-        <mc:Fallback>
+        <mc:Fallback xmlns="">
           <p:sp>
             <p:nvSpPr>
               <p:cNvPr id="6" name="TextBox 5"/>
@@ -14039,7 +14904,7 @@
 </p:sld>
 </file>
 
-<file path=ppt/slides/slide24.xml><?xml version="1.0" encoding="utf-8"?>
+<file path=ppt/slides/slide25.xml><?xml version="1.0" encoding="utf-8"?>
 <p:sld xmlns:a="http://schemas.openxmlformats.org/drawingml/2006/main" xmlns:r="http://schemas.openxmlformats.org/officeDocument/2006/relationships" xmlns:p="http://schemas.openxmlformats.org/presentationml/2006/main">
   <p:cSld>
     <p:spTree>
@@ -14096,7 +14961,7 @@
           <a:p>
             <a:fld id="{A2912448-FEEC-49E8-9588-2DF1F90D57C2}" type="slidenum">
               <a:rPr lang="en-US" smtClean="0"/>
-              <a:t>24</a:t>
+              <a:t>25</a:t>
             </a:fld>
             <a:endParaRPr lang="en-US"/>
           </a:p>
@@ -14155,8 +15020,8 @@
             </a:extLst>
           </p:spPr>
         </p:pic>
-        <mc:AlternateContent xmlns:mc="http://schemas.openxmlformats.org/markup-compatibility/2006">
-          <mc:Choice xmlns:a14="http://schemas.microsoft.com/office/drawing/2010/main" Requires="a14">
+        <mc:AlternateContent xmlns:mc="http://schemas.openxmlformats.org/markup-compatibility/2006" xmlns:a14="http://schemas.microsoft.com/office/drawing/2010/main">
+          <mc:Choice Requires="a14">
             <p:sp>
               <p:nvSpPr>
                 <p:cNvPr id="6" name="TextBox 5"/>
@@ -14179,6 +15044,7 @@
                 </a:bodyPr>
                 <a:lstStyle/>
                 <a:p>
+                  <a:pPr/>
                   <a14:m>
                     <m:oMathPara xmlns:m="http://schemas.openxmlformats.org/officeDocument/2006/math">
                       <m:oMathParaPr>
@@ -14304,7 +15170,7 @@
               </p:txBody>
             </p:sp>
           </mc:Choice>
-          <mc:Fallback>
+          <mc:Fallback xmlns="">
             <p:sp>
               <p:nvSpPr>
                 <p:cNvPr id="6" name="TextBox 5"/>
@@ -14461,8 +15327,8 @@
             </a:extLst>
           </p:spPr>
         </p:pic>
-        <mc:AlternateContent xmlns:mc="http://schemas.openxmlformats.org/markup-compatibility/2006">
-          <mc:Choice xmlns:a14="http://schemas.microsoft.com/office/drawing/2010/main" Requires="a14">
+        <mc:AlternateContent xmlns:mc="http://schemas.openxmlformats.org/markup-compatibility/2006" xmlns:a14="http://schemas.microsoft.com/office/drawing/2010/main">
+          <mc:Choice Requires="a14">
             <p:sp>
               <p:nvSpPr>
                 <p:cNvPr id="16" name="TextBox 15"/>
@@ -14485,6 +15351,7 @@
                 </a:bodyPr>
                 <a:lstStyle/>
                 <a:p>
+                  <a:pPr/>
                   <a14:m>
                     <m:oMathPara xmlns:m="http://schemas.openxmlformats.org/officeDocument/2006/math">
                       <m:oMathParaPr>
@@ -14610,7 +15477,7 @@
               </p:txBody>
             </p:sp>
           </mc:Choice>
-          <mc:Fallback>
+          <mc:Fallback xmlns="">
             <p:sp>
               <p:nvSpPr>
                 <p:cNvPr id="16" name="TextBox 15"/>
@@ -14906,8 +15773,8 @@
                 <a:chExt cx="1384663" cy="1301936"/>
               </a:xfrm>
             </p:grpSpPr>
-            <mc:AlternateContent xmlns:mc="http://schemas.openxmlformats.org/markup-compatibility/2006">
-              <mc:Choice xmlns:a14="http://schemas.microsoft.com/office/drawing/2010/main" Requires="a14">
+            <mc:AlternateContent xmlns:mc="http://schemas.openxmlformats.org/markup-compatibility/2006" xmlns:a14="http://schemas.microsoft.com/office/drawing/2010/main">
+              <mc:Choice Requires="a14">
                 <p:sp>
                   <p:nvSpPr>
                     <p:cNvPr id="27" name="TextBox 26"/>
@@ -14930,6 +15797,7 @@
                     </a:bodyPr>
                     <a:lstStyle/>
                     <a:p>
+                      <a:pPr/>
                       <a14:m>
                         <m:oMathPara xmlns:m="http://schemas.openxmlformats.org/officeDocument/2006/math">
                           <m:oMathParaPr>
@@ -15055,7 +15923,7 @@
                   </p:txBody>
                 </p:sp>
               </mc:Choice>
-              <mc:Fallback>
+              <mc:Fallback xmlns="">
                 <p:sp>
                   <p:nvSpPr>
                     <p:cNvPr id="27" name="TextBox 26"/>
@@ -15199,8 +16067,8 @@
             <a:chExt cx="5461385" cy="1972918"/>
           </a:xfrm>
         </p:grpSpPr>
-        <mc:AlternateContent xmlns:mc="http://schemas.openxmlformats.org/markup-compatibility/2006">
-          <mc:Choice xmlns:a14="http://schemas.microsoft.com/office/drawing/2010/main" Requires="a14">
+        <mc:AlternateContent xmlns:mc="http://schemas.openxmlformats.org/markup-compatibility/2006" xmlns:a14="http://schemas.microsoft.com/office/drawing/2010/main">
+          <mc:Choice Requires="a14">
             <p:sp>
               <p:nvSpPr>
                 <p:cNvPr id="48" name="TextBox 47"/>
@@ -15223,6 +16091,7 @@
                 </a:bodyPr>
                 <a:lstStyle/>
                 <a:p>
+                  <a:pPr/>
                   <a14:m>
                     <m:oMathPara xmlns:m="http://schemas.openxmlformats.org/officeDocument/2006/math">
                       <m:oMathParaPr>
@@ -15348,7 +16217,7 @@
               </p:txBody>
             </p:sp>
           </mc:Choice>
-          <mc:Fallback>
+          <mc:Fallback xmlns="">
             <p:sp>
               <p:nvSpPr>
                 <p:cNvPr id="48" name="TextBox 47"/>
@@ -16156,7 +17025,7 @@
           <a:p>
             <a:r>
               <a:rPr lang="en-US" dirty="0" smtClean="0"/>
-              <a:t>Machine learning tasks</a:t>
+              <a:t>Introduction</a:t>
             </a:r>
             <a:endParaRPr lang="en-US" dirty="0"/>
           </a:p>
@@ -16181,61 +17050,72 @@
           <a:p>
             <a:r>
               <a:rPr lang="en-US" dirty="0" smtClean="0"/>
-              <a:t>Supervised learning</a:t>
+              <a:t>Machine learning is making great strides</a:t>
             </a:r>
           </a:p>
           <a:p>
             <a:pPr lvl="1"/>
             <a:r>
               <a:rPr lang="en-US" dirty="0" smtClean="0"/>
-              <a:t>regression: predict numerical values</a:t>
+              <a:t>Large, good data sets</a:t>
             </a:r>
           </a:p>
           <a:p>
             <a:pPr lvl="1"/>
             <a:r>
               <a:rPr lang="en-US" dirty="0" smtClean="0"/>
-              <a:t>classification: predict categorical values, i.e., labels</a:t>
-            </a:r>
-          </a:p>
-          <a:p>
+              <a:t>Compute power</a:t>
+            </a:r>
+          </a:p>
+          <a:p>
+            <a:pPr lvl="1"/>
             <a:r>
               <a:rPr lang="en-US" dirty="0" smtClean="0"/>
-              <a:t>Unsupervised learning</a:t>
+              <a:t>Progress in algorithms</a:t>
+            </a:r>
+          </a:p>
+          <a:p>
+            <a:r>
+              <a:rPr lang="en-US" dirty="0" smtClean="0"/>
+              <a:t>Many interesting applications</a:t>
             </a:r>
           </a:p>
           <a:p>
             <a:pPr lvl="1"/>
             <a:r>
+              <a:rPr lang="en-US" dirty="0" err="1" smtClean="0"/>
+              <a:t>commericial</a:t>
+            </a:r>
+            <a:endParaRPr lang="en-US" dirty="0" smtClean="0"/>
+          </a:p>
+          <a:p>
+            <a:pPr lvl="1"/>
+            <a:r>
               <a:rPr lang="en-US" dirty="0" smtClean="0"/>
-              <a:t>clustering: group data according to "distance"</a:t>
+              <a:t>scientific</a:t>
+            </a:r>
+          </a:p>
+          <a:p>
+            <a:r>
+              <a:rPr lang="en-US" dirty="0" smtClean="0"/>
+              <a:t>Links with artificial intelligence</a:t>
             </a:r>
           </a:p>
           <a:p>
             <a:pPr lvl="1"/>
             <a:r>
               <a:rPr lang="en-US" dirty="0" smtClean="0"/>
-              <a:t>association: find frequent co-occurrences</a:t>
-            </a:r>
-          </a:p>
-          <a:p>
-            <a:pPr lvl="1"/>
+              <a:t>However, AI </a:t>
+            </a:r>
+            <a:r>
+              <a:rPr lang="en-US" dirty="0" smtClean="0">
+                <a:sym typeface="Symbol" panose="05050102010706020507" pitchFamily="18" charset="2"/>
+              </a:rPr>
+              <a:t></a:t>
+            </a:r>
             <a:r>
               <a:rPr lang="en-US" dirty="0" smtClean="0"/>
-              <a:t>link prediction: discover relationships in data</a:t>
-            </a:r>
-          </a:p>
-          <a:p>
-            <a:pPr lvl="1"/>
-            <a:r>
-              <a:rPr lang="en-US" dirty="0" smtClean="0"/>
-              <a:t>data reduction: project features to fewer features</a:t>
-            </a:r>
-          </a:p>
-          <a:p>
-            <a:r>
-              <a:rPr lang="en-US" dirty="0" smtClean="0"/>
-              <a:t>Reinforcement learning</a:t>
+              <a:t> machine learning</a:t>
             </a:r>
           </a:p>
         </p:txBody>
@@ -16258,6 +17138,570 @@
             <a:fld id="{5A209D72-2E9D-49B0-8977-41DCCC66C0BB}" type="slidenum">
               <a:rPr lang="nl-BE" smtClean="0"/>
               <a:t>3</a:t>
+            </a:fld>
+            <a:endParaRPr lang="nl-BE"/>
+          </a:p>
+        </p:txBody>
+      </p:sp>
+      <p:pic>
+        <p:nvPicPr>
+          <p:cNvPr id="3074" name="Picture 2" descr="Image result for artificial intelligence"/>
+          <p:cNvPicPr>
+            <a:picLocks noChangeAspect="1" noChangeArrowheads="1"/>
+          </p:cNvPicPr>
+          <p:nvPr/>
+        </p:nvPicPr>
+        <p:blipFill>
+          <a:blip r:embed="rId2">
+            <a:extLst>
+              <a:ext uri="{28A0092B-C50C-407E-A947-70E740481C1C}">
+                <a14:useLocalDpi xmlns:a14="http://schemas.microsoft.com/office/drawing/2010/main" val="0"/>
+              </a:ext>
+            </a:extLst>
+          </a:blip>
+          <a:srcRect/>
+          <a:stretch>
+            <a:fillRect/>
+          </a:stretch>
+        </p:blipFill>
+        <p:spPr bwMode="auto">
+          <a:xfrm>
+            <a:off x="6669246" y="2597524"/>
+            <a:ext cx="4591779" cy="2638953"/>
+          </a:xfrm>
+          <a:prstGeom prst="rect">
+            <a:avLst/>
+          </a:prstGeom>
+          <a:noFill/>
+          <a:extLst>
+            <a:ext uri="{909E8E84-426E-40DD-AFC4-6F175D3DCCD1}">
+              <a14:hiddenFill xmlns:a14="http://schemas.microsoft.com/office/drawing/2010/main">
+                <a:solidFill>
+                  <a:srgbClr val="FFFFFF"/>
+                </a:solidFill>
+              </a14:hiddenFill>
+            </a:ext>
+          </a:extLst>
+        </p:spPr>
+      </p:pic>
+    </p:spTree>
+    <p:extLst>
+      <p:ext uri="{BB962C8B-B14F-4D97-AF65-F5344CB8AC3E}">
+        <p14:creationId xmlns:p14="http://schemas.microsoft.com/office/powerpoint/2010/main" val="2819944991"/>
+      </p:ext>
+    </p:extLst>
+  </p:cSld>
+  <p:clrMapOvr>
+    <a:masterClrMapping/>
+  </p:clrMapOvr>
+  <p:timing>
+    <p:tnLst>
+      <p:par>
+        <p:cTn id="1" dur="indefinite" restart="never" nodeType="tmRoot">
+          <p:childTnLst>
+            <p:seq concurrent="1" nextAc="seek">
+              <p:cTn id="2" dur="indefinite" nodeType="mainSeq">
+                <p:childTnLst>
+                  <p:par>
+                    <p:cTn id="3" fill="hold">
+                      <p:stCondLst>
+                        <p:cond delay="indefinite"/>
+                        <p:cond evt="onBegin" delay="0">
+                          <p:tn val="2"/>
+                        </p:cond>
+                      </p:stCondLst>
+                      <p:childTnLst>
+                        <p:par>
+                          <p:cTn id="4" fill="hold">
+                            <p:stCondLst>
+                              <p:cond delay="0"/>
+                            </p:stCondLst>
+                            <p:childTnLst>
+                              <p:par>
+                                <p:cTn id="5" presetID="1" presetClass="entr" presetSubtype="0" fill="hold" grpId="0" nodeType="withEffect">
+                                  <p:stCondLst>
+                                    <p:cond delay="0"/>
+                                  </p:stCondLst>
+                                  <p:childTnLst>
+                                    <p:set>
+                                      <p:cBhvr>
+                                        <p:cTn id="6" dur="1" fill="hold">
+                                          <p:stCondLst>
+                                            <p:cond delay="0"/>
+                                          </p:stCondLst>
+                                        </p:cTn>
+                                        <p:tgtEl>
+                                          <p:spTgt spid="3">
+                                            <p:txEl>
+                                              <p:pRg st="0" end="0"/>
+                                            </p:txEl>
+                                          </p:spTgt>
+                                        </p:tgtEl>
+                                        <p:attrNameLst>
+                                          <p:attrName>style.visibility</p:attrName>
+                                        </p:attrNameLst>
+                                      </p:cBhvr>
+                                      <p:to>
+                                        <p:strVal val="visible"/>
+                                      </p:to>
+                                    </p:set>
+                                  </p:childTnLst>
+                                </p:cTn>
+                              </p:par>
+                              <p:par>
+                                <p:cTn id="7" presetID="1" presetClass="entr" presetSubtype="0" fill="hold" grpId="0" nodeType="withEffect">
+                                  <p:stCondLst>
+                                    <p:cond delay="0"/>
+                                  </p:stCondLst>
+                                  <p:childTnLst>
+                                    <p:set>
+                                      <p:cBhvr>
+                                        <p:cTn id="8" dur="1" fill="hold">
+                                          <p:stCondLst>
+                                            <p:cond delay="0"/>
+                                          </p:stCondLst>
+                                        </p:cTn>
+                                        <p:tgtEl>
+                                          <p:spTgt spid="3">
+                                            <p:txEl>
+                                              <p:pRg st="1" end="1"/>
+                                            </p:txEl>
+                                          </p:spTgt>
+                                        </p:tgtEl>
+                                        <p:attrNameLst>
+                                          <p:attrName>style.visibility</p:attrName>
+                                        </p:attrNameLst>
+                                      </p:cBhvr>
+                                      <p:to>
+                                        <p:strVal val="visible"/>
+                                      </p:to>
+                                    </p:set>
+                                  </p:childTnLst>
+                                </p:cTn>
+                              </p:par>
+                              <p:par>
+                                <p:cTn id="9" presetID="1" presetClass="entr" presetSubtype="0" fill="hold" grpId="0" nodeType="withEffect">
+                                  <p:stCondLst>
+                                    <p:cond delay="0"/>
+                                  </p:stCondLst>
+                                  <p:childTnLst>
+                                    <p:set>
+                                      <p:cBhvr>
+                                        <p:cTn id="10" dur="1" fill="hold">
+                                          <p:stCondLst>
+                                            <p:cond delay="0"/>
+                                          </p:stCondLst>
+                                        </p:cTn>
+                                        <p:tgtEl>
+                                          <p:spTgt spid="3">
+                                            <p:txEl>
+                                              <p:pRg st="2" end="2"/>
+                                            </p:txEl>
+                                          </p:spTgt>
+                                        </p:tgtEl>
+                                        <p:attrNameLst>
+                                          <p:attrName>style.visibility</p:attrName>
+                                        </p:attrNameLst>
+                                      </p:cBhvr>
+                                      <p:to>
+                                        <p:strVal val="visible"/>
+                                      </p:to>
+                                    </p:set>
+                                  </p:childTnLst>
+                                </p:cTn>
+                              </p:par>
+                              <p:par>
+                                <p:cTn id="11" presetID="1" presetClass="entr" presetSubtype="0" fill="hold" grpId="0" nodeType="withEffect">
+                                  <p:stCondLst>
+                                    <p:cond delay="0"/>
+                                  </p:stCondLst>
+                                  <p:childTnLst>
+                                    <p:set>
+                                      <p:cBhvr>
+                                        <p:cTn id="12" dur="1" fill="hold">
+                                          <p:stCondLst>
+                                            <p:cond delay="0"/>
+                                          </p:stCondLst>
+                                        </p:cTn>
+                                        <p:tgtEl>
+                                          <p:spTgt spid="3">
+                                            <p:txEl>
+                                              <p:pRg st="3" end="3"/>
+                                            </p:txEl>
+                                          </p:spTgt>
+                                        </p:tgtEl>
+                                        <p:attrNameLst>
+                                          <p:attrName>style.visibility</p:attrName>
+                                        </p:attrNameLst>
+                                      </p:cBhvr>
+                                      <p:to>
+                                        <p:strVal val="visible"/>
+                                      </p:to>
+                                    </p:set>
+                                  </p:childTnLst>
+                                </p:cTn>
+                              </p:par>
+                            </p:childTnLst>
+                          </p:cTn>
+                        </p:par>
+                      </p:childTnLst>
+                    </p:cTn>
+                  </p:par>
+                  <p:par>
+                    <p:cTn id="13" fill="hold">
+                      <p:stCondLst>
+                        <p:cond delay="indefinite"/>
+                      </p:stCondLst>
+                      <p:childTnLst>
+                        <p:par>
+                          <p:cTn id="14" fill="hold">
+                            <p:stCondLst>
+                              <p:cond delay="0"/>
+                            </p:stCondLst>
+                            <p:childTnLst>
+                              <p:par>
+                                <p:cTn id="15" presetID="1" presetClass="entr" presetSubtype="0" fill="hold" grpId="0" nodeType="clickEffect">
+                                  <p:stCondLst>
+                                    <p:cond delay="0"/>
+                                  </p:stCondLst>
+                                  <p:childTnLst>
+                                    <p:set>
+                                      <p:cBhvr>
+                                        <p:cTn id="16" dur="1" fill="hold">
+                                          <p:stCondLst>
+                                            <p:cond delay="0"/>
+                                          </p:stCondLst>
+                                        </p:cTn>
+                                        <p:tgtEl>
+                                          <p:spTgt spid="3">
+                                            <p:txEl>
+                                              <p:pRg st="4" end="4"/>
+                                            </p:txEl>
+                                          </p:spTgt>
+                                        </p:tgtEl>
+                                        <p:attrNameLst>
+                                          <p:attrName>style.visibility</p:attrName>
+                                        </p:attrNameLst>
+                                      </p:cBhvr>
+                                      <p:to>
+                                        <p:strVal val="visible"/>
+                                      </p:to>
+                                    </p:set>
+                                  </p:childTnLst>
+                                </p:cTn>
+                              </p:par>
+                              <p:par>
+                                <p:cTn id="17" presetID="1" presetClass="entr" presetSubtype="0" fill="hold" grpId="0" nodeType="withEffect">
+                                  <p:stCondLst>
+                                    <p:cond delay="0"/>
+                                  </p:stCondLst>
+                                  <p:childTnLst>
+                                    <p:set>
+                                      <p:cBhvr>
+                                        <p:cTn id="18" dur="1" fill="hold">
+                                          <p:stCondLst>
+                                            <p:cond delay="0"/>
+                                          </p:stCondLst>
+                                        </p:cTn>
+                                        <p:tgtEl>
+                                          <p:spTgt spid="3">
+                                            <p:txEl>
+                                              <p:pRg st="5" end="5"/>
+                                            </p:txEl>
+                                          </p:spTgt>
+                                        </p:tgtEl>
+                                        <p:attrNameLst>
+                                          <p:attrName>style.visibility</p:attrName>
+                                        </p:attrNameLst>
+                                      </p:cBhvr>
+                                      <p:to>
+                                        <p:strVal val="visible"/>
+                                      </p:to>
+                                    </p:set>
+                                  </p:childTnLst>
+                                </p:cTn>
+                              </p:par>
+                              <p:par>
+                                <p:cTn id="19" presetID="1" presetClass="entr" presetSubtype="0" fill="hold" grpId="0" nodeType="withEffect">
+                                  <p:stCondLst>
+                                    <p:cond delay="0"/>
+                                  </p:stCondLst>
+                                  <p:childTnLst>
+                                    <p:set>
+                                      <p:cBhvr>
+                                        <p:cTn id="20" dur="1" fill="hold">
+                                          <p:stCondLst>
+                                            <p:cond delay="0"/>
+                                          </p:stCondLst>
+                                        </p:cTn>
+                                        <p:tgtEl>
+                                          <p:spTgt spid="3">
+                                            <p:txEl>
+                                              <p:pRg st="6" end="6"/>
+                                            </p:txEl>
+                                          </p:spTgt>
+                                        </p:tgtEl>
+                                        <p:attrNameLst>
+                                          <p:attrName>style.visibility</p:attrName>
+                                        </p:attrNameLst>
+                                      </p:cBhvr>
+                                      <p:to>
+                                        <p:strVal val="visible"/>
+                                      </p:to>
+                                    </p:set>
+                                  </p:childTnLst>
+                                </p:cTn>
+                              </p:par>
+                            </p:childTnLst>
+                          </p:cTn>
+                        </p:par>
+                      </p:childTnLst>
+                    </p:cTn>
+                  </p:par>
+                  <p:par>
+                    <p:cTn id="21" fill="hold">
+                      <p:stCondLst>
+                        <p:cond delay="indefinite"/>
+                      </p:stCondLst>
+                      <p:childTnLst>
+                        <p:par>
+                          <p:cTn id="22" fill="hold">
+                            <p:stCondLst>
+                              <p:cond delay="0"/>
+                            </p:stCondLst>
+                            <p:childTnLst>
+                              <p:par>
+                                <p:cTn id="23" presetID="1" presetClass="entr" presetSubtype="0" fill="hold" grpId="0" nodeType="clickEffect">
+                                  <p:stCondLst>
+                                    <p:cond delay="0"/>
+                                  </p:stCondLst>
+                                  <p:childTnLst>
+                                    <p:set>
+                                      <p:cBhvr>
+                                        <p:cTn id="24" dur="1" fill="hold">
+                                          <p:stCondLst>
+                                            <p:cond delay="0"/>
+                                          </p:stCondLst>
+                                        </p:cTn>
+                                        <p:tgtEl>
+                                          <p:spTgt spid="3">
+                                            <p:txEl>
+                                              <p:pRg st="7" end="7"/>
+                                            </p:txEl>
+                                          </p:spTgt>
+                                        </p:tgtEl>
+                                        <p:attrNameLst>
+                                          <p:attrName>style.visibility</p:attrName>
+                                        </p:attrNameLst>
+                                      </p:cBhvr>
+                                      <p:to>
+                                        <p:strVal val="visible"/>
+                                      </p:to>
+                                    </p:set>
+                                  </p:childTnLst>
+                                </p:cTn>
+                              </p:par>
+                              <p:par>
+                                <p:cTn id="25" presetID="1" presetClass="entr" presetSubtype="0" fill="hold" grpId="0" nodeType="withEffect">
+                                  <p:stCondLst>
+                                    <p:cond delay="0"/>
+                                  </p:stCondLst>
+                                  <p:childTnLst>
+                                    <p:set>
+                                      <p:cBhvr>
+                                        <p:cTn id="26" dur="1" fill="hold">
+                                          <p:stCondLst>
+                                            <p:cond delay="0"/>
+                                          </p:stCondLst>
+                                        </p:cTn>
+                                        <p:tgtEl>
+                                          <p:spTgt spid="3">
+                                            <p:txEl>
+                                              <p:pRg st="8" end="8"/>
+                                            </p:txEl>
+                                          </p:spTgt>
+                                        </p:tgtEl>
+                                        <p:attrNameLst>
+                                          <p:attrName>style.visibility</p:attrName>
+                                        </p:attrNameLst>
+                                      </p:cBhvr>
+                                      <p:to>
+                                        <p:strVal val="visible"/>
+                                      </p:to>
+                                    </p:set>
+                                  </p:childTnLst>
+                                </p:cTn>
+                              </p:par>
+                            </p:childTnLst>
+                          </p:cTn>
+                        </p:par>
+                      </p:childTnLst>
+                    </p:cTn>
+                  </p:par>
+                </p:childTnLst>
+              </p:cTn>
+              <p:prevCondLst>
+                <p:cond evt="onPrev" delay="0">
+                  <p:tgtEl>
+                    <p:sldTgt/>
+                  </p:tgtEl>
+                </p:cond>
+              </p:prevCondLst>
+              <p:nextCondLst>
+                <p:cond evt="onNext" delay="0">
+                  <p:tgtEl>
+                    <p:sldTgt/>
+                  </p:tgtEl>
+                </p:cond>
+              </p:nextCondLst>
+            </p:seq>
+          </p:childTnLst>
+        </p:cTn>
+      </p:par>
+    </p:tnLst>
+    <p:bldLst>
+      <p:bldP spid="3" grpId="0" uiExpand="1" build="p"/>
+    </p:bldLst>
+  </p:timing>
+</p:sld>
+</file>
+
+<file path=ppt/slides/slide4.xml><?xml version="1.0" encoding="utf-8"?>
+<p:sld xmlns:a="http://schemas.openxmlformats.org/drawingml/2006/main" xmlns:r="http://schemas.openxmlformats.org/officeDocument/2006/relationships" xmlns:p="http://schemas.openxmlformats.org/presentationml/2006/main">
+  <p:cSld>
+    <p:spTree>
+      <p:nvGrpSpPr>
+        <p:cNvPr id="1" name=""/>
+        <p:cNvGrpSpPr/>
+        <p:nvPr/>
+      </p:nvGrpSpPr>
+      <p:grpSpPr>
+        <a:xfrm>
+          <a:off x="0" y="0"/>
+          <a:ext cx="0" cy="0"/>
+          <a:chOff x="0" y="0"/>
+          <a:chExt cx="0" cy="0"/>
+        </a:xfrm>
+      </p:grpSpPr>
+      <p:sp>
+        <p:nvSpPr>
+          <p:cNvPr id="2" name="Title 1"/>
+          <p:cNvSpPr>
+            <a:spLocks noGrp="1"/>
+          </p:cNvSpPr>
+          <p:nvPr>
+            <p:ph type="title"/>
+          </p:nvPr>
+        </p:nvSpPr>
+        <p:spPr/>
+        <p:txBody>
+          <a:bodyPr/>
+          <a:lstStyle/>
+          <a:p>
+            <a:r>
+              <a:rPr lang="en-US" dirty="0" smtClean="0"/>
+              <a:t>Machine learning tasks</a:t>
+            </a:r>
+            <a:endParaRPr lang="en-US" dirty="0"/>
+          </a:p>
+        </p:txBody>
+      </p:sp>
+      <p:sp>
+        <p:nvSpPr>
+          <p:cNvPr id="3" name="Content Placeholder 2"/>
+          <p:cNvSpPr>
+            <a:spLocks noGrp="1"/>
+          </p:cNvSpPr>
+          <p:nvPr>
+            <p:ph idx="1"/>
+          </p:nvPr>
+        </p:nvSpPr>
+        <p:spPr/>
+        <p:txBody>
+          <a:bodyPr>
+            <a:normAutofit/>
+          </a:bodyPr>
+          <a:lstStyle/>
+          <a:p>
+            <a:r>
+              <a:rPr lang="en-US" dirty="0" smtClean="0"/>
+              <a:t>Supervised learning</a:t>
+            </a:r>
+          </a:p>
+          <a:p>
+            <a:pPr lvl="1"/>
+            <a:r>
+              <a:rPr lang="en-US" dirty="0" smtClean="0"/>
+              <a:t>regression: predict numerical values</a:t>
+            </a:r>
+          </a:p>
+          <a:p>
+            <a:pPr lvl="1"/>
+            <a:r>
+              <a:rPr lang="en-US" dirty="0" smtClean="0"/>
+              <a:t>classification: predict categorical values, i.e., labels</a:t>
+            </a:r>
+          </a:p>
+          <a:p>
+            <a:r>
+              <a:rPr lang="en-US" dirty="0" smtClean="0"/>
+              <a:t>Unsupervised learning</a:t>
+            </a:r>
+          </a:p>
+          <a:p>
+            <a:pPr lvl="1"/>
+            <a:r>
+              <a:rPr lang="en-US" dirty="0" smtClean="0"/>
+              <a:t>clustering: group data according to "distance"</a:t>
+            </a:r>
+          </a:p>
+          <a:p>
+            <a:pPr lvl="1"/>
+            <a:r>
+              <a:rPr lang="en-US" dirty="0" smtClean="0"/>
+              <a:t>association: find frequent co-occurrences</a:t>
+            </a:r>
+          </a:p>
+          <a:p>
+            <a:pPr lvl="1"/>
+            <a:r>
+              <a:rPr lang="en-US" dirty="0" smtClean="0"/>
+              <a:t>link prediction: discover relationships in data</a:t>
+            </a:r>
+          </a:p>
+          <a:p>
+            <a:pPr lvl="1"/>
+            <a:r>
+              <a:rPr lang="en-US" dirty="0" smtClean="0"/>
+              <a:t>data reduction: project features to fewer features</a:t>
+            </a:r>
+          </a:p>
+          <a:p>
+            <a:r>
+              <a:rPr lang="en-US" dirty="0" smtClean="0"/>
+              <a:t>Reinforcement learning</a:t>
+            </a:r>
+          </a:p>
+        </p:txBody>
+      </p:sp>
+      <p:sp>
+        <p:nvSpPr>
+          <p:cNvPr id="4" name="Slide Number Placeholder 3"/>
+          <p:cNvSpPr>
+            <a:spLocks noGrp="1"/>
+          </p:cNvSpPr>
+          <p:nvPr>
+            <p:ph type="sldNum" sz="quarter" idx="12"/>
+          </p:nvPr>
+        </p:nvSpPr>
+        <p:spPr/>
+        <p:txBody>
+          <a:bodyPr/>
+          <a:lstStyle/>
+          <a:p>
+            <a:fld id="{5A209D72-2E9D-49B0-8977-41DCCC66C0BB}" type="slidenum">
+              <a:rPr lang="nl-BE" smtClean="0"/>
+              <a:t>4</a:t>
             </a:fld>
             <a:endParaRPr lang="nl-BE"/>
           </a:p>
@@ -16753,7 +18197,7 @@
 </p:sld>
 </file>
 
-<file path=ppt/slides/slide4.xml><?xml version="1.0" encoding="utf-8"?>
+<file path=ppt/slides/slide5.xml><?xml version="1.0" encoding="utf-8"?>
 <p:sld xmlns:a="http://schemas.openxmlformats.org/drawingml/2006/main" xmlns:r="http://schemas.openxmlformats.org/officeDocument/2006/relationships" xmlns:p="http://schemas.openxmlformats.org/presentationml/2006/main">
   <p:cSld>
     <p:spTree>
@@ -16841,7 +18285,7 @@
           <a:p>
             <a:fld id="{CF5A1C33-475D-474A-A037-DDAF3DC7AF09}" type="slidenum">
               <a:rPr lang="en-US" smtClean="0"/>
-              <a:t>4</a:t>
+              <a:t>5</a:t>
             </a:fld>
             <a:endParaRPr lang="en-US"/>
           </a:p>
@@ -16906,7 +18350,7 @@
 </p:sld>
 </file>
 
-<file path=ppt/slides/slide5.xml><?xml version="1.0" encoding="utf-8"?>
+<file path=ppt/slides/slide6.xml><?xml version="1.0" encoding="utf-8"?>
 <p:sld xmlns:a="http://schemas.openxmlformats.org/drawingml/2006/main" xmlns:r="http://schemas.openxmlformats.org/officeDocument/2006/relationships" xmlns:p="http://schemas.openxmlformats.org/presentationml/2006/main">
   <p:cSld>
     <p:spTree>
@@ -16963,7 +18407,7 @@
           <a:p>
             <a:fld id="{CF5A1C33-475D-474A-A037-DDAF3DC7AF09}" type="slidenum">
               <a:rPr lang="en-US" smtClean="0"/>
-              <a:t>5</a:t>
+              <a:t>6</a:t>
             </a:fld>
             <a:endParaRPr lang="en-US"/>
           </a:p>
@@ -17059,7 +18503,7 @@
 </p:sld>
 </file>
 
-<file path=ppt/slides/slide6.xml><?xml version="1.0" encoding="utf-8"?>
+<file path=ppt/slides/slide7.xml><?xml version="1.0" encoding="utf-8"?>
 <p:sld xmlns:a="http://schemas.openxmlformats.org/drawingml/2006/main" xmlns:r="http://schemas.openxmlformats.org/officeDocument/2006/relationships" xmlns:p="http://schemas.openxmlformats.org/presentationml/2006/main">
   <p:cSld>
     <p:spTree>
@@ -17147,7 +18591,7 @@
           <a:p>
             <a:fld id="{CF5A1C33-475D-474A-A037-DDAF3DC7AF09}" type="slidenum">
               <a:rPr lang="en-US" smtClean="0"/>
-              <a:t>6</a:t>
+              <a:t>7</a:t>
             </a:fld>
             <a:endParaRPr lang="en-US"/>
           </a:p>
@@ -17212,7 +18656,7 @@
 </p:sld>
 </file>
 
-<file path=ppt/slides/slide7.xml><?xml version="1.0" encoding="utf-8"?>
+<file path=ppt/slides/slide8.xml><?xml version="1.0" encoding="utf-8"?>
 <p:sld xmlns:a="http://schemas.openxmlformats.org/drawingml/2006/main" xmlns:r="http://schemas.openxmlformats.org/officeDocument/2006/relationships" xmlns:p="http://schemas.openxmlformats.org/presentationml/2006/main">
   <p:cSld>
     <p:spTree>
@@ -17323,7 +18767,7 @@
           <a:p>
             <a:fld id="{CF5A1C33-475D-474A-A037-DDAF3DC7AF09}" type="slidenum">
               <a:rPr lang="en-US" smtClean="0"/>
-              <a:t>7</a:t>
+              <a:t>8</a:t>
             </a:fld>
             <a:endParaRPr lang="en-US"/>
           </a:p>
@@ -17349,7 +18793,7 @@
 </p:sld>
 </file>
 
-<file path=ppt/slides/slide8.xml><?xml version="1.0" encoding="utf-8"?>
+<file path=ppt/slides/slide9.xml><?xml version="1.0" encoding="utf-8"?>
 <p:sld xmlns:a="http://schemas.openxmlformats.org/drawingml/2006/main" xmlns:r="http://schemas.openxmlformats.org/officeDocument/2006/relationships" xmlns:p="http://schemas.openxmlformats.org/presentationml/2006/main">
   <p:cSld>
     <p:spTree>
@@ -17406,7 +18850,7 @@
           <a:p>
             <a:fld id="{CF5A1C33-475D-474A-A037-DDAF3DC7AF09}" type="slidenum">
               <a:rPr lang="en-US" smtClean="0"/>
-              <a:t>8</a:t>
+              <a:t>9</a:t>
             </a:fld>
             <a:endParaRPr lang="en-US"/>
           </a:p>
@@ -17524,503 +18968,6 @@
         <p:cTn id="1" dur="indefinite" restart="never" nodeType="tmRoot"/>
       </p:par>
     </p:tnLst>
-  </p:timing>
-</p:sld>
-</file>
-
-<file path=ppt/slides/slide9.xml><?xml version="1.0" encoding="utf-8"?>
-<p:sld xmlns:a="http://schemas.openxmlformats.org/drawingml/2006/main" xmlns:r="http://schemas.openxmlformats.org/officeDocument/2006/relationships" xmlns:p="http://schemas.openxmlformats.org/presentationml/2006/main">
-  <p:cSld>
-    <p:spTree>
-      <p:nvGrpSpPr>
-        <p:cNvPr id="1" name=""/>
-        <p:cNvGrpSpPr/>
-        <p:nvPr/>
-      </p:nvGrpSpPr>
-      <p:grpSpPr>
-        <a:xfrm>
-          <a:off x="0" y="0"/>
-          <a:ext cx="0" cy="0"/>
-          <a:chOff x="0" y="0"/>
-          <a:chExt cx="0" cy="0"/>
-        </a:xfrm>
-      </p:grpSpPr>
-      <p:sp>
-        <p:nvSpPr>
-          <p:cNvPr id="2" name="Title 1"/>
-          <p:cNvSpPr>
-            <a:spLocks noGrp="1"/>
-          </p:cNvSpPr>
-          <p:nvPr>
-            <p:ph type="title"/>
-          </p:nvPr>
-        </p:nvSpPr>
-        <p:spPr/>
-        <p:txBody>
-          <a:bodyPr/>
-          <a:lstStyle/>
-          <a:p>
-            <a:r>
-              <a:rPr lang="en-BE" dirty="0" smtClean="0"/>
-              <a:t>Machine learning algorithms</a:t>
-            </a:r>
-            <a:endParaRPr lang="en-US" dirty="0"/>
-          </a:p>
-        </p:txBody>
-      </p:sp>
-      <p:sp>
-        <p:nvSpPr>
-          <p:cNvPr id="3" name="Content Placeholder 2"/>
-          <p:cNvSpPr>
-            <a:spLocks noGrp="1"/>
-          </p:cNvSpPr>
-          <p:nvPr>
-            <p:ph idx="1"/>
-          </p:nvPr>
-        </p:nvSpPr>
-        <p:spPr/>
-        <p:txBody>
-          <a:bodyPr>
-            <a:normAutofit fontScale="92500" lnSpcReduction="10000"/>
-          </a:bodyPr>
-          <a:lstStyle/>
-          <a:p>
-            <a:r>
-              <a:rPr lang="en-BE" dirty="0" smtClean="0"/>
-              <a:t>Regression:</a:t>
-            </a:r>
-            <a:br>
-              <a:rPr lang="en-BE" dirty="0" smtClean="0"/>
-            </a:br>
-            <a:r>
-              <a:rPr lang="en-BE" dirty="0" smtClean="0"/>
-              <a:t>Ridge regression, Support Vector Machines, Random Forest,</a:t>
-            </a:r>
-            <a:br>
-              <a:rPr lang="en-BE" dirty="0" smtClean="0"/>
-            </a:br>
-            <a:r>
-              <a:rPr lang="en-BE" dirty="0" smtClean="0"/>
-              <a:t>Multilayer Neural Networks, Deep Neural Networks, ...</a:t>
-            </a:r>
-          </a:p>
-          <a:p>
-            <a:endParaRPr lang="en-BE" dirty="0" smtClean="0"/>
-          </a:p>
-          <a:p>
-            <a:r>
-              <a:rPr lang="en-BE" dirty="0" smtClean="0"/>
-              <a:t>Classification:</a:t>
-            </a:r>
-            <a:br>
-              <a:rPr lang="en-BE" dirty="0" smtClean="0"/>
-            </a:br>
-            <a:r>
-              <a:rPr lang="en-BE" dirty="0" smtClean="0"/>
-              <a:t>Naive Base, </a:t>
-            </a:r>
-            <a:r>
-              <a:rPr lang="en-BE" dirty="0"/>
-              <a:t>, Support Vector </a:t>
-            </a:r>
-            <a:r>
-              <a:rPr lang="en-BE" dirty="0" smtClean="0"/>
-              <a:t>Machines,</a:t>
-            </a:r>
-            <a:br>
-              <a:rPr lang="en-BE" dirty="0" smtClean="0"/>
-            </a:br>
-            <a:r>
-              <a:rPr lang="en-BE" dirty="0" smtClean="0"/>
-              <a:t>Random Forest, Multilayer </a:t>
-            </a:r>
-            <a:r>
-              <a:rPr lang="en-BE" dirty="0"/>
-              <a:t>Neural Networks</a:t>
-            </a:r>
-            <a:r>
-              <a:rPr lang="en-BE" dirty="0" smtClean="0"/>
-              <a:t>,</a:t>
-            </a:r>
-            <a:br>
-              <a:rPr lang="en-BE" dirty="0" smtClean="0"/>
-            </a:br>
-            <a:r>
-              <a:rPr lang="en-BE" dirty="0" smtClean="0"/>
-              <a:t>Deep </a:t>
-            </a:r>
-            <a:r>
-              <a:rPr lang="en-BE" dirty="0"/>
-              <a:t>Neural Networks, </a:t>
-            </a:r>
-            <a:r>
-              <a:rPr lang="en-BE" dirty="0" smtClean="0"/>
-              <a:t>...</a:t>
-            </a:r>
-          </a:p>
-          <a:p>
-            <a:endParaRPr lang="en-BE" dirty="0" smtClean="0"/>
-          </a:p>
-          <a:p>
-            <a:r>
-              <a:rPr lang="en-BE" dirty="0" smtClean="0"/>
-              <a:t>Clustering:</a:t>
-            </a:r>
-            <a:br>
-              <a:rPr lang="en-BE" dirty="0" smtClean="0"/>
-            </a:br>
-            <a:r>
-              <a:rPr lang="en-BE" dirty="0" smtClean="0"/>
-              <a:t>k-Means, Hierarchical Clustering, ...</a:t>
-            </a:r>
-            <a:endParaRPr lang="en-BE" dirty="0"/>
-          </a:p>
-          <a:p>
-            <a:pPr lvl="1"/>
-            <a:endParaRPr lang="en-US" dirty="0"/>
-          </a:p>
-        </p:txBody>
-      </p:sp>
-      <p:sp>
-        <p:nvSpPr>
-          <p:cNvPr id="4" name="Slide Number Placeholder 3"/>
-          <p:cNvSpPr>
-            <a:spLocks noGrp="1"/>
-          </p:cNvSpPr>
-          <p:nvPr>
-            <p:ph type="sldNum" sz="quarter" idx="12"/>
-          </p:nvPr>
-        </p:nvSpPr>
-        <p:spPr/>
-        <p:txBody>
-          <a:bodyPr/>
-          <a:lstStyle/>
-          <a:p>
-            <a:fld id="{5A209D72-2E9D-49B0-8977-41DCCC66C0BB}" type="slidenum">
-              <a:rPr lang="nl-BE" smtClean="0"/>
-              <a:t>9</a:t>
-            </a:fld>
-            <a:endParaRPr lang="nl-BE"/>
-          </a:p>
-        </p:txBody>
-      </p:sp>
-      <p:sp>
-        <p:nvSpPr>
-          <p:cNvPr id="5" name="Rectangle 4"/>
-          <p:cNvSpPr/>
-          <p:nvPr/>
-        </p:nvSpPr>
-        <p:spPr>
-          <a:xfrm>
-            <a:off x="1140823" y="4319453"/>
-            <a:ext cx="3230880" cy="383175"/>
-          </a:xfrm>
-          <a:prstGeom prst="rect">
-            <a:avLst/>
-          </a:prstGeom>
-          <a:noFill/>
-          <a:ln w="28575"/>
-        </p:spPr>
-        <p:style>
-          <a:lnRef idx="2">
-            <a:schemeClr val="accent1">
-              <a:shade val="50000"/>
-            </a:schemeClr>
-          </a:lnRef>
-          <a:fillRef idx="1">
-            <a:schemeClr val="accent1"/>
-          </a:fillRef>
-          <a:effectRef idx="0">
-            <a:schemeClr val="accent1"/>
-          </a:effectRef>
-          <a:fontRef idx="minor">
-            <a:schemeClr val="lt1"/>
-          </a:fontRef>
-        </p:style>
-        <p:txBody>
-          <a:bodyPr rtlCol="0" anchor="ctr"/>
-          <a:lstStyle/>
-          <a:p>
-            <a:pPr algn="ctr"/>
-            <a:endParaRPr lang="en-US"/>
-          </a:p>
-        </p:txBody>
-      </p:sp>
-      <p:sp>
-        <p:nvSpPr>
-          <p:cNvPr id="9" name="Rectangle 8"/>
-          <p:cNvSpPr/>
-          <p:nvPr/>
-        </p:nvSpPr>
-        <p:spPr>
-          <a:xfrm>
-            <a:off x="1097279" y="2172137"/>
-            <a:ext cx="2438402" cy="300971"/>
-          </a:xfrm>
-          <a:prstGeom prst="rect">
-            <a:avLst/>
-          </a:prstGeom>
-          <a:noFill/>
-          <a:ln w="28575"/>
-        </p:spPr>
-        <p:style>
-          <a:lnRef idx="2">
-            <a:schemeClr val="accent1">
-              <a:shade val="50000"/>
-            </a:schemeClr>
-          </a:lnRef>
-          <a:fillRef idx="1">
-            <a:schemeClr val="accent1"/>
-          </a:fillRef>
-          <a:effectRef idx="0">
-            <a:schemeClr val="accent1"/>
-          </a:effectRef>
-          <a:fontRef idx="minor">
-            <a:schemeClr val="lt1"/>
-          </a:fontRef>
-        </p:style>
-        <p:txBody>
-          <a:bodyPr rtlCol="0" anchor="ctr"/>
-          <a:lstStyle/>
-          <a:p>
-            <a:pPr algn="ctr"/>
-            <a:endParaRPr lang="en-US"/>
-          </a:p>
-        </p:txBody>
-      </p:sp>
-      <p:pic>
-        <p:nvPicPr>
-          <p:cNvPr id="7178" name="Picture 10" descr="Image result for support vector machine"/>
-          <p:cNvPicPr>
-            <a:picLocks noChangeAspect="1" noChangeArrowheads="1"/>
-          </p:cNvPicPr>
-          <p:nvPr/>
-        </p:nvPicPr>
-        <p:blipFill>
-          <a:blip r:embed="rId2">
-            <a:extLst>
-              <a:ext uri="{28A0092B-C50C-407E-A947-70E740481C1C}">
-                <a14:useLocalDpi xmlns:a14="http://schemas.microsoft.com/office/drawing/2010/main" val="0"/>
-              </a:ext>
-            </a:extLst>
-          </a:blip>
-          <a:srcRect/>
-          <a:stretch>
-            <a:fillRect/>
-          </a:stretch>
-        </p:blipFill>
-        <p:spPr bwMode="auto">
-          <a:xfrm>
-            <a:off x="8010778" y="3196046"/>
-            <a:ext cx="2117199" cy="2088970"/>
-          </a:xfrm>
-          <a:prstGeom prst="rect">
-            <a:avLst/>
-          </a:prstGeom>
-          <a:noFill/>
-          <a:extLst>
-            <a:ext uri="{909E8E84-426E-40DD-AFC4-6F175D3DCCD1}">
-              <a14:hiddenFill xmlns:a14="http://schemas.microsoft.com/office/drawing/2010/main">
-                <a:solidFill>
-                  <a:srgbClr val="FFFFFF"/>
-                </a:solidFill>
-              </a14:hiddenFill>
-            </a:ext>
-          </a:extLst>
-        </p:spPr>
-      </p:pic>
-    </p:spTree>
-    <p:extLst>
-      <p:ext uri="{BB962C8B-B14F-4D97-AF65-F5344CB8AC3E}">
-        <p14:creationId xmlns:p14="http://schemas.microsoft.com/office/powerpoint/2010/main" val="1761648139"/>
-      </p:ext>
-    </p:extLst>
-  </p:cSld>
-  <p:clrMapOvr>
-    <a:masterClrMapping/>
-  </p:clrMapOvr>
-  <p:timing>
-    <p:tnLst>
-      <p:par>
-        <p:cTn id="1" dur="indefinite" restart="never" nodeType="tmRoot">
-          <p:childTnLst>
-            <p:seq concurrent="1" nextAc="seek">
-              <p:cTn id="2" dur="indefinite" nodeType="mainSeq">
-                <p:childTnLst>
-                  <p:par>
-                    <p:cTn id="3" fill="hold">
-                      <p:stCondLst>
-                        <p:cond delay="indefinite"/>
-                        <p:cond evt="onBegin" delay="0">
-                          <p:tn val="2"/>
-                        </p:cond>
-                      </p:stCondLst>
-                      <p:childTnLst>
-                        <p:par>
-                          <p:cTn id="4" fill="hold">
-                            <p:stCondLst>
-                              <p:cond delay="0"/>
-                            </p:stCondLst>
-                            <p:childTnLst>
-                              <p:par>
-                                <p:cTn id="5" presetID="1" presetClass="entr" presetSubtype="0" fill="hold" grpId="0" nodeType="withEffect">
-                                  <p:stCondLst>
-                                    <p:cond delay="0"/>
-                                  </p:stCondLst>
-                                  <p:childTnLst>
-                                    <p:set>
-                                      <p:cBhvr>
-                                        <p:cTn id="6" dur="1" fill="hold">
-                                          <p:stCondLst>
-                                            <p:cond delay="0"/>
-                                          </p:stCondLst>
-                                        </p:cTn>
-                                        <p:tgtEl>
-                                          <p:spTgt spid="3">
-                                            <p:txEl>
-                                              <p:pRg st="0" end="0"/>
-                                            </p:txEl>
-                                          </p:spTgt>
-                                        </p:tgtEl>
-                                        <p:attrNameLst>
-                                          <p:attrName>style.visibility</p:attrName>
-                                        </p:attrNameLst>
-                                      </p:cBhvr>
-                                      <p:to>
-                                        <p:strVal val="visible"/>
-                                      </p:to>
-                                    </p:set>
-                                  </p:childTnLst>
-                                </p:cTn>
-                              </p:par>
-                            </p:childTnLst>
-                          </p:cTn>
-                        </p:par>
-                      </p:childTnLst>
-                    </p:cTn>
-                  </p:par>
-                  <p:par>
-                    <p:cTn id="7" fill="hold">
-                      <p:stCondLst>
-                        <p:cond delay="indefinite"/>
-                      </p:stCondLst>
-                      <p:childTnLst>
-                        <p:par>
-                          <p:cTn id="8" fill="hold">
-                            <p:stCondLst>
-                              <p:cond delay="0"/>
-                            </p:stCondLst>
-                            <p:childTnLst>
-                              <p:par>
-                                <p:cTn id="9" presetID="1" presetClass="entr" presetSubtype="0" fill="hold" grpId="0" nodeType="clickEffect">
-                                  <p:stCondLst>
-                                    <p:cond delay="0"/>
-                                  </p:stCondLst>
-                                  <p:childTnLst>
-                                    <p:set>
-                                      <p:cBhvr>
-                                        <p:cTn id="10" dur="1" fill="hold">
-                                          <p:stCondLst>
-                                            <p:cond delay="0"/>
-                                          </p:stCondLst>
-                                        </p:cTn>
-                                        <p:tgtEl>
-                                          <p:spTgt spid="3">
-                                            <p:txEl>
-                                              <p:pRg st="2" end="2"/>
-                                            </p:txEl>
-                                          </p:spTgt>
-                                        </p:tgtEl>
-                                        <p:attrNameLst>
-                                          <p:attrName>style.visibility</p:attrName>
-                                        </p:attrNameLst>
-                                      </p:cBhvr>
-                                      <p:to>
-                                        <p:strVal val="visible"/>
-                                      </p:to>
-                                    </p:set>
-                                  </p:childTnLst>
-                                </p:cTn>
-                              </p:par>
-                            </p:childTnLst>
-                          </p:cTn>
-                        </p:par>
-                      </p:childTnLst>
-                    </p:cTn>
-                  </p:par>
-                  <p:par>
-                    <p:cTn id="11" fill="hold">
-                      <p:stCondLst>
-                        <p:cond delay="indefinite"/>
-                      </p:stCondLst>
-                      <p:childTnLst>
-                        <p:par>
-                          <p:cTn id="12" fill="hold">
-                            <p:stCondLst>
-                              <p:cond delay="0"/>
-                            </p:stCondLst>
-                            <p:childTnLst>
-                              <p:par>
-                                <p:cTn id="13" presetID="1" presetClass="entr" presetSubtype="0" fill="hold" grpId="0" nodeType="clickEffect">
-                                  <p:stCondLst>
-                                    <p:cond delay="0"/>
-                                  </p:stCondLst>
-                                  <p:childTnLst>
-                                    <p:set>
-                                      <p:cBhvr>
-                                        <p:cTn id="14" dur="1" fill="hold">
-                                          <p:stCondLst>
-                                            <p:cond delay="0"/>
-                                          </p:stCondLst>
-                                        </p:cTn>
-                                        <p:tgtEl>
-                                          <p:spTgt spid="3">
-                                            <p:txEl>
-                                              <p:pRg st="4" end="4"/>
-                                            </p:txEl>
-                                          </p:spTgt>
-                                        </p:tgtEl>
-                                        <p:attrNameLst>
-                                          <p:attrName>style.visibility</p:attrName>
-                                        </p:attrNameLst>
-                                      </p:cBhvr>
-                                      <p:to>
-                                        <p:strVal val="visible"/>
-                                      </p:to>
-                                    </p:set>
-                                  </p:childTnLst>
-                                </p:cTn>
-                              </p:par>
-                            </p:childTnLst>
-                          </p:cTn>
-                        </p:par>
-                      </p:childTnLst>
-                    </p:cTn>
-                  </p:par>
-                </p:childTnLst>
-              </p:cTn>
-              <p:prevCondLst>
-                <p:cond evt="onPrev" delay="0">
-                  <p:tgtEl>
-                    <p:sldTgt/>
-                  </p:tgtEl>
-                </p:cond>
-              </p:prevCondLst>
-              <p:nextCondLst>
-                <p:cond evt="onNext" delay="0">
-                  <p:tgtEl>
-                    <p:sldTgt/>
-                  </p:tgtEl>
-                </p:cond>
-              </p:nextCondLst>
-            </p:seq>
-          </p:childTnLst>
-        </p:cTn>
-      </p:par>
-    </p:tnLst>
-    <p:bldLst>
-      <p:bldP spid="3" grpId="0" uiExpand="1" build="p"/>
-    </p:bldLst>
   </p:timing>
 </p:sld>
 </file>

</xml_diff>

<commit_message>
Add slides on taks 1
</commit_message>
<xml_diff>
--- a/prace_days_ml_2019.pptx
+++ b/prace_days_ml_2019.pptx
@@ -5,7 +5,7 @@
     <p:sldMasterId id="2147483660" r:id="rId1"/>
   </p:sldMasterIdLst>
   <p:notesMasterIdLst>
-    <p:notesMasterId r:id="rId27"/>
+    <p:notesMasterId r:id="rId28"/>
   </p:notesMasterIdLst>
   <p:sldIdLst>
     <p:sldId id="257" r:id="rId2"/>
@@ -33,6 +33,7 @@
     <p:sldId id="275" r:id="rId24"/>
     <p:sldId id="278" r:id="rId25"/>
     <p:sldId id="269" r:id="rId26"/>
+    <p:sldId id="282" r:id="rId27"/>
   </p:sldIdLst>
   <p:sldSz cx="12192000" cy="6858000"/>
   <p:notesSz cx="6858000" cy="9144000"/>
@@ -14122,6 +14123,57 @@
           </a:p>
         </p:txBody>
       </p:sp>
+      <p:sp>
+        <p:nvSpPr>
+          <p:cNvPr id="15" name="TextBox 14"/>
+          <p:cNvSpPr txBox="1"/>
+          <p:nvPr/>
+        </p:nvSpPr>
+        <p:spPr>
+          <a:xfrm>
+            <a:off x="5347063" y="5480587"/>
+            <a:ext cx="4581703" cy="369332"/>
+          </a:xfrm>
+          <a:prstGeom prst="rect">
+            <a:avLst/>
+          </a:prstGeom>
+        </p:spPr>
+        <p:style>
+          <a:lnRef idx="1">
+            <a:schemeClr val="accent2"/>
+          </a:lnRef>
+          <a:fillRef idx="2">
+            <a:schemeClr val="accent2"/>
+          </a:fillRef>
+          <a:effectRef idx="1">
+            <a:schemeClr val="accent2"/>
+          </a:effectRef>
+          <a:fontRef idx="minor">
+            <a:schemeClr val="dk1"/>
+          </a:fontRef>
+        </p:style>
+        <p:txBody>
+          <a:bodyPr wrap="none" rtlCol="0">
+            <a:spAutoFit/>
+          </a:bodyPr>
+          <a:lstStyle/>
+          <a:p>
+            <a:r>
+              <a:rPr lang="en-BE" dirty="0" smtClean="0"/>
+              <a:t>Multilayer perceptron: </a:t>
+            </a:r>
+            <a:r>
+              <a:rPr lang="en-BE" dirty="0" smtClean="0">
+                <a:latin typeface="Inconsolata" panose="00000509000000000000" pitchFamily="49" charset="0"/>
+              </a:rPr>
+              <a:t>040_mnist_mlp.ipynb</a:t>
+            </a:r>
+            <a:endParaRPr lang="en-US" dirty="0">
+              <a:latin typeface="Inconsolata" panose="00000509000000000000" pitchFamily="49" charset="0"/>
+            </a:endParaRPr>
+          </a:p>
+        </p:txBody>
+      </p:sp>
     </p:spTree>
     <p:extLst>
       <p:ext uri="{BB962C8B-B14F-4D97-AF65-F5344CB8AC3E}">
@@ -14975,7 +15027,7 @@
         </p:nvGrpSpPr>
         <p:grpSpPr>
           <a:xfrm>
-            <a:off x="180800" y="1589307"/>
+            <a:off x="180800" y="1393991"/>
             <a:ext cx="5422729" cy="1951085"/>
             <a:chOff x="2019996" y="1589307"/>
             <a:chExt cx="5422729" cy="1951085"/>
@@ -15282,7 +15334,7 @@
         </p:nvGrpSpPr>
         <p:grpSpPr>
           <a:xfrm>
-            <a:off x="180800" y="3864545"/>
+            <a:off x="180800" y="3669229"/>
             <a:ext cx="5416432" cy="1946373"/>
             <a:chOff x="2019996" y="3864545"/>
             <a:chExt cx="5416432" cy="1946373"/>
@@ -15589,7 +15641,7 @@
         </p:nvSpPr>
         <p:spPr>
           <a:xfrm rot="2696471">
-            <a:off x="3919076" y="2304660"/>
+            <a:off x="3919076" y="2109344"/>
             <a:ext cx="1628503" cy="482280"/>
           </a:xfrm>
           <a:prstGeom prst="ellipse">
@@ -15634,7 +15686,7 @@
         </p:nvGrpSpPr>
         <p:grpSpPr>
           <a:xfrm>
-            <a:off x="3922039" y="4334145"/>
+            <a:off x="3922039" y="4138829"/>
             <a:ext cx="1656638" cy="1153472"/>
             <a:chOff x="3922039" y="4334145"/>
             <a:chExt cx="1656638" cy="1153472"/>
@@ -15739,7 +15791,7 @@
         </p:nvGrpSpPr>
         <p:grpSpPr>
           <a:xfrm>
-            <a:off x="6460558" y="1584595"/>
+            <a:off x="6460558" y="1389279"/>
             <a:ext cx="5453984" cy="1951085"/>
             <a:chOff x="6512512" y="1570257"/>
             <a:chExt cx="5453984" cy="1951085"/>
@@ -16061,7 +16113,7 @@
         </p:nvGrpSpPr>
         <p:grpSpPr>
           <a:xfrm>
-            <a:off x="6460271" y="3842712"/>
+            <a:off x="6460271" y="3647396"/>
             <a:ext cx="5461385" cy="1972918"/>
             <a:chOff x="6460271" y="3842712"/>
             <a:chExt cx="5461385" cy="1972918"/>
@@ -16383,7 +16435,7 @@
         </p:nvGrpSpPr>
         <p:grpSpPr>
           <a:xfrm>
-            <a:off x="10454964" y="4404988"/>
+            <a:off x="10454964" y="4209672"/>
             <a:ext cx="1440765" cy="992992"/>
             <a:chOff x="10454964" y="4404988"/>
             <a:chExt cx="1440765" cy="992992"/>
@@ -16488,7 +16540,7 @@
         </p:nvGrpSpPr>
         <p:grpSpPr>
           <a:xfrm>
-            <a:off x="10360303" y="1941484"/>
+            <a:off x="10360303" y="1746168"/>
             <a:ext cx="1363597" cy="1344260"/>
             <a:chOff x="10360303" y="1941484"/>
             <a:chExt cx="1363597" cy="1344260"/>
@@ -16630,6 +16682,57 @@
           </p:txBody>
         </p:sp>
       </p:grpSp>
+      <p:sp>
+        <p:nvSpPr>
+          <p:cNvPr id="39" name="TextBox 38"/>
+          <p:cNvSpPr txBox="1"/>
+          <p:nvPr/>
+        </p:nvSpPr>
+        <p:spPr>
+          <a:xfrm>
+            <a:off x="440807" y="5863233"/>
+            <a:ext cx="3903633" cy="369332"/>
+          </a:xfrm>
+          <a:prstGeom prst="rect">
+            <a:avLst/>
+          </a:prstGeom>
+        </p:spPr>
+        <p:style>
+          <a:lnRef idx="1">
+            <a:schemeClr val="accent2"/>
+          </a:lnRef>
+          <a:fillRef idx="2">
+            <a:schemeClr val="accent2"/>
+          </a:fillRef>
+          <a:effectRef idx="1">
+            <a:schemeClr val="accent2"/>
+          </a:effectRef>
+          <a:fontRef idx="minor">
+            <a:schemeClr val="dk1"/>
+          </a:fontRef>
+        </p:style>
+        <p:txBody>
+          <a:bodyPr wrap="none" rtlCol="0">
+            <a:spAutoFit/>
+          </a:bodyPr>
+          <a:lstStyle/>
+          <a:p>
+            <a:r>
+              <a:rPr lang="en-BE" dirty="0" smtClean="0"/>
+              <a:t>Convolution: </a:t>
+            </a:r>
+            <a:r>
+              <a:rPr lang="en-BE" dirty="0" smtClean="0">
+                <a:latin typeface="Inconsolata" panose="00000509000000000000" pitchFamily="49" charset="0"/>
+              </a:rPr>
+              <a:t>050_convolution.ipynb</a:t>
+            </a:r>
+            <a:endParaRPr lang="en-US" dirty="0">
+              <a:latin typeface="Inconsolata" panose="00000509000000000000" pitchFamily="49" charset="0"/>
+            </a:endParaRPr>
+          </a:p>
+        </p:txBody>
+      </p:sp>
     </p:spTree>
     <p:extLst>
       <p:ext uri="{BB962C8B-B14F-4D97-AF65-F5344CB8AC3E}">
@@ -16987,6 +17090,741 @@
     <p:bldLst>
       <p:bldP spid="21" grpId="0" animBg="1"/>
     </p:bldLst>
+  </p:timing>
+</p:sld>
+</file>
+
+<file path=ppt/slides/slide26.xml><?xml version="1.0" encoding="utf-8"?>
+<p:sld xmlns:a="http://schemas.openxmlformats.org/drawingml/2006/main" xmlns:r="http://schemas.openxmlformats.org/officeDocument/2006/relationships" xmlns:p="http://schemas.openxmlformats.org/presentationml/2006/main">
+  <p:cSld>
+    <p:spTree>
+      <p:nvGrpSpPr>
+        <p:cNvPr id="1" name=""/>
+        <p:cNvGrpSpPr/>
+        <p:nvPr/>
+      </p:nvGrpSpPr>
+      <p:grpSpPr>
+        <a:xfrm>
+          <a:off x="0" y="0"/>
+          <a:ext cx="0" cy="0"/>
+          <a:chOff x="0" y="0"/>
+          <a:chExt cx="0" cy="0"/>
+        </a:xfrm>
+      </p:grpSpPr>
+      <p:sp>
+        <p:nvSpPr>
+          <p:cNvPr id="2" name="Title 1"/>
+          <p:cNvSpPr>
+            <a:spLocks noGrp="1"/>
+          </p:cNvSpPr>
+          <p:nvPr>
+            <p:ph type="title"/>
+          </p:nvPr>
+        </p:nvSpPr>
+        <p:spPr/>
+        <p:txBody>
+          <a:bodyPr/>
+          <a:lstStyle/>
+          <a:p>
+            <a:r>
+              <a:rPr lang="en-BE" dirty="0" smtClean="0"/>
+              <a:t>Second </a:t>
+            </a:r>
+            <a:r>
+              <a:rPr lang="en-BE" dirty="0" smtClean="0"/>
+              <a:t>approach</a:t>
+            </a:r>
+            <a:endParaRPr lang="en-US" dirty="0"/>
+          </a:p>
+        </p:txBody>
+      </p:sp>
+      <p:sp>
+        <p:nvSpPr>
+          <p:cNvPr id="4" name="Text Placeholder 3"/>
+          <p:cNvSpPr>
+            <a:spLocks noGrp="1"/>
+          </p:cNvSpPr>
+          <p:nvPr>
+            <p:ph type="body" sz="half" idx="2"/>
+          </p:nvPr>
+        </p:nvSpPr>
+        <p:spPr>
+          <a:xfrm>
+            <a:off x="839788" y="2057400"/>
+            <a:ext cx="4406915" cy="3811588"/>
+          </a:xfrm>
+        </p:spPr>
+        <p:txBody>
+          <a:bodyPr>
+            <a:noAutofit/>
+          </a:bodyPr>
+          <a:lstStyle/>
+          <a:p>
+            <a:pPr marL="285750" indent="-285750">
+              <a:buFont typeface="Arial" panose="020B0604020202020204" pitchFamily="34" charset="0"/>
+              <a:buChar char="•"/>
+            </a:pPr>
+            <a:r>
+              <a:rPr lang="en-BE" sz="2000" dirty="0" smtClean="0"/>
+              <a:t>Data preprocessing</a:t>
+            </a:r>
+          </a:p>
+          <a:p>
+            <a:pPr marL="742950" lvl="1" indent="-285750">
+              <a:buFont typeface="Arial" panose="020B0604020202020204" pitchFamily="34" charset="0"/>
+              <a:buChar char="•"/>
+            </a:pPr>
+            <a:r>
+              <a:rPr lang="en-BE" sz="1800" dirty="0" smtClean="0"/>
+              <a:t>Input data as 2D array</a:t>
+            </a:r>
+          </a:p>
+          <a:p>
+            <a:pPr marL="742950" lvl="1" indent="-285750">
+              <a:buFont typeface="Arial" panose="020B0604020202020204" pitchFamily="34" charset="0"/>
+              <a:buChar char="•"/>
+            </a:pPr>
+            <a:r>
+              <a:rPr lang="en-BE" sz="1800" dirty="0" smtClean="0"/>
+              <a:t>output data as array with</a:t>
+            </a:r>
+            <a:br>
+              <a:rPr lang="en-BE" sz="1800" dirty="0" smtClean="0"/>
+            </a:br>
+            <a:r>
+              <a:rPr lang="en-BE" sz="1800" dirty="0" smtClean="0"/>
+              <a:t>one-hot encoding</a:t>
+            </a:r>
+          </a:p>
+          <a:p>
+            <a:pPr marL="742950" lvl="1" indent="-285750">
+              <a:buFont typeface="Arial" panose="020B0604020202020204" pitchFamily="34" charset="0"/>
+              <a:buChar char="•"/>
+            </a:pPr>
+            <a:endParaRPr lang="en-BE" sz="1800" dirty="0"/>
+          </a:p>
+          <a:p>
+            <a:pPr marL="285750" indent="-285750">
+              <a:buFont typeface="Arial" panose="020B0604020202020204" pitchFamily="34" charset="0"/>
+              <a:buChar char="•"/>
+            </a:pPr>
+            <a:r>
+              <a:rPr lang="en-BE" sz="2000" dirty="0" smtClean="0"/>
+              <a:t>Model: convolutional neural network (CNN)</a:t>
+            </a:r>
+          </a:p>
+          <a:p>
+            <a:pPr marL="742950" lvl="1" indent="-285750">
+              <a:buFont typeface="Arial" panose="020B0604020202020204" pitchFamily="34" charset="0"/>
+              <a:buChar char="•"/>
+            </a:pPr>
+            <a:r>
+              <a:rPr lang="en-BE" sz="1800" dirty="0" smtClean="0"/>
+              <a:t>28 </a:t>
+            </a:r>
+            <a:r>
+              <a:rPr lang="en-BE" sz="1800" dirty="0" smtClean="0">
+                <a:sym typeface="Symbol" panose="05050102010706020507" pitchFamily="18" charset="2"/>
+              </a:rPr>
+              <a:t></a:t>
+            </a:r>
+            <a:r>
+              <a:rPr lang="en-BE" sz="1800" dirty="0" smtClean="0"/>
+              <a:t> 28 inputs</a:t>
+            </a:r>
+          </a:p>
+          <a:p>
+            <a:pPr marL="742950" lvl="1" indent="-285750">
+              <a:buFont typeface="Arial" panose="020B0604020202020204" pitchFamily="34" charset="0"/>
+              <a:buChar char="•"/>
+            </a:pPr>
+            <a:r>
+              <a:rPr lang="en-BE" sz="1800" dirty="0" smtClean="0"/>
+              <a:t>CNN layer with 32 filters 3 </a:t>
+            </a:r>
+            <a:r>
+              <a:rPr lang="en-BE" sz="1800" dirty="0" smtClean="0">
+                <a:sym typeface="Symbol" panose="05050102010706020507" pitchFamily="18" charset="2"/>
+              </a:rPr>
+              <a:t></a:t>
+            </a:r>
+            <a:r>
+              <a:rPr lang="en-BE" sz="1800" dirty="0" smtClean="0"/>
+              <a:t> 3</a:t>
+            </a:r>
+          </a:p>
+          <a:p>
+            <a:pPr marL="742950" lvl="1" indent="-285750">
+              <a:buFont typeface="Arial" panose="020B0604020202020204" pitchFamily="34" charset="0"/>
+              <a:buChar char="•"/>
+            </a:pPr>
+            <a:r>
+              <a:rPr lang="en-BE" sz="1800" dirty="0" smtClean="0"/>
+              <a:t>ReLU activation function</a:t>
+            </a:r>
+          </a:p>
+          <a:p>
+            <a:pPr marL="742950" lvl="1" indent="-285750">
+              <a:buFont typeface="Arial" panose="020B0604020202020204" pitchFamily="34" charset="0"/>
+              <a:buChar char="•"/>
+            </a:pPr>
+            <a:r>
+              <a:rPr lang="en-BE" sz="1800" dirty="0" smtClean="0"/>
+              <a:t>flatten layer</a:t>
+            </a:r>
+          </a:p>
+          <a:p>
+            <a:pPr marL="742950" lvl="1" indent="-285750">
+              <a:buFont typeface="Arial" panose="020B0604020202020204" pitchFamily="34" charset="0"/>
+              <a:buChar char="•"/>
+            </a:pPr>
+            <a:r>
+              <a:rPr lang="en-BE" sz="1800" dirty="0" smtClean="0"/>
+              <a:t>dense layer with 10 units</a:t>
+            </a:r>
+          </a:p>
+          <a:p>
+            <a:pPr marL="742950" lvl="1" indent="-285750">
+              <a:buFont typeface="Arial" panose="020B0604020202020204" pitchFamily="34" charset="0"/>
+              <a:buChar char="•"/>
+            </a:pPr>
+            <a:r>
+              <a:rPr lang="en-BE" sz="1800" dirty="0" smtClean="0"/>
+              <a:t>SoftMax activation function</a:t>
+            </a:r>
+            <a:endParaRPr lang="en-US" sz="1800" dirty="0"/>
+          </a:p>
+        </p:txBody>
+      </p:sp>
+      <p:sp>
+        <p:nvSpPr>
+          <p:cNvPr id="5" name="Slide Number Placeholder 4"/>
+          <p:cNvSpPr>
+            <a:spLocks noGrp="1"/>
+          </p:cNvSpPr>
+          <p:nvPr>
+            <p:ph type="sldNum" sz="quarter" idx="12"/>
+          </p:nvPr>
+        </p:nvSpPr>
+        <p:spPr/>
+        <p:txBody>
+          <a:bodyPr/>
+          <a:lstStyle/>
+          <a:p>
+            <a:fld id="{CF5A1C33-475D-474A-A037-DDAF3DC7AF09}" type="slidenum">
+              <a:rPr lang="en-US" smtClean="0"/>
+              <a:t>26</a:t>
+            </a:fld>
+            <a:endParaRPr lang="en-US"/>
+          </a:p>
+        </p:txBody>
+      </p:sp>
+      <p:pic>
+        <p:nvPicPr>
+          <p:cNvPr id="6" name="Picture 2" descr="Image result for mnist dataset"/>
+          <p:cNvPicPr>
+            <a:picLocks noChangeAspect="1" noChangeArrowheads="1"/>
+          </p:cNvPicPr>
+          <p:nvPr/>
+        </p:nvPicPr>
+        <p:blipFill rotWithShape="1">
+          <a:blip r:embed="rId2">
+            <a:extLst>
+              <a:ext uri="{28A0092B-C50C-407E-A947-70E740481C1C}">
+                <a14:useLocalDpi xmlns:a14="http://schemas.microsoft.com/office/drawing/2010/main" val="0"/>
+              </a:ext>
+            </a:extLst>
+          </a:blip>
+          <a:srcRect l="4475" t="4111" r="3330" b="4774"/>
+          <a:stretch/>
+        </p:blipFill>
+        <p:spPr bwMode="auto">
+          <a:xfrm>
+            <a:off x="7475958" y="181242"/>
+            <a:ext cx="1055788" cy="1043397"/>
+          </a:xfrm>
+          <a:prstGeom prst="rect">
+            <a:avLst/>
+          </a:prstGeom>
+          <a:noFill/>
+          <a:extLst>
+            <a:ext uri="{909E8E84-426E-40DD-AFC4-6F175D3DCCD1}">
+              <a14:hiddenFill xmlns:a14="http://schemas.microsoft.com/office/drawing/2010/main">
+                <a:solidFill>
+                  <a:srgbClr val="FFFFFF"/>
+                </a:solidFill>
+              </a14:hiddenFill>
+            </a:ext>
+          </a:extLst>
+        </p:spPr>
+      </p:pic>
+      <p:grpSp>
+        <p:nvGrpSpPr>
+          <p:cNvPr id="9" name="Group 8"/>
+          <p:cNvGrpSpPr/>
+          <p:nvPr/>
+        </p:nvGrpSpPr>
+        <p:grpSpPr>
+          <a:xfrm>
+            <a:off x="4275909" y="1341113"/>
+            <a:ext cx="7917552" cy="1318567"/>
+            <a:chOff x="4275909" y="3762102"/>
+            <a:chExt cx="7917552" cy="1318567"/>
+          </a:xfrm>
+        </p:grpSpPr>
+        <p:sp>
+          <p:nvSpPr>
+            <p:cNvPr id="7" name="TextBox 6"/>
+            <p:cNvSpPr txBox="1"/>
+            <p:nvPr/>
+          </p:nvSpPr>
+          <p:spPr>
+            <a:xfrm>
+              <a:off x="4275909" y="4711337"/>
+              <a:ext cx="7917552" cy="369332"/>
+            </a:xfrm>
+            <a:prstGeom prst="rect">
+              <a:avLst/>
+            </a:prstGeom>
+            <a:noFill/>
+          </p:spPr>
+          <p:txBody>
+            <a:bodyPr wrap="none" rtlCol="0">
+              <a:spAutoFit/>
+            </a:bodyPr>
+            <a:lstStyle/>
+            <a:p>
+              <a:r>
+                <a:rPr lang="en-GB" dirty="0">
+                  <a:latin typeface="Inconsolata" panose="00000509000000000000" pitchFamily="49" charset="0"/>
+                </a:rPr>
+                <a:t>array</a:t>
+              </a:r>
+              <a:r>
+                <a:rPr lang="en-GB" dirty="0" smtClean="0">
+                  <a:latin typeface="Inconsolata" panose="00000509000000000000" pitchFamily="49" charset="0"/>
+                </a:rPr>
+                <a:t>([</a:t>
+              </a:r>
+              <a:r>
+                <a:rPr lang="en-BE" dirty="0" smtClean="0">
+                  <a:latin typeface="Inconsolata" panose="00000509000000000000" pitchFamily="49" charset="0"/>
+                </a:rPr>
+                <a:t>[</a:t>
+              </a:r>
+              <a:r>
+                <a:rPr lang="en-GB" dirty="0" smtClean="0">
+                  <a:latin typeface="Inconsolata" panose="00000509000000000000" pitchFamily="49" charset="0"/>
+                </a:rPr>
+                <a:t> </a:t>
+              </a:r>
+              <a:r>
+                <a:rPr lang="en-BE" dirty="0" smtClean="0">
+                  <a:latin typeface="Inconsolata" panose="00000509000000000000" pitchFamily="49" charset="0"/>
+                </a:rPr>
+                <a:t>0.</a:t>
+              </a:r>
+              <a:r>
+                <a:rPr lang="en-GB" dirty="0" smtClean="0">
+                  <a:latin typeface="Inconsolata" panose="00000509000000000000" pitchFamily="49" charset="0"/>
+                </a:rPr>
+                <a:t>0</a:t>
+              </a:r>
+              <a:r>
+                <a:rPr lang="en-GB" dirty="0">
+                  <a:latin typeface="Inconsolata" panose="00000509000000000000" pitchFamily="49" charset="0"/>
+                </a:rPr>
+                <a:t>, </a:t>
+              </a:r>
+              <a:r>
+                <a:rPr lang="en-BE" dirty="0" smtClean="0">
+                  <a:latin typeface="Inconsolata" panose="00000509000000000000" pitchFamily="49" charset="0"/>
+                </a:rPr>
+                <a:t>0.</a:t>
+              </a:r>
+              <a:r>
+                <a:rPr lang="en-GB" dirty="0" smtClean="0">
+                  <a:latin typeface="Inconsolata" panose="00000509000000000000" pitchFamily="49" charset="0"/>
+                </a:rPr>
+                <a:t>0,</a:t>
+              </a:r>
+              <a:r>
+                <a:rPr lang="en-BE" dirty="0" smtClean="0">
+                  <a:latin typeface="Inconsolata" panose="00000509000000000000" pitchFamily="49" charset="0"/>
+                </a:rPr>
+                <a:t>...</a:t>
+              </a:r>
+              <a:r>
+                <a:rPr lang="en-GB" dirty="0" smtClean="0">
+                  <a:latin typeface="Inconsolata" panose="00000509000000000000" pitchFamily="49" charset="0"/>
+                </a:rPr>
+                <a:t>, </a:t>
+              </a:r>
+              <a:r>
+                <a:rPr lang="en-BE" dirty="0" smtClean="0">
+                  <a:latin typeface="Inconsolata" panose="00000509000000000000" pitchFamily="49" charset="0"/>
+                </a:rPr>
+                <a:t>0.951</a:t>
+              </a:r>
+              <a:r>
+                <a:rPr lang="en-GB" dirty="0" smtClean="0">
+                  <a:latin typeface="Inconsolata" panose="00000509000000000000" pitchFamily="49" charset="0"/>
+                </a:rPr>
+                <a:t>, </a:t>
+              </a:r>
+              <a:r>
+                <a:rPr lang="en-BE" dirty="0" smtClean="0">
+                  <a:latin typeface="Inconsolata" panose="00000509000000000000" pitchFamily="49" charset="0"/>
+                </a:rPr>
+                <a:t>0.533</a:t>
+              </a:r>
+              <a:r>
+                <a:rPr lang="nl-NL" dirty="0" smtClean="0">
+                  <a:latin typeface="Inconsolata" panose="00000509000000000000" pitchFamily="49" charset="0"/>
+                </a:rPr>
+                <a:t>,</a:t>
+              </a:r>
+              <a:r>
+                <a:rPr lang="en-BE" dirty="0" smtClean="0">
+                  <a:latin typeface="Inconsolata" panose="00000509000000000000" pitchFamily="49" charset="0"/>
+                </a:rPr>
+                <a:t>...,</a:t>
+              </a:r>
+              <a:r>
+                <a:rPr lang="nl-NL" dirty="0" smtClean="0">
+                  <a:latin typeface="Inconsolata" panose="00000509000000000000" pitchFamily="49" charset="0"/>
+                </a:rPr>
+                <a:t> </a:t>
+              </a:r>
+              <a:r>
+                <a:rPr lang="en-BE" dirty="0" smtClean="0">
+                  <a:latin typeface="Inconsolata" panose="00000509000000000000" pitchFamily="49" charset="0"/>
+                </a:rPr>
+                <a:t>0.</a:t>
+              </a:r>
+              <a:r>
+                <a:rPr lang="nl-NL" dirty="0" smtClean="0">
+                  <a:latin typeface="Inconsolata" panose="00000509000000000000" pitchFamily="49" charset="0"/>
+                </a:rPr>
+                <a:t>0</a:t>
+              </a:r>
+              <a:r>
+                <a:rPr lang="nl-NL" dirty="0">
+                  <a:latin typeface="Inconsolata" panose="00000509000000000000" pitchFamily="49" charset="0"/>
+                </a:rPr>
+                <a:t>, </a:t>
+              </a:r>
+              <a:r>
+                <a:rPr lang="en-BE" dirty="0" smtClean="0">
+                  <a:latin typeface="Inconsolata" panose="00000509000000000000" pitchFamily="49" charset="0"/>
+                </a:rPr>
+                <a:t>0.</a:t>
+              </a:r>
+              <a:r>
+                <a:rPr lang="nl-NL" dirty="0" smtClean="0">
+                  <a:latin typeface="Inconsolata" panose="00000509000000000000" pitchFamily="49" charset="0"/>
+                </a:rPr>
+                <a:t>0</a:t>
+              </a:r>
+              <a:r>
+                <a:rPr lang="en-BE" dirty="0" smtClean="0">
+                  <a:latin typeface="Inconsolata" panose="00000509000000000000" pitchFamily="49" charset="0"/>
+                </a:rPr>
+                <a:t>]</a:t>
+              </a:r>
+              <a:r>
+                <a:rPr lang="nl-NL" dirty="0" smtClean="0">
+                  <a:latin typeface="Inconsolata" panose="00000509000000000000" pitchFamily="49" charset="0"/>
+                </a:rPr>
+                <a:t>], dtype=</a:t>
+              </a:r>
+              <a:r>
+                <a:rPr lang="en-BE" dirty="0" smtClean="0">
+                  <a:latin typeface="Inconsolata" panose="00000509000000000000" pitchFamily="49" charset="0"/>
+                </a:rPr>
+                <a:t>float32</a:t>
+              </a:r>
+              <a:r>
+                <a:rPr lang="nl-NL" dirty="0" smtClean="0">
+                  <a:latin typeface="Inconsolata" panose="00000509000000000000" pitchFamily="49" charset="0"/>
+                </a:rPr>
+                <a:t>)</a:t>
+              </a:r>
+              <a:endParaRPr lang="en-US" dirty="0">
+                <a:latin typeface="Inconsolata" panose="00000509000000000000" pitchFamily="49" charset="0"/>
+              </a:endParaRPr>
+            </a:p>
+          </p:txBody>
+        </p:sp>
+        <p:sp>
+          <p:nvSpPr>
+            <p:cNvPr id="8" name="Down Arrow 7"/>
+            <p:cNvSpPr/>
+            <p:nvPr/>
+          </p:nvSpPr>
+          <p:spPr>
+            <a:xfrm>
+              <a:off x="7725178" y="3762102"/>
+              <a:ext cx="557349" cy="870858"/>
+            </a:xfrm>
+            <a:prstGeom prst="downArrow">
+              <a:avLst/>
+            </a:prstGeom>
+          </p:spPr>
+          <p:style>
+            <a:lnRef idx="2">
+              <a:schemeClr val="accent1">
+                <a:shade val="50000"/>
+              </a:schemeClr>
+            </a:lnRef>
+            <a:fillRef idx="1">
+              <a:schemeClr val="accent1"/>
+            </a:fillRef>
+            <a:effectRef idx="0">
+              <a:schemeClr val="accent1"/>
+            </a:effectRef>
+            <a:fontRef idx="minor">
+              <a:schemeClr val="lt1"/>
+            </a:fontRef>
+          </p:style>
+          <p:txBody>
+            <a:bodyPr rtlCol="0" anchor="ctr"/>
+            <a:lstStyle/>
+            <a:p>
+              <a:pPr algn="ctr"/>
+              <a:endParaRPr lang="en-US"/>
+            </a:p>
+          </p:txBody>
+        </p:sp>
+      </p:grpSp>
+      <p:sp>
+        <p:nvSpPr>
+          <p:cNvPr id="10" name="TextBox 9"/>
+          <p:cNvSpPr txBox="1"/>
+          <p:nvPr/>
+        </p:nvSpPr>
+        <p:spPr>
+          <a:xfrm>
+            <a:off x="8610940" y="2671377"/>
+            <a:ext cx="330540" cy="461665"/>
+          </a:xfrm>
+          <a:prstGeom prst="rect">
+            <a:avLst/>
+          </a:prstGeom>
+          <a:noFill/>
+        </p:spPr>
+        <p:txBody>
+          <a:bodyPr wrap="none" rtlCol="0">
+            <a:spAutoFit/>
+          </a:bodyPr>
+          <a:lstStyle/>
+          <a:p>
+            <a:r>
+              <a:rPr lang="en-BE" sz="2400" dirty="0" smtClean="0"/>
+              <a:t>5</a:t>
+            </a:r>
+            <a:endParaRPr lang="en-US" sz="2400" dirty="0"/>
+          </a:p>
+        </p:txBody>
+      </p:sp>
+      <p:grpSp>
+        <p:nvGrpSpPr>
+          <p:cNvPr id="13" name="Group 12"/>
+          <p:cNvGrpSpPr/>
+          <p:nvPr/>
+        </p:nvGrpSpPr>
+        <p:grpSpPr>
+          <a:xfrm>
+            <a:off x="5709687" y="3199712"/>
+            <a:ext cx="6186309" cy="1295504"/>
+            <a:chOff x="4910695" y="3963194"/>
+            <a:chExt cx="6186309" cy="1295504"/>
+          </a:xfrm>
+        </p:grpSpPr>
+        <p:sp>
+          <p:nvSpPr>
+            <p:cNvPr id="11" name="TextBox 10"/>
+            <p:cNvSpPr txBox="1"/>
+            <p:nvPr/>
+          </p:nvSpPr>
+          <p:spPr>
+            <a:xfrm>
+              <a:off x="4910695" y="4889366"/>
+              <a:ext cx="6186309" cy="369332"/>
+            </a:xfrm>
+            <a:prstGeom prst="rect">
+              <a:avLst/>
+            </a:prstGeom>
+            <a:noFill/>
+          </p:spPr>
+          <p:txBody>
+            <a:bodyPr wrap="none" rtlCol="0">
+              <a:spAutoFit/>
+            </a:bodyPr>
+            <a:lstStyle/>
+            <a:p>
+              <a:r>
+                <a:rPr lang="en-GB" dirty="0">
+                  <a:latin typeface="Inconsolata" panose="00000509000000000000" pitchFamily="49" charset="0"/>
+                </a:rPr>
+                <a:t>array([ </a:t>
+              </a:r>
+              <a:r>
+                <a:rPr lang="en-GB" dirty="0" smtClean="0">
+                  <a:latin typeface="Inconsolata" panose="00000509000000000000" pitchFamily="49" charset="0"/>
+                </a:rPr>
+                <a:t>0</a:t>
+              </a:r>
+              <a:r>
+                <a:rPr lang="en-GB" dirty="0">
+                  <a:latin typeface="Inconsolata" panose="00000509000000000000" pitchFamily="49" charset="0"/>
+                </a:rPr>
+                <a:t>, </a:t>
+              </a:r>
+              <a:r>
+                <a:rPr lang="en-GB" dirty="0" smtClean="0">
+                  <a:latin typeface="Inconsolata" panose="00000509000000000000" pitchFamily="49" charset="0"/>
+                </a:rPr>
+                <a:t>0</a:t>
+              </a:r>
+              <a:r>
+                <a:rPr lang="en-GB" dirty="0">
+                  <a:latin typeface="Inconsolata" panose="00000509000000000000" pitchFamily="49" charset="0"/>
+                </a:rPr>
+                <a:t>, </a:t>
+              </a:r>
+              <a:r>
+                <a:rPr lang="en-BE" dirty="0" smtClean="0">
+                  <a:latin typeface="Inconsolata" panose="00000509000000000000" pitchFamily="49" charset="0"/>
+                </a:rPr>
+                <a:t>0, 0, 0, 1, 0, 0, 0, 0</a:t>
+              </a:r>
+              <a:r>
+                <a:rPr lang="nl-NL" dirty="0" smtClean="0">
+                  <a:latin typeface="Inconsolata" panose="00000509000000000000" pitchFamily="49" charset="0"/>
+                </a:rPr>
+                <a:t>], </a:t>
+              </a:r>
+              <a:r>
+                <a:rPr lang="nl-NL" dirty="0">
+                  <a:latin typeface="Inconsolata" panose="00000509000000000000" pitchFamily="49" charset="0"/>
+                </a:rPr>
+                <a:t>dtype=uint8)</a:t>
+              </a:r>
+              <a:endParaRPr lang="en-US" dirty="0">
+                <a:latin typeface="Inconsolata" panose="00000509000000000000" pitchFamily="49" charset="0"/>
+              </a:endParaRPr>
+            </a:p>
+          </p:txBody>
+        </p:sp>
+        <p:sp>
+          <p:nvSpPr>
+            <p:cNvPr id="12" name="Down Arrow 11"/>
+            <p:cNvSpPr/>
+            <p:nvPr/>
+          </p:nvSpPr>
+          <p:spPr>
+            <a:xfrm>
+              <a:off x="7725176" y="3963194"/>
+              <a:ext cx="557349" cy="870858"/>
+            </a:xfrm>
+            <a:prstGeom prst="downArrow">
+              <a:avLst/>
+            </a:prstGeom>
+          </p:spPr>
+          <p:style>
+            <a:lnRef idx="2">
+              <a:schemeClr val="accent1">
+                <a:shade val="50000"/>
+              </a:schemeClr>
+            </a:lnRef>
+            <a:fillRef idx="1">
+              <a:schemeClr val="accent1"/>
+            </a:fillRef>
+            <a:effectRef idx="0">
+              <a:schemeClr val="accent1"/>
+            </a:effectRef>
+            <a:fontRef idx="minor">
+              <a:schemeClr val="lt1"/>
+            </a:fontRef>
+          </p:style>
+          <p:txBody>
+            <a:bodyPr rtlCol="0" anchor="ctr"/>
+            <a:lstStyle/>
+            <a:p>
+              <a:pPr algn="ctr"/>
+              <a:endParaRPr lang="en-US"/>
+            </a:p>
+          </p:txBody>
+        </p:sp>
+      </p:grpSp>
+      <p:sp>
+        <p:nvSpPr>
+          <p:cNvPr id="14" name="TextBox 13"/>
+          <p:cNvSpPr txBox="1"/>
+          <p:nvPr/>
+        </p:nvSpPr>
+        <p:spPr>
+          <a:xfrm>
+            <a:off x="5347063" y="4885782"/>
+            <a:ext cx="5404043" cy="369332"/>
+          </a:xfrm>
+          <a:prstGeom prst="rect">
+            <a:avLst/>
+          </a:prstGeom>
+        </p:spPr>
+        <p:style>
+          <a:lnRef idx="1">
+            <a:schemeClr val="accent2"/>
+          </a:lnRef>
+          <a:fillRef idx="2">
+            <a:schemeClr val="accent2"/>
+          </a:fillRef>
+          <a:effectRef idx="1">
+            <a:schemeClr val="accent2"/>
+          </a:effectRef>
+          <a:fontRef idx="minor">
+            <a:schemeClr val="dk1"/>
+          </a:fontRef>
+        </p:style>
+        <p:txBody>
+          <a:bodyPr wrap="none" rtlCol="0">
+            <a:spAutoFit/>
+          </a:bodyPr>
+          <a:lstStyle/>
+          <a:p>
+            <a:r>
+              <a:rPr lang="en-BE" dirty="0" smtClean="0"/>
+              <a:t>Convolutional neural network: </a:t>
+            </a:r>
+            <a:r>
+              <a:rPr lang="en-BE" dirty="0" smtClean="0">
+                <a:latin typeface="Inconsolata" panose="00000509000000000000" pitchFamily="49" charset="0"/>
+              </a:rPr>
+              <a:t>060_mnist_cnn.ipynb</a:t>
+            </a:r>
+            <a:endParaRPr lang="en-US" dirty="0">
+              <a:latin typeface="Inconsolata" panose="00000509000000000000" pitchFamily="49" charset="0"/>
+            </a:endParaRPr>
+          </a:p>
+        </p:txBody>
+      </p:sp>
+    </p:spTree>
+    <p:extLst>
+      <p:ext uri="{BB962C8B-B14F-4D97-AF65-F5344CB8AC3E}">
+        <p14:creationId xmlns:p14="http://schemas.microsoft.com/office/powerpoint/2010/main" val="2648061390"/>
+      </p:ext>
+    </p:extLst>
+  </p:cSld>
+  <p:clrMapOvr>
+    <a:masterClrMapping/>
+  </p:clrMapOvr>
+  <p:timing>
+    <p:tnLst>
+      <p:par>
+        <p:cTn id="1" dur="indefinite" restart="never" nodeType="tmRoot"/>
+      </p:par>
+    </p:tnLst>
   </p:timing>
 </p:sld>
 </file>

</xml_diff>

<commit_message>
Start slides on RNNs
</commit_message>
<xml_diff>
--- a/prace_days_ml_2019.pptx
+++ b/prace_days_ml_2019.pptx
@@ -5,7 +5,7 @@
     <p:sldMasterId id="2147483660" r:id="rId1"/>
   </p:sldMasterIdLst>
   <p:notesMasterIdLst>
-    <p:notesMasterId r:id="rId28"/>
+    <p:notesMasterId r:id="rId31"/>
   </p:notesMasterIdLst>
   <p:sldIdLst>
     <p:sldId id="257" r:id="rId2"/>
@@ -34,6 +34,9 @@
     <p:sldId id="278" r:id="rId25"/>
     <p:sldId id="269" r:id="rId26"/>
     <p:sldId id="282" r:id="rId27"/>
+    <p:sldId id="283" r:id="rId28"/>
+    <p:sldId id="285" r:id="rId29"/>
+    <p:sldId id="284" r:id="rId30"/>
   </p:sldIdLst>
   <p:sldSz cx="12192000" cy="6858000"/>
   <p:notesSz cx="6858000" cy="9144000"/>
@@ -14246,7 +14249,9 @@
         </p:nvSpPr>
         <p:spPr/>
         <p:txBody>
-          <a:bodyPr/>
+          <a:bodyPr>
+            <a:normAutofit lnSpcReduction="10000"/>
+          </a:bodyPr>
           <a:lstStyle/>
           <a:p>
             <a:r>
@@ -14307,6 +14312,14 @@
               <a:rPr lang="en-BE" dirty="0" smtClean="0"/>
               <a:t>drop-out</a:t>
             </a:r>
+          </a:p>
+          <a:p>
+            <a:pPr lvl="1"/>
+            <a:r>
+              <a:rPr lang="en-BE" dirty="0" smtClean="0"/>
+              <a:t>recurrent</a:t>
+            </a:r>
+            <a:endParaRPr lang="en-BE" dirty="0" smtClean="0"/>
           </a:p>
           <a:p>
             <a:pPr lvl="1"/>
@@ -17829,6 +17842,1187 @@
 </p:sld>
 </file>
 
+<file path=ppt/slides/slide27.xml><?xml version="1.0" encoding="utf-8"?>
+<p:sld xmlns:a="http://schemas.openxmlformats.org/drawingml/2006/main" xmlns:r="http://schemas.openxmlformats.org/officeDocument/2006/relationships" xmlns:p="http://schemas.openxmlformats.org/presentationml/2006/main">
+  <p:cSld>
+    <p:spTree>
+      <p:nvGrpSpPr>
+        <p:cNvPr id="1" name=""/>
+        <p:cNvGrpSpPr/>
+        <p:nvPr/>
+      </p:nvGrpSpPr>
+      <p:grpSpPr>
+        <a:xfrm>
+          <a:off x="0" y="0"/>
+          <a:ext cx="0" cy="0"/>
+          <a:chOff x="0" y="0"/>
+          <a:chExt cx="0" cy="0"/>
+        </a:xfrm>
+      </p:grpSpPr>
+      <p:sp>
+        <p:nvSpPr>
+          <p:cNvPr id="2" name="Title 1"/>
+          <p:cNvSpPr>
+            <a:spLocks noGrp="1"/>
+          </p:cNvSpPr>
+          <p:nvPr>
+            <p:ph type="title"/>
+          </p:nvPr>
+        </p:nvSpPr>
+        <p:spPr/>
+        <p:txBody>
+          <a:bodyPr/>
+          <a:lstStyle/>
+          <a:p>
+            <a:r>
+              <a:rPr lang="en-BE" dirty="0" smtClean="0"/>
+              <a:t>Task: </a:t>
+            </a:r>
+            <a:r>
+              <a:rPr lang="en-BE" dirty="0" smtClean="0"/>
+              <a:t>sentiment classification</a:t>
+            </a:r>
+            <a:endParaRPr lang="en-US" dirty="0"/>
+          </a:p>
+        </p:txBody>
+      </p:sp>
+      <p:sp>
+        <p:nvSpPr>
+          <p:cNvPr id="3" name="Content Placeholder 2"/>
+          <p:cNvSpPr>
+            <a:spLocks noGrp="1"/>
+          </p:cNvSpPr>
+          <p:nvPr>
+            <p:ph idx="1"/>
+          </p:nvPr>
+        </p:nvSpPr>
+        <p:spPr/>
+        <p:txBody>
+          <a:bodyPr/>
+          <a:lstStyle/>
+          <a:p>
+            <a:r>
+              <a:rPr lang="en-BE" dirty="0" smtClean="0"/>
+              <a:t>Input data</a:t>
+            </a:r>
+          </a:p>
+          <a:p>
+            <a:pPr lvl="1"/>
+            <a:r>
+              <a:rPr lang="en-BE" dirty="0" smtClean="0"/>
+              <a:t>movie review (English)</a:t>
+            </a:r>
+            <a:endParaRPr lang="en-BE" dirty="0" smtClean="0"/>
+          </a:p>
+          <a:p>
+            <a:r>
+              <a:rPr lang="en-BE" dirty="0" smtClean="0"/>
+              <a:t>Output data</a:t>
+            </a:r>
+          </a:p>
+          <a:p>
+            <a:pPr lvl="1"/>
+            <a:endParaRPr lang="en-BE" dirty="0" smtClean="0"/>
+          </a:p>
+          <a:p>
+            <a:r>
+              <a:rPr lang="en-BE" dirty="0"/>
+              <a:t>T</a:t>
+            </a:r>
+            <a:r>
+              <a:rPr lang="en-BE" dirty="0" smtClean="0"/>
+              <a:t>raining </a:t>
+            </a:r>
+            <a:r>
+              <a:rPr lang="en-BE" dirty="0" smtClean="0"/>
+              <a:t>examples</a:t>
+            </a:r>
+          </a:p>
+          <a:p>
+            <a:r>
+              <a:rPr lang="en-BE" dirty="0" smtClean="0"/>
+              <a:t>Test </a:t>
+            </a:r>
+            <a:r>
+              <a:rPr lang="en-BE" dirty="0" smtClean="0"/>
+              <a:t>examples</a:t>
+            </a:r>
+          </a:p>
+          <a:p>
+            <a:endParaRPr lang="en-US" dirty="0"/>
+          </a:p>
+        </p:txBody>
+      </p:sp>
+      <p:sp>
+        <p:nvSpPr>
+          <p:cNvPr id="4" name="Slide Number Placeholder 3"/>
+          <p:cNvSpPr>
+            <a:spLocks noGrp="1"/>
+          </p:cNvSpPr>
+          <p:nvPr>
+            <p:ph type="sldNum" sz="quarter" idx="12"/>
+          </p:nvPr>
+        </p:nvSpPr>
+        <p:spPr/>
+        <p:txBody>
+          <a:bodyPr/>
+          <a:lstStyle/>
+          <a:p>
+            <a:fld id="{5A209D72-2E9D-49B0-8977-41DCCC66C0BB}" type="slidenum">
+              <a:rPr lang="nl-BE" smtClean="0"/>
+              <a:t>27</a:t>
+            </a:fld>
+            <a:endParaRPr lang="nl-BE"/>
+          </a:p>
+        </p:txBody>
+      </p:sp>
+      <p:sp>
+        <p:nvSpPr>
+          <p:cNvPr id="6" name="TextBox 5"/>
+          <p:cNvSpPr txBox="1"/>
+          <p:nvPr/>
+        </p:nvSpPr>
+        <p:spPr>
+          <a:xfrm>
+            <a:off x="1158240" y="5408023"/>
+            <a:ext cx="5489003" cy="369332"/>
+          </a:xfrm>
+          <a:prstGeom prst="rect">
+            <a:avLst/>
+          </a:prstGeom>
+        </p:spPr>
+        <p:style>
+          <a:lnRef idx="1">
+            <a:schemeClr val="accent2"/>
+          </a:lnRef>
+          <a:fillRef idx="2">
+            <a:schemeClr val="accent2"/>
+          </a:fillRef>
+          <a:effectRef idx="1">
+            <a:schemeClr val="accent2"/>
+          </a:effectRef>
+          <a:fontRef idx="minor">
+            <a:schemeClr val="dk1"/>
+          </a:fontRef>
+        </p:style>
+        <p:txBody>
+          <a:bodyPr wrap="none" rtlCol="0">
+            <a:spAutoFit/>
+          </a:bodyPr>
+          <a:lstStyle/>
+          <a:p>
+            <a:r>
+              <a:rPr lang="en-BE" dirty="0" smtClean="0"/>
+              <a:t>Explore the data: </a:t>
+            </a:r>
+            <a:r>
+              <a:rPr lang="en-BE" dirty="0" smtClean="0">
+                <a:latin typeface="Inconsolata" panose="00000509000000000000" pitchFamily="49" charset="0"/>
+              </a:rPr>
+              <a:t>070_imdb_data_exploration.ipynb</a:t>
+            </a:r>
+            <a:endParaRPr lang="en-US" dirty="0">
+              <a:latin typeface="Inconsolata" panose="00000509000000000000" pitchFamily="49" charset="0"/>
+            </a:endParaRPr>
+          </a:p>
+        </p:txBody>
+      </p:sp>
+      <p:pic>
+        <p:nvPicPr>
+          <p:cNvPr id="2050" name="Picture 2" descr="Image result for happy smiley"/>
+          <p:cNvPicPr>
+            <a:picLocks noChangeAspect="1" noChangeArrowheads="1"/>
+          </p:cNvPicPr>
+          <p:nvPr/>
+        </p:nvPicPr>
+        <p:blipFill rotWithShape="1">
+          <a:blip r:embed="rId2" cstate="print">
+            <a:extLst>
+              <a:ext uri="{28A0092B-C50C-407E-A947-70E740481C1C}">
+                <a14:useLocalDpi xmlns:a14="http://schemas.microsoft.com/office/drawing/2010/main" val="0"/>
+              </a:ext>
+            </a:extLst>
+          </a:blip>
+          <a:srcRect b="8906"/>
+          <a:stretch/>
+        </p:blipFill>
+        <p:spPr bwMode="auto">
+          <a:xfrm>
+            <a:off x="1854925" y="3217158"/>
+            <a:ext cx="432344" cy="449152"/>
+          </a:xfrm>
+          <a:prstGeom prst="rect">
+            <a:avLst/>
+          </a:prstGeom>
+          <a:noFill/>
+          <a:extLst>
+            <a:ext uri="{909E8E84-426E-40DD-AFC4-6F175D3DCCD1}">
+              <a14:hiddenFill xmlns:a14="http://schemas.microsoft.com/office/drawing/2010/main">
+                <a:solidFill>
+                  <a:srgbClr val="FFFFFF"/>
+                </a:solidFill>
+              </a14:hiddenFill>
+            </a:ext>
+          </a:extLst>
+        </p:spPr>
+      </p:pic>
+      <p:pic>
+        <p:nvPicPr>
+          <p:cNvPr id="2052" name="Picture 4" descr="Image result for sad smiley"/>
+          <p:cNvPicPr>
+            <a:picLocks noChangeAspect="1" noChangeArrowheads="1"/>
+          </p:cNvPicPr>
+          <p:nvPr/>
+        </p:nvPicPr>
+        <p:blipFill rotWithShape="1">
+          <a:blip r:embed="rId3" cstate="print">
+            <a:extLst>
+              <a:ext uri="{28A0092B-C50C-407E-A947-70E740481C1C}">
+                <a14:useLocalDpi xmlns:a14="http://schemas.microsoft.com/office/drawing/2010/main" val="0"/>
+              </a:ext>
+            </a:extLst>
+          </a:blip>
+          <a:srcRect l="5063" t="5881" r="7637" b="14709"/>
+          <a:stretch/>
+        </p:blipFill>
+        <p:spPr bwMode="auto">
+          <a:xfrm>
+            <a:off x="2621280" y="3213464"/>
+            <a:ext cx="465349" cy="453250"/>
+          </a:xfrm>
+          <a:prstGeom prst="rect">
+            <a:avLst/>
+          </a:prstGeom>
+          <a:noFill/>
+          <a:extLst>
+            <a:ext uri="{909E8E84-426E-40DD-AFC4-6F175D3DCCD1}">
+              <a14:hiddenFill xmlns:a14="http://schemas.microsoft.com/office/drawing/2010/main">
+                <a:solidFill>
+                  <a:srgbClr val="FFFFFF"/>
+                </a:solidFill>
+              </a14:hiddenFill>
+            </a:ext>
+          </a:extLst>
+        </p:spPr>
+      </p:pic>
+      <p:sp>
+        <p:nvSpPr>
+          <p:cNvPr id="7" name="TextBox 6"/>
+          <p:cNvSpPr txBox="1"/>
+          <p:nvPr/>
+        </p:nvSpPr>
+        <p:spPr>
+          <a:xfrm>
+            <a:off x="2228091" y="3047277"/>
+            <a:ext cx="452368" cy="769441"/>
+          </a:xfrm>
+          <a:prstGeom prst="rect">
+            <a:avLst/>
+          </a:prstGeom>
+          <a:noFill/>
+        </p:spPr>
+        <p:txBody>
+          <a:bodyPr wrap="none" rtlCol="0">
+            <a:spAutoFit/>
+          </a:bodyPr>
+          <a:lstStyle/>
+          <a:p>
+            <a:r>
+              <a:rPr lang="en-BE" sz="4400" dirty="0" smtClean="0"/>
+              <a:t>/</a:t>
+            </a:r>
+            <a:endParaRPr lang="en-US" sz="4400" dirty="0"/>
+          </a:p>
+        </p:txBody>
+      </p:sp>
+      <p:sp>
+        <p:nvSpPr>
+          <p:cNvPr id="8" name="TextBox 7"/>
+          <p:cNvSpPr txBox="1"/>
+          <p:nvPr/>
+        </p:nvSpPr>
+        <p:spPr>
+          <a:xfrm>
+            <a:off x="4568927" y="1898069"/>
+            <a:ext cx="7293336" cy="2616087"/>
+          </a:xfrm>
+          <a:prstGeom prst="rect">
+            <a:avLst/>
+          </a:prstGeom>
+          <a:solidFill>
+            <a:schemeClr val="accent3">
+              <a:lumMod val="20000"/>
+              <a:lumOff val="80000"/>
+            </a:schemeClr>
+          </a:solidFill>
+          <a:ln w="38100">
+            <a:solidFill>
+              <a:schemeClr val="accent1"/>
+            </a:solidFill>
+          </a:ln>
+        </p:spPr>
+        <p:txBody>
+          <a:bodyPr wrap="square" rtlCol="0">
+            <a:spAutoFit/>
+          </a:bodyPr>
+          <a:lstStyle/>
+          <a:p>
+            <a:r>
+              <a:rPr lang="en-GB" dirty="0">
+                <a:latin typeface="Inconsolata" panose="00000509000000000000" pitchFamily="49" charset="0"/>
+              </a:rPr>
+              <a:t>&lt;start&gt; this film was just brilliant casting </a:t>
+            </a:r>
+            <a:r>
+              <a:rPr lang="en-GB" dirty="0" smtClean="0">
+                <a:latin typeface="Inconsolata" panose="00000509000000000000" pitchFamily="49" charset="0"/>
+              </a:rPr>
+              <a:t>location</a:t>
+            </a:r>
+            <a:endParaRPr lang="en-BE" dirty="0" smtClean="0">
+              <a:latin typeface="Inconsolata" panose="00000509000000000000" pitchFamily="49" charset="0"/>
+            </a:endParaRPr>
+          </a:p>
+          <a:p>
+            <a:r>
+              <a:rPr lang="en-GB" dirty="0" smtClean="0">
+                <a:latin typeface="Inconsolata" panose="00000509000000000000" pitchFamily="49" charset="0"/>
+              </a:rPr>
+              <a:t>scenery </a:t>
+            </a:r>
+            <a:r>
+              <a:rPr lang="en-GB" dirty="0">
+                <a:latin typeface="Inconsolata" panose="00000509000000000000" pitchFamily="49" charset="0"/>
+              </a:rPr>
+              <a:t>story direction everyone's really suited the </a:t>
+            </a:r>
+            <a:r>
+              <a:rPr lang="en-GB" dirty="0" smtClean="0">
+                <a:latin typeface="Inconsolata" panose="00000509000000000000" pitchFamily="49" charset="0"/>
+              </a:rPr>
+              <a:t>part</a:t>
+            </a:r>
+            <a:endParaRPr lang="en-BE" dirty="0" smtClean="0">
+              <a:latin typeface="Inconsolata" panose="00000509000000000000" pitchFamily="49" charset="0"/>
+            </a:endParaRPr>
+          </a:p>
+          <a:p>
+            <a:r>
+              <a:rPr lang="en-GB" dirty="0" smtClean="0">
+                <a:latin typeface="Inconsolata" panose="00000509000000000000" pitchFamily="49" charset="0"/>
+              </a:rPr>
+              <a:t>they </a:t>
+            </a:r>
+            <a:r>
+              <a:rPr lang="en-GB" dirty="0">
+                <a:latin typeface="Inconsolata" panose="00000509000000000000" pitchFamily="49" charset="0"/>
+              </a:rPr>
+              <a:t>played and you could just imagine being there </a:t>
+            </a:r>
+            <a:r>
+              <a:rPr lang="en-GB" dirty="0" smtClean="0">
+                <a:latin typeface="Inconsolata" panose="00000509000000000000" pitchFamily="49" charset="0"/>
+              </a:rPr>
+              <a:t>Robert</a:t>
+            </a:r>
+            <a:endParaRPr lang="en-BE" dirty="0" smtClean="0">
+              <a:latin typeface="Inconsolata" panose="00000509000000000000" pitchFamily="49" charset="0"/>
+            </a:endParaRPr>
+          </a:p>
+          <a:p>
+            <a:r>
+              <a:rPr lang="en-GB" dirty="0" err="1" smtClean="0">
+                <a:latin typeface="Inconsolata" panose="00000509000000000000" pitchFamily="49" charset="0"/>
+              </a:rPr>
+              <a:t>redford's</a:t>
+            </a:r>
+            <a:r>
+              <a:rPr lang="en-GB" dirty="0" smtClean="0">
+                <a:latin typeface="Inconsolata" panose="00000509000000000000" pitchFamily="49" charset="0"/>
+              </a:rPr>
+              <a:t> </a:t>
+            </a:r>
+            <a:r>
+              <a:rPr lang="en-GB" dirty="0">
+                <a:latin typeface="Inconsolata" panose="00000509000000000000" pitchFamily="49" charset="0"/>
+              </a:rPr>
+              <a:t>is an amazing actor and now the same being </a:t>
+            </a:r>
+            <a:r>
+              <a:rPr lang="en-GB" dirty="0" smtClean="0">
+                <a:latin typeface="Inconsolata" panose="00000509000000000000" pitchFamily="49" charset="0"/>
+              </a:rPr>
+              <a:t>director</a:t>
+            </a:r>
+            <a:endParaRPr lang="en-BE" dirty="0" smtClean="0">
+              <a:latin typeface="Inconsolata" panose="00000509000000000000" pitchFamily="49" charset="0"/>
+            </a:endParaRPr>
+          </a:p>
+          <a:p>
+            <a:r>
+              <a:rPr lang="en-GB" dirty="0" err="1" smtClean="0">
+                <a:latin typeface="Inconsolata" panose="00000509000000000000" pitchFamily="49" charset="0"/>
+              </a:rPr>
+              <a:t>norman's</a:t>
+            </a:r>
+            <a:r>
+              <a:rPr lang="en-GB" dirty="0" smtClean="0">
+                <a:latin typeface="Inconsolata" panose="00000509000000000000" pitchFamily="49" charset="0"/>
+              </a:rPr>
+              <a:t> </a:t>
+            </a:r>
+            <a:r>
+              <a:rPr lang="en-GB" dirty="0">
+                <a:latin typeface="Inconsolata" panose="00000509000000000000" pitchFamily="49" charset="0"/>
+              </a:rPr>
+              <a:t>father came from the same </a:t>
+            </a:r>
+            <a:r>
+              <a:rPr lang="en-GB" dirty="0" err="1">
+                <a:latin typeface="Inconsolata" panose="00000509000000000000" pitchFamily="49" charset="0"/>
+              </a:rPr>
+              <a:t>scottish</a:t>
+            </a:r>
+            <a:r>
+              <a:rPr lang="en-GB" dirty="0">
+                <a:latin typeface="Inconsolata" panose="00000509000000000000" pitchFamily="49" charset="0"/>
+              </a:rPr>
+              <a:t> island as </a:t>
+            </a:r>
+            <a:r>
+              <a:rPr lang="en-GB" dirty="0" smtClean="0">
+                <a:latin typeface="Inconsolata" panose="00000509000000000000" pitchFamily="49" charset="0"/>
+              </a:rPr>
+              <a:t>myself</a:t>
+            </a:r>
+            <a:endParaRPr lang="en-BE" dirty="0" smtClean="0">
+              <a:latin typeface="Inconsolata" panose="00000509000000000000" pitchFamily="49" charset="0"/>
+            </a:endParaRPr>
+          </a:p>
+          <a:p>
+            <a:r>
+              <a:rPr lang="en-GB" dirty="0" smtClean="0">
+                <a:latin typeface="Inconsolata" panose="00000509000000000000" pitchFamily="49" charset="0"/>
+              </a:rPr>
+              <a:t>so </a:t>
+            </a:r>
+            <a:r>
+              <a:rPr lang="en-GB" dirty="0" err="1">
+                <a:latin typeface="Inconsolata" panose="00000509000000000000" pitchFamily="49" charset="0"/>
+              </a:rPr>
+              <a:t>i</a:t>
+            </a:r>
+            <a:r>
+              <a:rPr lang="en-GB" dirty="0">
+                <a:latin typeface="Inconsolata" panose="00000509000000000000" pitchFamily="49" charset="0"/>
+              </a:rPr>
+              <a:t> loved the fact there was a real connection with </a:t>
+            </a:r>
+            <a:r>
+              <a:rPr lang="en-GB" dirty="0" smtClean="0">
+                <a:latin typeface="Inconsolata" panose="00000509000000000000" pitchFamily="49" charset="0"/>
+              </a:rPr>
+              <a:t>this</a:t>
+            </a:r>
+            <a:endParaRPr lang="en-BE" dirty="0" smtClean="0">
+              <a:latin typeface="Inconsolata" panose="00000509000000000000" pitchFamily="49" charset="0"/>
+            </a:endParaRPr>
+          </a:p>
+          <a:p>
+            <a:r>
+              <a:rPr lang="en-GB" dirty="0" smtClean="0">
+                <a:latin typeface="Inconsolata" panose="00000509000000000000" pitchFamily="49" charset="0"/>
+              </a:rPr>
+              <a:t>film </a:t>
+            </a:r>
+            <a:r>
+              <a:rPr lang="en-GB" dirty="0">
+                <a:latin typeface="Inconsolata" panose="00000509000000000000" pitchFamily="49" charset="0"/>
+              </a:rPr>
+              <a:t>the witty remarks throughout the film were great it </a:t>
+            </a:r>
+            <a:r>
+              <a:rPr lang="en-GB" dirty="0" smtClean="0">
+                <a:latin typeface="Inconsolata" panose="00000509000000000000" pitchFamily="49" charset="0"/>
+              </a:rPr>
+              <a:t>was</a:t>
+            </a:r>
+            <a:endParaRPr lang="en-BE" dirty="0" smtClean="0">
+              <a:latin typeface="Inconsolata" panose="00000509000000000000" pitchFamily="49" charset="0"/>
+            </a:endParaRPr>
+          </a:p>
+          <a:p>
+            <a:r>
+              <a:rPr lang="en-GB" dirty="0" smtClean="0">
+                <a:latin typeface="Inconsolata" panose="00000509000000000000" pitchFamily="49" charset="0"/>
+              </a:rPr>
+              <a:t>just </a:t>
+            </a:r>
+            <a:r>
+              <a:rPr lang="en-GB" dirty="0">
+                <a:latin typeface="Inconsolata" panose="00000509000000000000" pitchFamily="49" charset="0"/>
+              </a:rPr>
+              <a:t>brilliant so much that </a:t>
+            </a:r>
+            <a:r>
+              <a:rPr lang="en-GB" dirty="0" err="1">
+                <a:latin typeface="Inconsolata" panose="00000509000000000000" pitchFamily="49" charset="0"/>
+              </a:rPr>
+              <a:t>i</a:t>
+            </a:r>
+            <a:r>
+              <a:rPr lang="en-GB" dirty="0">
+                <a:latin typeface="Inconsolata" panose="00000509000000000000" pitchFamily="49" charset="0"/>
+              </a:rPr>
+              <a:t> bought the film as soon as </a:t>
+            </a:r>
+            <a:r>
+              <a:rPr lang="en-GB" dirty="0" smtClean="0">
+                <a:latin typeface="Inconsolata" panose="00000509000000000000" pitchFamily="49" charset="0"/>
+              </a:rPr>
+              <a:t>it</a:t>
+            </a:r>
+            <a:endParaRPr lang="en-BE" dirty="0" smtClean="0">
+              <a:latin typeface="Inconsolata" panose="00000509000000000000" pitchFamily="49" charset="0"/>
+            </a:endParaRPr>
+          </a:p>
+          <a:p>
+            <a:r>
+              <a:rPr lang="en-BE" dirty="0" smtClean="0">
+                <a:latin typeface="Inconsolata" panose="00000509000000000000" pitchFamily="49" charset="0"/>
+                <a:sym typeface="Symbol" panose="05050102010706020507" pitchFamily="18" charset="2"/>
+              </a:rPr>
+              <a:t></a:t>
+            </a:r>
+            <a:endParaRPr lang="en-BE" dirty="0" smtClean="0">
+              <a:latin typeface="Inconsolata" panose="00000509000000000000" pitchFamily="49" charset="0"/>
+            </a:endParaRPr>
+          </a:p>
+        </p:txBody>
+      </p:sp>
+    </p:spTree>
+    <p:extLst>
+      <p:ext uri="{BB962C8B-B14F-4D97-AF65-F5344CB8AC3E}">
+        <p14:creationId xmlns:p14="http://schemas.microsoft.com/office/powerpoint/2010/main" val="3126920248"/>
+      </p:ext>
+    </p:extLst>
+  </p:cSld>
+  <p:clrMapOvr>
+    <a:masterClrMapping/>
+  </p:clrMapOvr>
+  <p:timing>
+    <p:tnLst>
+      <p:par>
+        <p:cTn id="1" dur="indefinite" restart="never" nodeType="tmRoot"/>
+      </p:par>
+    </p:tnLst>
+  </p:timing>
+</p:sld>
+</file>
+
+<file path=ppt/slides/slide28.xml><?xml version="1.0" encoding="utf-8"?>
+<p:sld xmlns:a="http://schemas.openxmlformats.org/drawingml/2006/main" xmlns:r="http://schemas.openxmlformats.org/officeDocument/2006/relationships" xmlns:p="http://schemas.openxmlformats.org/presentationml/2006/main">
+  <p:cSld>
+    <p:spTree>
+      <p:nvGrpSpPr>
+        <p:cNvPr id="1" name=""/>
+        <p:cNvGrpSpPr/>
+        <p:nvPr/>
+      </p:nvGrpSpPr>
+      <p:grpSpPr>
+        <a:xfrm>
+          <a:off x="0" y="0"/>
+          <a:ext cx="0" cy="0"/>
+          <a:chOff x="0" y="0"/>
+          <a:chExt cx="0" cy="0"/>
+        </a:xfrm>
+      </p:grpSpPr>
+      <p:sp>
+        <p:nvSpPr>
+          <p:cNvPr id="2" name="Title 1"/>
+          <p:cNvSpPr>
+            <a:spLocks noGrp="1"/>
+          </p:cNvSpPr>
+          <p:nvPr>
+            <p:ph type="title"/>
+          </p:nvPr>
+        </p:nvSpPr>
+        <p:spPr/>
+        <p:txBody>
+          <a:bodyPr/>
+          <a:lstStyle/>
+          <a:p>
+            <a:r>
+              <a:rPr lang="en-BE" dirty="0" smtClean="0"/>
+              <a:t>Recurrent neural networks</a:t>
+            </a:r>
+            <a:endParaRPr lang="en-US" dirty="0"/>
+          </a:p>
+        </p:txBody>
+      </p:sp>
+      <p:sp>
+        <p:nvSpPr>
+          <p:cNvPr id="3" name="Content Placeholder 2"/>
+          <p:cNvSpPr>
+            <a:spLocks noGrp="1"/>
+          </p:cNvSpPr>
+          <p:nvPr>
+            <p:ph idx="1"/>
+          </p:nvPr>
+        </p:nvSpPr>
+        <p:spPr/>
+        <p:txBody>
+          <a:bodyPr/>
+          <a:lstStyle/>
+          <a:p>
+            <a:endParaRPr lang="en-US"/>
+          </a:p>
+        </p:txBody>
+      </p:sp>
+      <p:sp>
+        <p:nvSpPr>
+          <p:cNvPr id="4" name="Slide Number Placeholder 3"/>
+          <p:cNvSpPr>
+            <a:spLocks noGrp="1"/>
+          </p:cNvSpPr>
+          <p:nvPr>
+            <p:ph type="sldNum" sz="quarter" idx="12"/>
+          </p:nvPr>
+        </p:nvSpPr>
+        <p:spPr/>
+        <p:txBody>
+          <a:bodyPr/>
+          <a:lstStyle/>
+          <a:p>
+            <a:fld id="{5A209D72-2E9D-49B0-8977-41DCCC66C0BB}" type="slidenum">
+              <a:rPr lang="nl-BE" smtClean="0"/>
+              <a:t>28</a:t>
+            </a:fld>
+            <a:endParaRPr lang="nl-BE"/>
+          </a:p>
+        </p:txBody>
+      </p:sp>
+    </p:spTree>
+    <p:extLst>
+      <p:ext uri="{BB962C8B-B14F-4D97-AF65-F5344CB8AC3E}">
+        <p14:creationId xmlns:p14="http://schemas.microsoft.com/office/powerpoint/2010/main" val="2881926661"/>
+      </p:ext>
+    </p:extLst>
+  </p:cSld>
+  <p:clrMapOvr>
+    <a:masterClrMapping/>
+  </p:clrMapOvr>
+</p:sld>
+</file>
+
+<file path=ppt/slides/slide29.xml><?xml version="1.0" encoding="utf-8"?>
+<p:sld xmlns:a="http://schemas.openxmlformats.org/drawingml/2006/main" xmlns:r="http://schemas.openxmlformats.org/officeDocument/2006/relationships" xmlns:p="http://schemas.openxmlformats.org/presentationml/2006/main">
+  <p:cSld>
+    <p:spTree>
+      <p:nvGrpSpPr>
+        <p:cNvPr id="1" name=""/>
+        <p:cNvGrpSpPr/>
+        <p:nvPr/>
+      </p:nvGrpSpPr>
+      <p:grpSpPr>
+        <a:xfrm>
+          <a:off x="0" y="0"/>
+          <a:ext cx="0" cy="0"/>
+          <a:chOff x="0" y="0"/>
+          <a:chExt cx="0" cy="0"/>
+        </a:xfrm>
+      </p:grpSpPr>
+      <p:sp>
+        <p:nvSpPr>
+          <p:cNvPr id="2" name="Title 1"/>
+          <p:cNvSpPr>
+            <a:spLocks noGrp="1"/>
+          </p:cNvSpPr>
+          <p:nvPr>
+            <p:ph type="title"/>
+          </p:nvPr>
+        </p:nvSpPr>
+        <p:spPr/>
+        <p:txBody>
+          <a:bodyPr/>
+          <a:lstStyle/>
+          <a:p>
+            <a:r>
+              <a:rPr lang="en-US" dirty="0" smtClean="0"/>
+              <a:t>Caveat</a:t>
+            </a:r>
+            <a:endParaRPr lang="en-US" dirty="0"/>
+          </a:p>
+        </p:txBody>
+      </p:sp>
+      <p:sp>
+        <p:nvSpPr>
+          <p:cNvPr id="4" name="Content Placeholder 3"/>
+          <p:cNvSpPr>
+            <a:spLocks noGrp="1"/>
+          </p:cNvSpPr>
+          <p:nvPr>
+            <p:ph idx="1"/>
+          </p:nvPr>
+        </p:nvSpPr>
+        <p:spPr/>
+        <p:txBody>
+          <a:bodyPr/>
+          <a:lstStyle/>
+          <a:p>
+            <a:r>
+              <a:rPr lang="en-US" dirty="0" err="1" smtClean="0"/>
+              <a:t>InspiroBot</a:t>
+            </a:r>
+            <a:r>
+              <a:rPr lang="en-US" dirty="0"/>
+              <a:t> </a:t>
+            </a:r>
+            <a:r>
+              <a:rPr lang="en-US" sz="1500" dirty="0"/>
+              <a:t>(</a:t>
+            </a:r>
+            <a:r>
+              <a:rPr lang="en-US" sz="1500" dirty="0">
+                <a:hlinkClick r:id="rId2"/>
+              </a:rPr>
+              <a:t>http://inspirobot.me/</a:t>
+            </a:r>
+            <a:r>
+              <a:rPr lang="en-US" sz="1500" dirty="0"/>
+              <a:t>)</a:t>
+            </a:r>
+            <a:endParaRPr lang="en-US" dirty="0" smtClean="0"/>
+          </a:p>
+          <a:p>
+            <a:pPr lvl="1"/>
+            <a:r>
+              <a:rPr lang="en-US" sz="1500" i="1" dirty="0"/>
+              <a:t>"I am an artificial intelligence dedicated to generating unlimited amounts of unique inspirational quotes for endless enrichment of pointless human existence".</a:t>
+            </a:r>
+            <a:endParaRPr lang="en-US" i="1" dirty="0"/>
+          </a:p>
+        </p:txBody>
+      </p:sp>
+      <p:sp>
+        <p:nvSpPr>
+          <p:cNvPr id="3" name="Slide Number Placeholder 2"/>
+          <p:cNvSpPr>
+            <a:spLocks noGrp="1"/>
+          </p:cNvSpPr>
+          <p:nvPr>
+            <p:ph type="sldNum" sz="quarter" idx="12"/>
+          </p:nvPr>
+        </p:nvSpPr>
+        <p:spPr/>
+        <p:txBody>
+          <a:bodyPr/>
+          <a:lstStyle/>
+          <a:p>
+            <a:fld id="{5A209D72-2E9D-49B0-8977-41DCCC66C0BB}" type="slidenum">
+              <a:rPr lang="nl-BE" smtClean="0"/>
+              <a:t>29</a:t>
+            </a:fld>
+            <a:endParaRPr lang="nl-BE"/>
+          </a:p>
+        </p:txBody>
+      </p:sp>
+      <p:pic>
+        <p:nvPicPr>
+          <p:cNvPr id="5" name="Picture 4"/>
+          <p:cNvPicPr>
+            <a:picLocks noChangeAspect="1"/>
+          </p:cNvPicPr>
+          <p:nvPr/>
+        </p:nvPicPr>
+        <p:blipFill>
+          <a:blip r:embed="rId3">
+            <a:extLst>
+              <a:ext uri="{28A0092B-C50C-407E-A947-70E740481C1C}">
+                <a14:useLocalDpi xmlns:a14="http://schemas.microsoft.com/office/drawing/2010/main" val="0"/>
+              </a:ext>
+            </a:extLst>
+          </a:blip>
+          <a:stretch>
+            <a:fillRect/>
+          </a:stretch>
+        </p:blipFill>
+        <p:spPr>
+          <a:xfrm>
+            <a:off x="2984342" y="3266982"/>
+            <a:ext cx="2085696" cy="2085696"/>
+          </a:xfrm>
+          <a:prstGeom prst="rect">
+            <a:avLst/>
+          </a:prstGeom>
+        </p:spPr>
+      </p:pic>
+      <p:pic>
+        <p:nvPicPr>
+          <p:cNvPr id="6" name="Picture 5"/>
+          <p:cNvPicPr>
+            <a:picLocks noChangeAspect="1"/>
+          </p:cNvPicPr>
+          <p:nvPr/>
+        </p:nvPicPr>
+        <p:blipFill>
+          <a:blip r:embed="rId4" cstate="print">
+            <a:extLst>
+              <a:ext uri="{28A0092B-C50C-407E-A947-70E740481C1C}">
+                <a14:useLocalDpi xmlns:a14="http://schemas.microsoft.com/office/drawing/2010/main" val="0"/>
+              </a:ext>
+            </a:extLst>
+          </a:blip>
+          <a:stretch>
+            <a:fillRect/>
+          </a:stretch>
+        </p:blipFill>
+        <p:spPr>
+          <a:xfrm>
+            <a:off x="4972143" y="3645024"/>
+            <a:ext cx="2247714" cy="2247714"/>
+          </a:xfrm>
+          <a:prstGeom prst="rect">
+            <a:avLst/>
+          </a:prstGeom>
+        </p:spPr>
+      </p:pic>
+      <p:pic>
+        <p:nvPicPr>
+          <p:cNvPr id="7" name="Picture 6"/>
+          <p:cNvPicPr>
+            <a:picLocks noChangeAspect="1"/>
+          </p:cNvPicPr>
+          <p:nvPr/>
+        </p:nvPicPr>
+        <p:blipFill>
+          <a:blip r:embed="rId5">
+            <a:extLst>
+              <a:ext uri="{28A0092B-C50C-407E-A947-70E740481C1C}">
+                <a14:useLocalDpi xmlns:a14="http://schemas.microsoft.com/office/drawing/2010/main" val="0"/>
+              </a:ext>
+            </a:extLst>
+          </a:blip>
+          <a:stretch>
+            <a:fillRect/>
+          </a:stretch>
+        </p:blipFill>
+        <p:spPr>
+          <a:xfrm>
+            <a:off x="7104125" y="2996952"/>
+            <a:ext cx="2193708" cy="2193708"/>
+          </a:xfrm>
+          <a:prstGeom prst="rect">
+            <a:avLst/>
+          </a:prstGeom>
+        </p:spPr>
+      </p:pic>
+    </p:spTree>
+    <p:extLst>
+      <p:ext uri="{BB962C8B-B14F-4D97-AF65-F5344CB8AC3E}">
+        <p14:creationId xmlns:p14="http://schemas.microsoft.com/office/powerpoint/2010/main" val="3025047670"/>
+      </p:ext>
+    </p:extLst>
+  </p:cSld>
+  <p:clrMapOvr>
+    <a:masterClrMapping/>
+  </p:clrMapOvr>
+  <p:timing>
+    <p:tnLst>
+      <p:par>
+        <p:cTn id="1" dur="indefinite" restart="never" nodeType="tmRoot">
+          <p:childTnLst>
+            <p:seq concurrent="1" nextAc="seek">
+              <p:cTn id="2" dur="indefinite" nodeType="mainSeq">
+                <p:childTnLst>
+                  <p:par>
+                    <p:cTn id="3" fill="hold">
+                      <p:stCondLst>
+                        <p:cond delay="indefinite"/>
+                        <p:cond evt="onBegin" delay="0">
+                          <p:tn val="2"/>
+                        </p:cond>
+                      </p:stCondLst>
+                      <p:childTnLst>
+                        <p:par>
+                          <p:cTn id="4" fill="hold">
+                            <p:stCondLst>
+                              <p:cond delay="0"/>
+                            </p:stCondLst>
+                            <p:childTnLst>
+                              <p:par>
+                                <p:cTn id="5" presetID="1" presetClass="entr" presetSubtype="0" fill="hold" grpId="0" nodeType="withEffect">
+                                  <p:stCondLst>
+                                    <p:cond delay="0"/>
+                                  </p:stCondLst>
+                                  <p:childTnLst>
+                                    <p:set>
+                                      <p:cBhvr>
+                                        <p:cTn id="6" dur="1" fill="hold">
+                                          <p:stCondLst>
+                                            <p:cond delay="0"/>
+                                          </p:stCondLst>
+                                        </p:cTn>
+                                        <p:tgtEl>
+                                          <p:spTgt spid="4">
+                                            <p:txEl>
+                                              <p:pRg st="0" end="0"/>
+                                            </p:txEl>
+                                          </p:spTgt>
+                                        </p:tgtEl>
+                                        <p:attrNameLst>
+                                          <p:attrName>style.visibility</p:attrName>
+                                        </p:attrNameLst>
+                                      </p:cBhvr>
+                                      <p:to>
+                                        <p:strVal val="visible"/>
+                                      </p:to>
+                                    </p:set>
+                                  </p:childTnLst>
+                                </p:cTn>
+                              </p:par>
+                            </p:childTnLst>
+                          </p:cTn>
+                        </p:par>
+                      </p:childTnLst>
+                    </p:cTn>
+                  </p:par>
+                  <p:par>
+                    <p:cTn id="7" fill="hold">
+                      <p:stCondLst>
+                        <p:cond delay="indefinite"/>
+                      </p:stCondLst>
+                      <p:childTnLst>
+                        <p:par>
+                          <p:cTn id="8" fill="hold">
+                            <p:stCondLst>
+                              <p:cond delay="0"/>
+                            </p:stCondLst>
+                            <p:childTnLst>
+                              <p:par>
+                                <p:cTn id="9" presetID="1" presetClass="entr" presetSubtype="0" fill="hold" grpId="0" nodeType="clickEffect">
+                                  <p:stCondLst>
+                                    <p:cond delay="0"/>
+                                  </p:stCondLst>
+                                  <p:childTnLst>
+                                    <p:set>
+                                      <p:cBhvr>
+                                        <p:cTn id="10" dur="1" fill="hold">
+                                          <p:stCondLst>
+                                            <p:cond delay="0"/>
+                                          </p:stCondLst>
+                                        </p:cTn>
+                                        <p:tgtEl>
+                                          <p:spTgt spid="4">
+                                            <p:txEl>
+                                              <p:pRg st="1" end="1"/>
+                                            </p:txEl>
+                                          </p:spTgt>
+                                        </p:tgtEl>
+                                        <p:attrNameLst>
+                                          <p:attrName>style.visibility</p:attrName>
+                                        </p:attrNameLst>
+                                      </p:cBhvr>
+                                      <p:to>
+                                        <p:strVal val="visible"/>
+                                      </p:to>
+                                    </p:set>
+                                  </p:childTnLst>
+                                </p:cTn>
+                              </p:par>
+                            </p:childTnLst>
+                          </p:cTn>
+                        </p:par>
+                      </p:childTnLst>
+                    </p:cTn>
+                  </p:par>
+                  <p:par>
+                    <p:cTn id="11" fill="hold">
+                      <p:stCondLst>
+                        <p:cond delay="indefinite"/>
+                      </p:stCondLst>
+                      <p:childTnLst>
+                        <p:par>
+                          <p:cTn id="12" fill="hold">
+                            <p:stCondLst>
+                              <p:cond delay="0"/>
+                            </p:stCondLst>
+                            <p:childTnLst>
+                              <p:par>
+                                <p:cTn id="13" presetID="10" presetClass="entr" presetSubtype="0" fill="hold" nodeType="clickEffect">
+                                  <p:stCondLst>
+                                    <p:cond delay="0"/>
+                                  </p:stCondLst>
+                                  <p:childTnLst>
+                                    <p:set>
+                                      <p:cBhvr>
+                                        <p:cTn id="14" dur="1" fill="hold">
+                                          <p:stCondLst>
+                                            <p:cond delay="0"/>
+                                          </p:stCondLst>
+                                        </p:cTn>
+                                        <p:tgtEl>
+                                          <p:spTgt spid="5"/>
+                                        </p:tgtEl>
+                                        <p:attrNameLst>
+                                          <p:attrName>style.visibility</p:attrName>
+                                        </p:attrNameLst>
+                                      </p:cBhvr>
+                                      <p:to>
+                                        <p:strVal val="visible"/>
+                                      </p:to>
+                                    </p:set>
+                                    <p:animEffect transition="in" filter="fade">
+                                      <p:cBhvr>
+                                        <p:cTn id="15" dur="500"/>
+                                        <p:tgtEl>
+                                          <p:spTgt spid="5"/>
+                                        </p:tgtEl>
+                                      </p:cBhvr>
+                                    </p:animEffect>
+                                  </p:childTnLst>
+                                </p:cTn>
+                              </p:par>
+                            </p:childTnLst>
+                          </p:cTn>
+                        </p:par>
+                      </p:childTnLst>
+                    </p:cTn>
+                  </p:par>
+                  <p:par>
+                    <p:cTn id="16" fill="hold">
+                      <p:stCondLst>
+                        <p:cond delay="indefinite"/>
+                      </p:stCondLst>
+                      <p:childTnLst>
+                        <p:par>
+                          <p:cTn id="17" fill="hold">
+                            <p:stCondLst>
+                              <p:cond delay="0"/>
+                            </p:stCondLst>
+                            <p:childTnLst>
+                              <p:par>
+                                <p:cTn id="18" presetID="10" presetClass="entr" presetSubtype="0" fill="hold" nodeType="clickEffect">
+                                  <p:stCondLst>
+                                    <p:cond delay="0"/>
+                                  </p:stCondLst>
+                                  <p:childTnLst>
+                                    <p:set>
+                                      <p:cBhvr>
+                                        <p:cTn id="19" dur="1" fill="hold">
+                                          <p:stCondLst>
+                                            <p:cond delay="0"/>
+                                          </p:stCondLst>
+                                        </p:cTn>
+                                        <p:tgtEl>
+                                          <p:spTgt spid="6"/>
+                                        </p:tgtEl>
+                                        <p:attrNameLst>
+                                          <p:attrName>style.visibility</p:attrName>
+                                        </p:attrNameLst>
+                                      </p:cBhvr>
+                                      <p:to>
+                                        <p:strVal val="visible"/>
+                                      </p:to>
+                                    </p:set>
+                                    <p:animEffect transition="in" filter="fade">
+                                      <p:cBhvr>
+                                        <p:cTn id="20" dur="500"/>
+                                        <p:tgtEl>
+                                          <p:spTgt spid="6"/>
+                                        </p:tgtEl>
+                                      </p:cBhvr>
+                                    </p:animEffect>
+                                  </p:childTnLst>
+                                </p:cTn>
+                              </p:par>
+                            </p:childTnLst>
+                          </p:cTn>
+                        </p:par>
+                      </p:childTnLst>
+                    </p:cTn>
+                  </p:par>
+                  <p:par>
+                    <p:cTn id="21" fill="hold">
+                      <p:stCondLst>
+                        <p:cond delay="indefinite"/>
+                      </p:stCondLst>
+                      <p:childTnLst>
+                        <p:par>
+                          <p:cTn id="22" fill="hold">
+                            <p:stCondLst>
+                              <p:cond delay="0"/>
+                            </p:stCondLst>
+                            <p:childTnLst>
+                              <p:par>
+                                <p:cTn id="23" presetID="10" presetClass="entr" presetSubtype="0" fill="hold" nodeType="clickEffect">
+                                  <p:stCondLst>
+                                    <p:cond delay="0"/>
+                                  </p:stCondLst>
+                                  <p:childTnLst>
+                                    <p:set>
+                                      <p:cBhvr>
+                                        <p:cTn id="24" dur="1" fill="hold">
+                                          <p:stCondLst>
+                                            <p:cond delay="0"/>
+                                          </p:stCondLst>
+                                        </p:cTn>
+                                        <p:tgtEl>
+                                          <p:spTgt spid="7"/>
+                                        </p:tgtEl>
+                                        <p:attrNameLst>
+                                          <p:attrName>style.visibility</p:attrName>
+                                        </p:attrNameLst>
+                                      </p:cBhvr>
+                                      <p:to>
+                                        <p:strVal val="visible"/>
+                                      </p:to>
+                                    </p:set>
+                                    <p:animEffect transition="in" filter="fade">
+                                      <p:cBhvr>
+                                        <p:cTn id="25" dur="500"/>
+                                        <p:tgtEl>
+                                          <p:spTgt spid="7"/>
+                                        </p:tgtEl>
+                                      </p:cBhvr>
+                                    </p:animEffect>
+                                  </p:childTnLst>
+                                </p:cTn>
+                              </p:par>
+                            </p:childTnLst>
+                          </p:cTn>
+                        </p:par>
+                      </p:childTnLst>
+                    </p:cTn>
+                  </p:par>
+                </p:childTnLst>
+              </p:cTn>
+              <p:prevCondLst>
+                <p:cond evt="onPrev" delay="0">
+                  <p:tgtEl>
+                    <p:sldTgt/>
+                  </p:tgtEl>
+                </p:cond>
+              </p:prevCondLst>
+              <p:nextCondLst>
+                <p:cond evt="onNext" delay="0">
+                  <p:tgtEl>
+                    <p:sldTgt/>
+                  </p:tgtEl>
+                </p:cond>
+              </p:nextCondLst>
+            </p:seq>
+          </p:childTnLst>
+        </p:cTn>
+      </p:par>
+    </p:tnLst>
+    <p:bldLst>
+      <p:bldP spid="4" grpId="0" build="p"/>
+    </p:bldLst>
+  </p:timing>
+</p:sld>
+</file>
+
 <file path=ppt/slides/slide3.xml><?xml version="1.0" encoding="utf-8"?>
 <p:sld xmlns:a="http://schemas.openxmlformats.org/drawingml/2006/main" xmlns:r="http://schemas.openxmlformats.org/officeDocument/2006/relationships" xmlns:p="http://schemas.openxmlformats.org/presentationml/2006/main">
   <p:cSld>

</xml_diff>

<commit_message>
Add slide on RNN task
</commit_message>
<xml_diff>
--- a/prace_days_ml_2019.pptx
+++ b/prace_days_ml_2019.pptx
@@ -5,7 +5,7 @@
     <p:sldMasterId id="2147483660" r:id="rId1"/>
   </p:sldMasterIdLst>
   <p:notesMasterIdLst>
-    <p:notesMasterId r:id="rId33"/>
+    <p:notesMasterId r:id="rId34"/>
   </p:notesMasterIdLst>
   <p:sldIdLst>
     <p:sldId id="257" r:id="rId2"/>
@@ -38,7 +38,8 @@
     <p:sldId id="286" r:id="rId29"/>
     <p:sldId id="287" r:id="rId30"/>
     <p:sldId id="285" r:id="rId31"/>
-    <p:sldId id="284" r:id="rId32"/>
+    <p:sldId id="288" r:id="rId32"/>
+    <p:sldId id="284" r:id="rId33"/>
   </p:sldIdLst>
   <p:sldSz cx="12192000" cy="6858000"/>
   <p:notesSz cx="6858000" cy="9144000"/>
@@ -11629,8 +11630,8 @@
             <a:chExt cx="6308338" cy="1623882"/>
           </a:xfrm>
         </p:grpSpPr>
-        <mc:AlternateContent xmlns:mc="http://schemas.openxmlformats.org/markup-compatibility/2006">
-          <mc:Choice xmlns:a14="http://schemas.microsoft.com/office/drawing/2010/main" Requires="a14">
+        <mc:AlternateContent xmlns:mc="http://schemas.openxmlformats.org/markup-compatibility/2006" xmlns:a14="http://schemas.microsoft.com/office/drawing/2010/main">
+          <mc:Choice Requires="a14">
             <p:sp>
               <p:nvSpPr>
                 <p:cNvPr id="10255" name="TextBox 10254"/>
@@ -11811,7 +11812,7 @@
               </p:txBody>
             </p:sp>
           </mc:Choice>
-          <mc:Fallback>
+          <mc:Fallback xmlns="">
             <p:sp>
               <p:nvSpPr>
                 <p:cNvPr id="10255" name="TextBox 10254"/>
@@ -25115,6 +25116,805 @@
           <a:lstStyle/>
           <a:p>
             <a:r>
+              <a:rPr lang="en-US" dirty="0"/>
+              <a:t>A</a:t>
+            </a:r>
+            <a:r>
+              <a:rPr lang="en-BE" dirty="0" smtClean="0"/>
+              <a:t>pproach</a:t>
+            </a:r>
+            <a:endParaRPr lang="en-US" dirty="0"/>
+          </a:p>
+        </p:txBody>
+      </p:sp>
+      <p:sp>
+        <p:nvSpPr>
+          <p:cNvPr id="4" name="Text Placeholder 3"/>
+          <p:cNvSpPr>
+            <a:spLocks noGrp="1"/>
+          </p:cNvSpPr>
+          <p:nvPr>
+            <p:ph type="body" sz="half" idx="2"/>
+          </p:nvPr>
+        </p:nvSpPr>
+        <p:spPr>
+          <a:xfrm>
+            <a:off x="839788" y="2057400"/>
+            <a:ext cx="4406915" cy="3811588"/>
+          </a:xfrm>
+        </p:spPr>
+        <p:txBody>
+          <a:bodyPr>
+            <a:noAutofit/>
+          </a:bodyPr>
+          <a:lstStyle/>
+          <a:p>
+            <a:pPr marL="285750" indent="-285750">
+              <a:buFont typeface="Arial" panose="020B0604020202020204" pitchFamily="34" charset="0"/>
+              <a:buChar char="•"/>
+            </a:pPr>
+            <a:r>
+              <a:rPr lang="en-BE" sz="2000" dirty="0" smtClean="0"/>
+              <a:t>Data preprocessing</a:t>
+            </a:r>
+          </a:p>
+          <a:p>
+            <a:pPr marL="742950" lvl="1" indent="-285750">
+              <a:buFont typeface="Arial" panose="020B0604020202020204" pitchFamily="34" charset="0"/>
+              <a:buChar char="•"/>
+            </a:pPr>
+            <a:r>
+              <a:rPr lang="en-BE" sz="1800" dirty="0" smtClean="0"/>
+              <a:t>Input data as </a:t>
+            </a:r>
+            <a:r>
+              <a:rPr lang="en-US" sz="1800" dirty="0" smtClean="0"/>
+              <a:t> padded </a:t>
+            </a:r>
+            <a:r>
+              <a:rPr lang="en-BE" sz="1800" dirty="0" smtClean="0"/>
+              <a:t>array</a:t>
+            </a:r>
+            <a:endParaRPr lang="en-BE" sz="1800" dirty="0" smtClean="0"/>
+          </a:p>
+          <a:p>
+            <a:pPr marL="742950" lvl="1" indent="-285750">
+              <a:buFont typeface="Arial" panose="020B0604020202020204" pitchFamily="34" charset="0"/>
+              <a:buChar char="•"/>
+            </a:pPr>
+            <a:r>
+              <a:rPr lang="en-BE" sz="1800" dirty="0" smtClean="0"/>
+              <a:t>output data as </a:t>
+            </a:r>
+            <a:r>
+              <a:rPr lang="en-US" sz="1800" dirty="0" smtClean="0"/>
+              <a:t>0 or 1</a:t>
+            </a:r>
+            <a:endParaRPr lang="en-BE" sz="1800" dirty="0" smtClean="0"/>
+          </a:p>
+          <a:p>
+            <a:pPr marL="742950" lvl="1" indent="-285750">
+              <a:buFont typeface="Arial" panose="020B0604020202020204" pitchFamily="34" charset="0"/>
+              <a:buChar char="•"/>
+            </a:pPr>
+            <a:endParaRPr lang="en-BE" sz="1800" dirty="0"/>
+          </a:p>
+          <a:p>
+            <a:pPr marL="285750" indent="-285750">
+              <a:buFont typeface="Arial" panose="020B0604020202020204" pitchFamily="34" charset="0"/>
+              <a:buChar char="•"/>
+            </a:pPr>
+            <a:r>
+              <a:rPr lang="en-BE" sz="2000" dirty="0" smtClean="0"/>
+              <a:t>Model: </a:t>
+            </a:r>
+            <a:r>
+              <a:rPr lang="en-US" sz="2000" dirty="0" smtClean="0"/>
+              <a:t>recurrent</a:t>
+            </a:r>
+            <a:r>
+              <a:rPr lang="en-BE" sz="2000" dirty="0" smtClean="0"/>
+              <a:t> </a:t>
+            </a:r>
+            <a:r>
+              <a:rPr lang="en-BE" sz="2000" dirty="0" smtClean="0"/>
+              <a:t>neural network </a:t>
+            </a:r>
+            <a:r>
+              <a:rPr lang="en-BE" sz="2000" dirty="0" smtClean="0"/>
+              <a:t>(</a:t>
+            </a:r>
+            <a:r>
+              <a:rPr lang="en-US" sz="2000" dirty="0" smtClean="0"/>
+              <a:t>GRU</a:t>
+            </a:r>
+            <a:r>
+              <a:rPr lang="en-BE" sz="2000" dirty="0" smtClean="0"/>
+              <a:t>)</a:t>
+            </a:r>
+            <a:endParaRPr lang="en-BE" sz="2000" dirty="0" smtClean="0"/>
+          </a:p>
+          <a:p>
+            <a:pPr marL="742950" lvl="1" indent="-285750">
+              <a:buFont typeface="Arial" panose="020B0604020202020204" pitchFamily="34" charset="0"/>
+              <a:buChar char="•"/>
+            </a:pPr>
+            <a:r>
+              <a:rPr lang="en-US" sz="1800" dirty="0" smtClean="0"/>
+              <a:t>100</a:t>
+            </a:r>
+            <a:r>
+              <a:rPr lang="en-BE" sz="1800" dirty="0" smtClean="0"/>
+              <a:t> inputs</a:t>
+            </a:r>
+            <a:endParaRPr lang="en-US" sz="1800" dirty="0" smtClean="0"/>
+          </a:p>
+          <a:p>
+            <a:pPr marL="742950" lvl="1" indent="-285750">
+              <a:buFont typeface="Arial" panose="020B0604020202020204" pitchFamily="34" charset="0"/>
+              <a:buChar char="•"/>
+            </a:pPr>
+            <a:r>
+              <a:rPr lang="en-US" sz="1800" dirty="0"/>
+              <a:t>e</a:t>
+            </a:r>
+            <a:r>
+              <a:rPr lang="en-US" sz="1800" dirty="0" smtClean="0"/>
+              <a:t>mbedding layer, 5,000 words, 64 element representation length</a:t>
+            </a:r>
+            <a:endParaRPr lang="en-BE" sz="1800" dirty="0" smtClean="0"/>
+          </a:p>
+          <a:p>
+            <a:pPr marL="742950" lvl="1" indent="-285750">
+              <a:buFont typeface="Arial" panose="020B0604020202020204" pitchFamily="34" charset="0"/>
+              <a:buChar char="•"/>
+            </a:pPr>
+            <a:r>
+              <a:rPr lang="en-US" sz="1800" dirty="0" smtClean="0"/>
+              <a:t>GRU</a:t>
+            </a:r>
+            <a:r>
+              <a:rPr lang="en-BE" sz="1800" dirty="0" smtClean="0"/>
+              <a:t> layer</a:t>
+            </a:r>
+            <a:r>
+              <a:rPr lang="en-US" sz="1800" dirty="0" smtClean="0"/>
+              <a:t>,</a:t>
+            </a:r>
+            <a:r>
+              <a:rPr lang="en-BE" sz="1800" dirty="0" smtClean="0"/>
+              <a:t> </a:t>
+            </a:r>
+            <a:r>
+              <a:rPr lang="en-US" sz="1800" dirty="0" smtClean="0"/>
+              <a:t>64 units</a:t>
+            </a:r>
+            <a:endParaRPr lang="en-BE" sz="1800" dirty="0" smtClean="0"/>
+          </a:p>
+          <a:p>
+            <a:pPr marL="742950" lvl="1" indent="-285750">
+              <a:buFont typeface="Arial" panose="020B0604020202020204" pitchFamily="34" charset="0"/>
+              <a:buChar char="•"/>
+            </a:pPr>
+            <a:r>
+              <a:rPr lang="en-US" sz="1800" dirty="0"/>
+              <a:t>d</a:t>
+            </a:r>
+            <a:r>
+              <a:rPr lang="en-US" sz="1800" dirty="0" smtClean="0"/>
+              <a:t>ropout layer, rate = 0.5</a:t>
+            </a:r>
+            <a:endParaRPr lang="en-BE" sz="1800" dirty="0" smtClean="0"/>
+          </a:p>
+          <a:p>
+            <a:pPr marL="742950" lvl="1" indent="-285750">
+              <a:buFont typeface="Arial" panose="020B0604020202020204" pitchFamily="34" charset="0"/>
+              <a:buChar char="•"/>
+            </a:pPr>
+            <a:r>
+              <a:rPr lang="en-US" sz="1800" dirty="0" smtClean="0"/>
+              <a:t>dense layer, 1 output</a:t>
+            </a:r>
+          </a:p>
+          <a:p>
+            <a:pPr marL="742950" lvl="1" indent="-285750">
+              <a:buFont typeface="Arial" panose="020B0604020202020204" pitchFamily="34" charset="0"/>
+              <a:buChar char="•"/>
+            </a:pPr>
+            <a:r>
+              <a:rPr lang="en-US" sz="1800" dirty="0" smtClean="0"/>
+              <a:t>sigmoid activation function</a:t>
+            </a:r>
+            <a:endParaRPr lang="en-BE" sz="1800" dirty="0" smtClean="0"/>
+          </a:p>
+        </p:txBody>
+      </p:sp>
+      <p:sp>
+        <p:nvSpPr>
+          <p:cNvPr id="5" name="Slide Number Placeholder 4"/>
+          <p:cNvSpPr>
+            <a:spLocks noGrp="1"/>
+          </p:cNvSpPr>
+          <p:nvPr>
+            <p:ph type="sldNum" sz="quarter" idx="12"/>
+          </p:nvPr>
+        </p:nvSpPr>
+        <p:spPr/>
+        <p:txBody>
+          <a:bodyPr/>
+          <a:lstStyle/>
+          <a:p>
+            <a:fld id="{CF5A1C33-475D-474A-A037-DDAF3DC7AF09}" type="slidenum">
+              <a:rPr lang="en-US" smtClean="0"/>
+              <a:t>31</a:t>
+            </a:fld>
+            <a:endParaRPr lang="en-US"/>
+          </a:p>
+        </p:txBody>
+      </p:sp>
+      <p:sp>
+        <p:nvSpPr>
+          <p:cNvPr id="14" name="TextBox 13"/>
+          <p:cNvSpPr txBox="1"/>
+          <p:nvPr/>
+        </p:nvSpPr>
+        <p:spPr>
+          <a:xfrm>
+            <a:off x="5347063" y="4885782"/>
+            <a:ext cx="4783682" cy="369332"/>
+          </a:xfrm>
+          <a:prstGeom prst="rect">
+            <a:avLst/>
+          </a:prstGeom>
+        </p:spPr>
+        <p:style>
+          <a:lnRef idx="1">
+            <a:schemeClr val="accent2"/>
+          </a:lnRef>
+          <a:fillRef idx="2">
+            <a:schemeClr val="accent2"/>
+          </a:fillRef>
+          <a:effectRef idx="1">
+            <a:schemeClr val="accent2"/>
+          </a:effectRef>
+          <a:fontRef idx="minor">
+            <a:schemeClr val="dk1"/>
+          </a:fontRef>
+        </p:style>
+        <p:txBody>
+          <a:bodyPr wrap="none" rtlCol="0">
+            <a:spAutoFit/>
+          </a:bodyPr>
+          <a:lstStyle/>
+          <a:p>
+            <a:r>
+              <a:rPr lang="en-US" dirty="0" smtClean="0"/>
+              <a:t>Recurrent</a:t>
+            </a:r>
+            <a:r>
+              <a:rPr lang="en-BE" dirty="0" smtClean="0"/>
+              <a:t> </a:t>
+            </a:r>
+            <a:r>
+              <a:rPr lang="en-BE" dirty="0" smtClean="0"/>
+              <a:t>neural network: </a:t>
+            </a:r>
+            <a:r>
+              <a:rPr lang="en-BE" dirty="0" smtClean="0">
+                <a:latin typeface="Inconsolata" panose="00000509000000000000" pitchFamily="49" charset="0"/>
+              </a:rPr>
+              <a:t>0</a:t>
+            </a:r>
+            <a:r>
+              <a:rPr lang="en-US" dirty="0" smtClean="0">
+                <a:latin typeface="Inconsolata" panose="00000509000000000000" pitchFamily="49" charset="0"/>
+              </a:rPr>
+              <a:t>8</a:t>
+            </a:r>
+            <a:r>
+              <a:rPr lang="en-BE" dirty="0" smtClean="0">
+                <a:latin typeface="Inconsolata" panose="00000509000000000000" pitchFamily="49" charset="0"/>
+              </a:rPr>
+              <a:t>0_</a:t>
+            </a:r>
+            <a:r>
+              <a:rPr lang="en-US" dirty="0" err="1" smtClean="0">
+                <a:latin typeface="Inconsolata" panose="00000509000000000000" pitchFamily="49" charset="0"/>
+              </a:rPr>
+              <a:t>imdb_rnn</a:t>
+            </a:r>
+            <a:r>
+              <a:rPr lang="en-US" dirty="0" smtClean="0">
+                <a:latin typeface="Inconsolata" panose="00000509000000000000" pitchFamily="49" charset="0"/>
+              </a:rPr>
+              <a:t>.</a:t>
+            </a:r>
+            <a:r>
+              <a:rPr lang="en-BE" dirty="0" smtClean="0">
+                <a:latin typeface="Inconsolata" panose="00000509000000000000" pitchFamily="49" charset="0"/>
+              </a:rPr>
+              <a:t>pynb</a:t>
+            </a:r>
+            <a:endParaRPr lang="en-US" dirty="0">
+              <a:latin typeface="Inconsolata" panose="00000509000000000000" pitchFamily="49" charset="0"/>
+            </a:endParaRPr>
+          </a:p>
+        </p:txBody>
+      </p:sp>
+    </p:spTree>
+    <p:extLst>
+      <p:ext uri="{BB962C8B-B14F-4D97-AF65-F5344CB8AC3E}">
+        <p14:creationId xmlns:p14="http://schemas.microsoft.com/office/powerpoint/2010/main" val="2380206980"/>
+      </p:ext>
+    </p:extLst>
+  </p:cSld>
+  <p:clrMapOvr>
+    <a:masterClrMapping/>
+  </p:clrMapOvr>
+  <p:timing>
+    <p:tnLst>
+      <p:par>
+        <p:cTn id="1" dur="indefinite" restart="never" nodeType="tmRoot">
+          <p:childTnLst>
+            <p:seq concurrent="1" nextAc="seek">
+              <p:cTn id="2" dur="indefinite" nodeType="mainSeq">
+                <p:childTnLst>
+                  <p:par>
+                    <p:cTn id="3" fill="hold">
+                      <p:stCondLst>
+                        <p:cond delay="indefinite"/>
+                        <p:cond evt="onBegin" delay="0">
+                          <p:tn val="2"/>
+                        </p:cond>
+                      </p:stCondLst>
+                      <p:childTnLst>
+                        <p:par>
+                          <p:cTn id="4" fill="hold">
+                            <p:stCondLst>
+                              <p:cond delay="0"/>
+                            </p:stCondLst>
+                            <p:childTnLst>
+                              <p:par>
+                                <p:cTn id="5" presetID="1" presetClass="entr" presetSubtype="0" fill="hold" grpId="0" nodeType="withEffect">
+                                  <p:stCondLst>
+                                    <p:cond delay="0"/>
+                                  </p:stCondLst>
+                                  <p:childTnLst>
+                                    <p:set>
+                                      <p:cBhvr>
+                                        <p:cTn id="6" dur="1" fill="hold">
+                                          <p:stCondLst>
+                                            <p:cond delay="0"/>
+                                          </p:stCondLst>
+                                        </p:cTn>
+                                        <p:tgtEl>
+                                          <p:spTgt spid="4">
+                                            <p:txEl>
+                                              <p:pRg st="0" end="0"/>
+                                            </p:txEl>
+                                          </p:spTgt>
+                                        </p:tgtEl>
+                                        <p:attrNameLst>
+                                          <p:attrName>style.visibility</p:attrName>
+                                        </p:attrNameLst>
+                                      </p:cBhvr>
+                                      <p:to>
+                                        <p:strVal val="visible"/>
+                                      </p:to>
+                                    </p:set>
+                                  </p:childTnLst>
+                                </p:cTn>
+                              </p:par>
+                              <p:par>
+                                <p:cTn id="7" presetID="1" presetClass="entr" presetSubtype="0" fill="hold" grpId="0" nodeType="withEffect">
+                                  <p:stCondLst>
+                                    <p:cond delay="0"/>
+                                  </p:stCondLst>
+                                  <p:childTnLst>
+                                    <p:set>
+                                      <p:cBhvr>
+                                        <p:cTn id="8" dur="1" fill="hold">
+                                          <p:stCondLst>
+                                            <p:cond delay="0"/>
+                                          </p:stCondLst>
+                                        </p:cTn>
+                                        <p:tgtEl>
+                                          <p:spTgt spid="4">
+                                            <p:txEl>
+                                              <p:pRg st="1" end="1"/>
+                                            </p:txEl>
+                                          </p:spTgt>
+                                        </p:tgtEl>
+                                        <p:attrNameLst>
+                                          <p:attrName>style.visibility</p:attrName>
+                                        </p:attrNameLst>
+                                      </p:cBhvr>
+                                      <p:to>
+                                        <p:strVal val="visible"/>
+                                      </p:to>
+                                    </p:set>
+                                  </p:childTnLst>
+                                </p:cTn>
+                              </p:par>
+                              <p:par>
+                                <p:cTn id="9" presetID="1" presetClass="entr" presetSubtype="0" fill="hold" grpId="0" nodeType="withEffect">
+                                  <p:stCondLst>
+                                    <p:cond delay="0"/>
+                                  </p:stCondLst>
+                                  <p:childTnLst>
+                                    <p:set>
+                                      <p:cBhvr>
+                                        <p:cTn id="10" dur="1" fill="hold">
+                                          <p:stCondLst>
+                                            <p:cond delay="0"/>
+                                          </p:stCondLst>
+                                        </p:cTn>
+                                        <p:tgtEl>
+                                          <p:spTgt spid="4">
+                                            <p:txEl>
+                                              <p:pRg st="2" end="2"/>
+                                            </p:txEl>
+                                          </p:spTgt>
+                                        </p:tgtEl>
+                                        <p:attrNameLst>
+                                          <p:attrName>style.visibility</p:attrName>
+                                        </p:attrNameLst>
+                                      </p:cBhvr>
+                                      <p:to>
+                                        <p:strVal val="visible"/>
+                                      </p:to>
+                                    </p:set>
+                                  </p:childTnLst>
+                                </p:cTn>
+                              </p:par>
+                            </p:childTnLst>
+                          </p:cTn>
+                        </p:par>
+                      </p:childTnLst>
+                    </p:cTn>
+                  </p:par>
+                  <p:par>
+                    <p:cTn id="11" fill="hold">
+                      <p:stCondLst>
+                        <p:cond delay="indefinite"/>
+                      </p:stCondLst>
+                      <p:childTnLst>
+                        <p:par>
+                          <p:cTn id="12" fill="hold">
+                            <p:stCondLst>
+                              <p:cond delay="0"/>
+                            </p:stCondLst>
+                            <p:childTnLst>
+                              <p:par>
+                                <p:cTn id="13" presetID="1" presetClass="entr" presetSubtype="0" fill="hold" grpId="0" nodeType="clickEffect">
+                                  <p:stCondLst>
+                                    <p:cond delay="0"/>
+                                  </p:stCondLst>
+                                  <p:childTnLst>
+                                    <p:set>
+                                      <p:cBhvr>
+                                        <p:cTn id="14" dur="1" fill="hold">
+                                          <p:stCondLst>
+                                            <p:cond delay="0"/>
+                                          </p:stCondLst>
+                                        </p:cTn>
+                                        <p:tgtEl>
+                                          <p:spTgt spid="4">
+                                            <p:txEl>
+                                              <p:pRg st="4" end="4"/>
+                                            </p:txEl>
+                                          </p:spTgt>
+                                        </p:tgtEl>
+                                        <p:attrNameLst>
+                                          <p:attrName>style.visibility</p:attrName>
+                                        </p:attrNameLst>
+                                      </p:cBhvr>
+                                      <p:to>
+                                        <p:strVal val="visible"/>
+                                      </p:to>
+                                    </p:set>
+                                  </p:childTnLst>
+                                </p:cTn>
+                              </p:par>
+                              <p:par>
+                                <p:cTn id="15" presetID="1" presetClass="entr" presetSubtype="0" fill="hold" grpId="0" nodeType="withEffect">
+                                  <p:stCondLst>
+                                    <p:cond delay="0"/>
+                                  </p:stCondLst>
+                                  <p:childTnLst>
+                                    <p:set>
+                                      <p:cBhvr>
+                                        <p:cTn id="16" dur="1" fill="hold">
+                                          <p:stCondLst>
+                                            <p:cond delay="0"/>
+                                          </p:stCondLst>
+                                        </p:cTn>
+                                        <p:tgtEl>
+                                          <p:spTgt spid="4">
+                                            <p:txEl>
+                                              <p:pRg st="5" end="5"/>
+                                            </p:txEl>
+                                          </p:spTgt>
+                                        </p:tgtEl>
+                                        <p:attrNameLst>
+                                          <p:attrName>style.visibility</p:attrName>
+                                        </p:attrNameLst>
+                                      </p:cBhvr>
+                                      <p:to>
+                                        <p:strVal val="visible"/>
+                                      </p:to>
+                                    </p:set>
+                                  </p:childTnLst>
+                                </p:cTn>
+                              </p:par>
+                              <p:par>
+                                <p:cTn id="17" presetID="1" presetClass="entr" presetSubtype="0" fill="hold" grpId="0" nodeType="withEffect">
+                                  <p:stCondLst>
+                                    <p:cond delay="0"/>
+                                  </p:stCondLst>
+                                  <p:childTnLst>
+                                    <p:set>
+                                      <p:cBhvr>
+                                        <p:cTn id="18" dur="1" fill="hold">
+                                          <p:stCondLst>
+                                            <p:cond delay="0"/>
+                                          </p:stCondLst>
+                                        </p:cTn>
+                                        <p:tgtEl>
+                                          <p:spTgt spid="4">
+                                            <p:txEl>
+                                              <p:pRg st="6" end="6"/>
+                                            </p:txEl>
+                                          </p:spTgt>
+                                        </p:tgtEl>
+                                        <p:attrNameLst>
+                                          <p:attrName>style.visibility</p:attrName>
+                                        </p:attrNameLst>
+                                      </p:cBhvr>
+                                      <p:to>
+                                        <p:strVal val="visible"/>
+                                      </p:to>
+                                    </p:set>
+                                  </p:childTnLst>
+                                </p:cTn>
+                              </p:par>
+                              <p:par>
+                                <p:cTn id="19" presetID="1" presetClass="entr" presetSubtype="0" fill="hold" grpId="0" nodeType="withEffect">
+                                  <p:stCondLst>
+                                    <p:cond delay="0"/>
+                                  </p:stCondLst>
+                                  <p:childTnLst>
+                                    <p:set>
+                                      <p:cBhvr>
+                                        <p:cTn id="20" dur="1" fill="hold">
+                                          <p:stCondLst>
+                                            <p:cond delay="0"/>
+                                          </p:stCondLst>
+                                        </p:cTn>
+                                        <p:tgtEl>
+                                          <p:spTgt spid="4">
+                                            <p:txEl>
+                                              <p:pRg st="7" end="7"/>
+                                            </p:txEl>
+                                          </p:spTgt>
+                                        </p:tgtEl>
+                                        <p:attrNameLst>
+                                          <p:attrName>style.visibility</p:attrName>
+                                        </p:attrNameLst>
+                                      </p:cBhvr>
+                                      <p:to>
+                                        <p:strVal val="visible"/>
+                                      </p:to>
+                                    </p:set>
+                                  </p:childTnLst>
+                                </p:cTn>
+                              </p:par>
+                              <p:par>
+                                <p:cTn id="21" presetID="1" presetClass="entr" presetSubtype="0" fill="hold" grpId="0" nodeType="withEffect">
+                                  <p:stCondLst>
+                                    <p:cond delay="0"/>
+                                  </p:stCondLst>
+                                  <p:childTnLst>
+                                    <p:set>
+                                      <p:cBhvr>
+                                        <p:cTn id="22" dur="1" fill="hold">
+                                          <p:stCondLst>
+                                            <p:cond delay="0"/>
+                                          </p:stCondLst>
+                                        </p:cTn>
+                                        <p:tgtEl>
+                                          <p:spTgt spid="4">
+                                            <p:txEl>
+                                              <p:pRg st="8" end="8"/>
+                                            </p:txEl>
+                                          </p:spTgt>
+                                        </p:tgtEl>
+                                        <p:attrNameLst>
+                                          <p:attrName>style.visibility</p:attrName>
+                                        </p:attrNameLst>
+                                      </p:cBhvr>
+                                      <p:to>
+                                        <p:strVal val="visible"/>
+                                      </p:to>
+                                    </p:set>
+                                  </p:childTnLst>
+                                </p:cTn>
+                              </p:par>
+                              <p:par>
+                                <p:cTn id="23" presetID="1" presetClass="entr" presetSubtype="0" fill="hold" grpId="0" nodeType="withEffect">
+                                  <p:stCondLst>
+                                    <p:cond delay="0"/>
+                                  </p:stCondLst>
+                                  <p:childTnLst>
+                                    <p:set>
+                                      <p:cBhvr>
+                                        <p:cTn id="24" dur="1" fill="hold">
+                                          <p:stCondLst>
+                                            <p:cond delay="0"/>
+                                          </p:stCondLst>
+                                        </p:cTn>
+                                        <p:tgtEl>
+                                          <p:spTgt spid="4">
+                                            <p:txEl>
+                                              <p:pRg st="9" end="9"/>
+                                            </p:txEl>
+                                          </p:spTgt>
+                                        </p:tgtEl>
+                                        <p:attrNameLst>
+                                          <p:attrName>style.visibility</p:attrName>
+                                        </p:attrNameLst>
+                                      </p:cBhvr>
+                                      <p:to>
+                                        <p:strVal val="visible"/>
+                                      </p:to>
+                                    </p:set>
+                                  </p:childTnLst>
+                                </p:cTn>
+                              </p:par>
+                              <p:par>
+                                <p:cTn id="25" presetID="1" presetClass="entr" presetSubtype="0" fill="hold" grpId="0" nodeType="withEffect">
+                                  <p:stCondLst>
+                                    <p:cond delay="0"/>
+                                  </p:stCondLst>
+                                  <p:childTnLst>
+                                    <p:set>
+                                      <p:cBhvr>
+                                        <p:cTn id="26" dur="1" fill="hold">
+                                          <p:stCondLst>
+                                            <p:cond delay="0"/>
+                                          </p:stCondLst>
+                                        </p:cTn>
+                                        <p:tgtEl>
+                                          <p:spTgt spid="4">
+                                            <p:txEl>
+                                              <p:pRg st="10" end="10"/>
+                                            </p:txEl>
+                                          </p:spTgt>
+                                        </p:tgtEl>
+                                        <p:attrNameLst>
+                                          <p:attrName>style.visibility</p:attrName>
+                                        </p:attrNameLst>
+                                      </p:cBhvr>
+                                      <p:to>
+                                        <p:strVal val="visible"/>
+                                      </p:to>
+                                    </p:set>
+                                  </p:childTnLst>
+                                </p:cTn>
+                              </p:par>
+                            </p:childTnLst>
+                          </p:cTn>
+                        </p:par>
+                      </p:childTnLst>
+                    </p:cTn>
+                  </p:par>
+                  <p:par>
+                    <p:cTn id="27" fill="hold">
+                      <p:stCondLst>
+                        <p:cond delay="indefinite"/>
+                      </p:stCondLst>
+                      <p:childTnLst>
+                        <p:par>
+                          <p:cTn id="28" fill="hold">
+                            <p:stCondLst>
+                              <p:cond delay="0"/>
+                            </p:stCondLst>
+                            <p:childTnLst>
+                              <p:par>
+                                <p:cTn id="29" presetID="1" presetClass="entr" presetSubtype="0" fill="hold" grpId="0" nodeType="clickEffect">
+                                  <p:stCondLst>
+                                    <p:cond delay="0"/>
+                                  </p:stCondLst>
+                                  <p:childTnLst>
+                                    <p:set>
+                                      <p:cBhvr>
+                                        <p:cTn id="30" dur="1" fill="hold">
+                                          <p:stCondLst>
+                                            <p:cond delay="0"/>
+                                          </p:stCondLst>
+                                        </p:cTn>
+                                        <p:tgtEl>
+                                          <p:spTgt spid="14"/>
+                                        </p:tgtEl>
+                                        <p:attrNameLst>
+                                          <p:attrName>style.visibility</p:attrName>
+                                        </p:attrNameLst>
+                                      </p:cBhvr>
+                                      <p:to>
+                                        <p:strVal val="visible"/>
+                                      </p:to>
+                                    </p:set>
+                                  </p:childTnLst>
+                                </p:cTn>
+                              </p:par>
+                            </p:childTnLst>
+                          </p:cTn>
+                        </p:par>
+                      </p:childTnLst>
+                    </p:cTn>
+                  </p:par>
+                </p:childTnLst>
+              </p:cTn>
+              <p:prevCondLst>
+                <p:cond evt="onPrev" delay="0">
+                  <p:tgtEl>
+                    <p:sldTgt/>
+                  </p:tgtEl>
+                </p:cond>
+              </p:prevCondLst>
+              <p:nextCondLst>
+                <p:cond evt="onNext" delay="0">
+                  <p:tgtEl>
+                    <p:sldTgt/>
+                  </p:tgtEl>
+                </p:cond>
+              </p:nextCondLst>
+            </p:seq>
+          </p:childTnLst>
+        </p:cTn>
+      </p:par>
+    </p:tnLst>
+    <p:bldLst>
+      <p:bldP spid="4" grpId="0" uiExpand="1" build="p"/>
+      <p:bldP spid="14" grpId="0" animBg="1"/>
+    </p:bldLst>
+  </p:timing>
+</p:sld>
+</file>
+
+<file path=ppt/slides/slide32.xml><?xml version="1.0" encoding="utf-8"?>
+<p:sld xmlns:a="http://schemas.openxmlformats.org/drawingml/2006/main" xmlns:r="http://schemas.openxmlformats.org/officeDocument/2006/relationships" xmlns:p="http://schemas.openxmlformats.org/presentationml/2006/main">
+  <p:cSld>
+    <p:spTree>
+      <p:nvGrpSpPr>
+        <p:cNvPr id="1" name=""/>
+        <p:cNvGrpSpPr/>
+        <p:nvPr/>
+      </p:nvGrpSpPr>
+      <p:grpSpPr>
+        <a:xfrm>
+          <a:off x="0" y="0"/>
+          <a:ext cx="0" cy="0"/>
+          <a:chOff x="0" y="0"/>
+          <a:chExt cx="0" cy="0"/>
+        </a:xfrm>
+      </p:grpSpPr>
+      <p:sp>
+        <p:nvSpPr>
+          <p:cNvPr id="2" name="Title 1"/>
+          <p:cNvSpPr>
+            <a:spLocks noGrp="1"/>
+          </p:cNvSpPr>
+          <p:nvPr>
+            <p:ph type="title"/>
+          </p:nvPr>
+        </p:nvSpPr>
+        <p:spPr/>
+        <p:txBody>
+          <a:bodyPr/>
+          <a:lstStyle/>
+          <a:p>
+            <a:r>
               <a:rPr lang="en-US" dirty="0" smtClean="0"/>
               <a:t>Caveat</a:t>
             </a:r>
@@ -25188,7 +25988,7 @@
           <a:p>
             <a:fld id="{5A209D72-2E9D-49B0-8977-41DCCC66C0BB}" type="slidenum">
               <a:rPr lang="nl-BE" smtClean="0"/>
-              <a:t>31</a:t>
+              <a:t>32</a:t>
             </a:fld>
             <a:endParaRPr lang="nl-BE"/>
           </a:p>

</xml_diff>

<commit_message>
Add word embedding slide
</commit_message>
<xml_diff>
--- a/prace_days_ml_2019.pptx
+++ b/prace_days_ml_2019.pptx
@@ -22258,25 +22258,6 @@
       </p:sp>
       <p:sp>
         <p:nvSpPr>
-          <p:cNvPr id="3" name="Content Placeholder 2"/>
-          <p:cNvSpPr>
-            <a:spLocks noGrp="1"/>
-          </p:cNvSpPr>
-          <p:nvPr>
-            <p:ph idx="1"/>
-          </p:nvPr>
-        </p:nvSpPr>
-        <p:spPr/>
-        <p:txBody>
-          <a:bodyPr/>
-          <a:lstStyle/>
-          <a:p>
-            <a:endParaRPr lang="en-US"/>
-          </a:p>
-        </p:txBody>
-      </p:sp>
-      <p:sp>
-        <p:nvSpPr>
           <p:cNvPr id="4" name="Text Placeholder 3"/>
           <p:cNvSpPr>
             <a:spLocks noGrp="1"/>
@@ -22290,7 +22271,125 @@
           <a:bodyPr/>
           <a:lstStyle/>
           <a:p>
-            <a:endParaRPr lang="en-US"/>
+            <a:pPr marL="285750" indent="-285750">
+              <a:buFont typeface="Arial" panose="020B0604020202020204" pitchFamily="34" charset="0"/>
+              <a:buChar char="•"/>
+            </a:pPr>
+            <a:r>
+              <a:rPr lang="en-US" dirty="0" smtClean="0"/>
+              <a:t>Represent words as one-hot vectors</a:t>
+            </a:r>
+            <a:br>
+              <a:rPr lang="en-US" dirty="0" smtClean="0"/>
+            </a:br>
+            <a:r>
+              <a:rPr lang="en-US" dirty="0" smtClean="0"/>
+              <a:t>length = vocabulary size</a:t>
+            </a:r>
+          </a:p>
+          <a:p>
+            <a:pPr marL="285750" indent="-285750">
+              <a:buFont typeface="Arial" panose="020B0604020202020204" pitchFamily="34" charset="0"/>
+              <a:buChar char="•"/>
+            </a:pPr>
+            <a:endParaRPr lang="en-US" dirty="0"/>
+          </a:p>
+          <a:p>
+            <a:pPr marL="285750" indent="-285750">
+              <a:buFont typeface="Arial" panose="020B0604020202020204" pitchFamily="34" charset="0"/>
+              <a:buChar char="•"/>
+            </a:pPr>
+            <a:endParaRPr lang="en-US" dirty="0" smtClean="0"/>
+          </a:p>
+          <a:p>
+            <a:pPr marL="285750" indent="-285750">
+              <a:buFont typeface="Arial" panose="020B0604020202020204" pitchFamily="34" charset="0"/>
+              <a:buChar char="•"/>
+            </a:pPr>
+            <a:endParaRPr lang="en-US" dirty="0"/>
+          </a:p>
+          <a:p>
+            <a:pPr marL="285750" indent="-285750">
+              <a:buFont typeface="Arial" panose="020B0604020202020204" pitchFamily="34" charset="0"/>
+              <a:buChar char="•"/>
+            </a:pPr>
+            <a:r>
+              <a:rPr lang="en-US" dirty="0" smtClean="0"/>
+              <a:t>Word </a:t>
+            </a:r>
+            <a:r>
+              <a:rPr lang="en-US" dirty="0" err="1" smtClean="0"/>
+              <a:t>embeddings</a:t>
+            </a:r>
+            <a:endParaRPr lang="en-US" dirty="0" smtClean="0"/>
+          </a:p>
+          <a:p>
+            <a:pPr marL="742950" lvl="1" indent="-285750">
+              <a:buFont typeface="Arial" panose="020B0604020202020204" pitchFamily="34" charset="0"/>
+              <a:buChar char="•"/>
+            </a:pPr>
+            <a:r>
+              <a:rPr lang="en-US" dirty="0" smtClean="0"/>
+              <a:t>dense vector</a:t>
+            </a:r>
+          </a:p>
+          <a:p>
+            <a:pPr marL="742950" lvl="1" indent="-285750">
+              <a:buFont typeface="Arial" panose="020B0604020202020204" pitchFamily="34" charset="0"/>
+              <a:buChar char="•"/>
+            </a:pPr>
+            <a:r>
+              <a:rPr lang="en-US" dirty="0" smtClean="0"/>
+              <a:t>vector distance </a:t>
+            </a:r>
+            <a:r>
+              <a:rPr lang="en-US" dirty="0" smtClean="0">
+                <a:sym typeface="Symbol" panose="05050102010706020507" pitchFamily="18" charset="2"/>
+              </a:rPr>
+              <a:t></a:t>
+            </a:r>
+            <a:r>
+              <a:rPr lang="en-US" dirty="0" smtClean="0"/>
+              <a:t> semantic distance</a:t>
+            </a:r>
+          </a:p>
+          <a:p>
+            <a:pPr marL="742950" lvl="1" indent="-285750">
+              <a:buFont typeface="Arial" panose="020B0604020202020204" pitchFamily="34" charset="0"/>
+              <a:buChar char="•"/>
+            </a:pPr>
+            <a:endParaRPr lang="en-US" dirty="0"/>
+          </a:p>
+          <a:p>
+            <a:pPr marL="285750" indent="-285750">
+              <a:buFont typeface="Arial" panose="020B0604020202020204" pitchFamily="34" charset="0"/>
+              <a:buChar char="•"/>
+            </a:pPr>
+            <a:r>
+              <a:rPr lang="en-US" dirty="0" smtClean="0"/>
+              <a:t>Training</a:t>
+            </a:r>
+          </a:p>
+          <a:p>
+            <a:pPr marL="742950" lvl="1" indent="-285750">
+              <a:buFont typeface="Arial" panose="020B0604020202020204" pitchFamily="34" charset="0"/>
+              <a:buChar char="•"/>
+            </a:pPr>
+            <a:r>
+              <a:rPr lang="en-US" dirty="0" smtClean="0"/>
+              <a:t>use context</a:t>
+            </a:r>
+          </a:p>
+          <a:p>
+            <a:pPr marL="742950" lvl="1" indent="-285750">
+              <a:buFont typeface="Arial" panose="020B0604020202020204" pitchFamily="34" charset="0"/>
+              <a:buChar char="•"/>
+            </a:pPr>
+            <a:r>
+              <a:rPr lang="en-US" dirty="0" smtClean="0"/>
+              <a:t>discover relations with surrounding words</a:t>
+            </a:r>
+            <a:endParaRPr lang="en-US" dirty="0"/>
           </a:p>
         </p:txBody>
       </p:sp>
@@ -22317,6 +22416,99 @@
           </a:p>
         </p:txBody>
       </p:sp>
+      <p:sp>
+        <p:nvSpPr>
+          <p:cNvPr id="7" name="TextBox 6"/>
+          <p:cNvSpPr txBox="1"/>
+          <p:nvPr/>
+        </p:nvSpPr>
+        <p:spPr>
+          <a:xfrm>
+            <a:off x="1997030" y="2716698"/>
+            <a:ext cx="1617751" cy="830997"/>
+          </a:xfrm>
+          <a:prstGeom prst="rect">
+            <a:avLst/>
+          </a:prstGeom>
+          <a:noFill/>
+        </p:spPr>
+        <p:txBody>
+          <a:bodyPr wrap="none" rtlCol="0">
+            <a:spAutoFit/>
+          </a:bodyPr>
+          <a:lstStyle/>
+          <a:p>
+            <a:r>
+              <a:rPr lang="en-US" sz="1600" dirty="0" smtClean="0"/>
+              <a:t>Issues:</a:t>
+            </a:r>
+          </a:p>
+          <a:p>
+            <a:pPr marL="285750" indent="-285750">
+              <a:buFont typeface="Arial" panose="020B0604020202020204" pitchFamily="34" charset="0"/>
+              <a:buChar char="•"/>
+            </a:pPr>
+            <a:r>
+              <a:rPr lang="en-US" sz="1600" dirty="0" smtClean="0"/>
+              <a:t>unwieldy</a:t>
+            </a:r>
+          </a:p>
+          <a:p>
+            <a:pPr marL="285750" indent="-285750">
+              <a:buFont typeface="Arial" panose="020B0604020202020204" pitchFamily="34" charset="0"/>
+              <a:buChar char="•"/>
+            </a:pPr>
+            <a:r>
+              <a:rPr lang="en-US" sz="1600" dirty="0" smtClean="0"/>
+              <a:t>no semantics</a:t>
+            </a:r>
+            <a:endParaRPr lang="en-US" sz="1600" dirty="0"/>
+          </a:p>
+        </p:txBody>
+      </p:sp>
+      <p:pic>
+        <p:nvPicPr>
+          <p:cNvPr id="1028" name="Picture 4" descr="wmd - Copy"/>
+          <p:cNvPicPr>
+            <a:picLocks noGrp="1" noChangeAspect="1" noChangeArrowheads="1"/>
+          </p:cNvPicPr>
+          <p:nvPr>
+            <p:ph idx="1"/>
+          </p:nvPr>
+        </p:nvPicPr>
+        <p:blipFill>
+          <a:blip r:embed="rId2">
+            <a:extLst>
+              <a:ext uri="{28A0092B-C50C-407E-A947-70E740481C1C}">
+                <a14:useLocalDpi xmlns:a14="http://schemas.microsoft.com/office/drawing/2010/main" val="0"/>
+              </a:ext>
+            </a:extLst>
+          </a:blip>
+          <a:srcRect/>
+          <a:stretch>
+            <a:fillRect/>
+          </a:stretch>
+        </p:blipFill>
+        <p:spPr bwMode="auto">
+          <a:xfrm>
+            <a:off x="5014225" y="1855013"/>
+            <a:ext cx="6684134" cy="3210598"/>
+          </a:xfrm>
+          <a:prstGeom prst="rect">
+            <a:avLst/>
+          </a:prstGeom>
+          <a:noFill/>
+          <a:extLst>
+            <a:ext uri="{909E8E84-426E-40DD-AFC4-6F175D3DCCD1}">
+              <a14:hiddenFill xmlns:a14="http://schemas.microsoft.com/office/drawing/2010/main">
+                <a:solidFill>
+                  <a:srgbClr val="FFFFFF"/>
+                </a:solidFill>
+              </a14:hiddenFill>
+            </a:ext>
+          </a:extLst>
+        </p:spPr>
+      </p:pic>
     </p:spTree>
     <p:extLst>
       <p:ext uri="{BB962C8B-B14F-4D97-AF65-F5344CB8AC3E}">
@@ -22330,9 +22522,400 @@
   <p:timing>
     <p:tnLst>
       <p:par>
-        <p:cTn id="1" dur="indefinite" restart="never" nodeType="tmRoot"/>
+        <p:cTn id="1" dur="indefinite" restart="never" nodeType="tmRoot">
+          <p:childTnLst>
+            <p:seq concurrent="1" nextAc="seek">
+              <p:cTn id="2" dur="indefinite" nodeType="mainSeq">
+                <p:childTnLst>
+                  <p:par>
+                    <p:cTn id="3" fill="hold">
+                      <p:stCondLst>
+                        <p:cond delay="indefinite"/>
+                        <p:cond evt="onBegin" delay="0">
+                          <p:tn val="2"/>
+                        </p:cond>
+                      </p:stCondLst>
+                      <p:childTnLst>
+                        <p:par>
+                          <p:cTn id="4" fill="hold">
+                            <p:stCondLst>
+                              <p:cond delay="0"/>
+                            </p:stCondLst>
+                            <p:childTnLst>
+                              <p:par>
+                                <p:cTn id="5" presetID="1" presetClass="entr" presetSubtype="0" fill="hold" grpId="0" nodeType="withEffect">
+                                  <p:stCondLst>
+                                    <p:cond delay="0"/>
+                                  </p:stCondLst>
+                                  <p:childTnLst>
+                                    <p:set>
+                                      <p:cBhvr>
+                                        <p:cTn id="6" dur="1" fill="hold">
+                                          <p:stCondLst>
+                                            <p:cond delay="0"/>
+                                          </p:stCondLst>
+                                        </p:cTn>
+                                        <p:tgtEl>
+                                          <p:spTgt spid="4">
+                                            <p:txEl>
+                                              <p:pRg st="0" end="0"/>
+                                            </p:txEl>
+                                          </p:spTgt>
+                                        </p:tgtEl>
+                                        <p:attrNameLst>
+                                          <p:attrName>style.visibility</p:attrName>
+                                        </p:attrNameLst>
+                                      </p:cBhvr>
+                                      <p:to>
+                                        <p:strVal val="visible"/>
+                                      </p:to>
+                                    </p:set>
+                                  </p:childTnLst>
+                                </p:cTn>
+                              </p:par>
+                            </p:childTnLst>
+                          </p:cTn>
+                        </p:par>
+                      </p:childTnLst>
+                    </p:cTn>
+                  </p:par>
+                  <p:par>
+                    <p:cTn id="7" fill="hold">
+                      <p:stCondLst>
+                        <p:cond delay="indefinite"/>
+                      </p:stCondLst>
+                      <p:childTnLst>
+                        <p:par>
+                          <p:cTn id="8" fill="hold">
+                            <p:stCondLst>
+                              <p:cond delay="0"/>
+                            </p:stCondLst>
+                            <p:childTnLst>
+                              <p:par>
+                                <p:cTn id="9" presetID="1" presetClass="entr" presetSubtype="0" fill="hold" grpId="0" nodeType="clickEffect">
+                                  <p:stCondLst>
+                                    <p:cond delay="0"/>
+                                  </p:stCondLst>
+                                  <p:childTnLst>
+                                    <p:set>
+                                      <p:cBhvr>
+                                        <p:cTn id="10" dur="1" fill="hold">
+                                          <p:stCondLst>
+                                            <p:cond delay="0"/>
+                                          </p:stCondLst>
+                                        </p:cTn>
+                                        <p:tgtEl>
+                                          <p:spTgt spid="7"/>
+                                        </p:tgtEl>
+                                        <p:attrNameLst>
+                                          <p:attrName>style.visibility</p:attrName>
+                                        </p:attrNameLst>
+                                      </p:cBhvr>
+                                      <p:to>
+                                        <p:strVal val="visible"/>
+                                      </p:to>
+                                    </p:set>
+                                  </p:childTnLst>
+                                </p:cTn>
+                              </p:par>
+                            </p:childTnLst>
+                          </p:cTn>
+                        </p:par>
+                      </p:childTnLst>
+                    </p:cTn>
+                  </p:par>
+                  <p:par>
+                    <p:cTn id="11" fill="hold">
+                      <p:stCondLst>
+                        <p:cond delay="indefinite"/>
+                      </p:stCondLst>
+                      <p:childTnLst>
+                        <p:par>
+                          <p:cTn id="12" fill="hold">
+                            <p:stCondLst>
+                              <p:cond delay="0"/>
+                            </p:stCondLst>
+                            <p:childTnLst>
+                              <p:par>
+                                <p:cTn id="13" presetID="1" presetClass="entr" presetSubtype="0" fill="hold" grpId="0" nodeType="clickEffect">
+                                  <p:stCondLst>
+                                    <p:cond delay="0"/>
+                                  </p:stCondLst>
+                                  <p:childTnLst>
+                                    <p:set>
+                                      <p:cBhvr>
+                                        <p:cTn id="14" dur="1" fill="hold">
+                                          <p:stCondLst>
+                                            <p:cond delay="0"/>
+                                          </p:stCondLst>
+                                        </p:cTn>
+                                        <p:tgtEl>
+                                          <p:spTgt spid="4">
+                                            <p:txEl>
+                                              <p:pRg st="4" end="4"/>
+                                            </p:txEl>
+                                          </p:spTgt>
+                                        </p:tgtEl>
+                                        <p:attrNameLst>
+                                          <p:attrName>style.visibility</p:attrName>
+                                        </p:attrNameLst>
+                                      </p:cBhvr>
+                                      <p:to>
+                                        <p:strVal val="visible"/>
+                                      </p:to>
+                                    </p:set>
+                                  </p:childTnLst>
+                                </p:cTn>
+                              </p:par>
+                              <p:par>
+                                <p:cTn id="15" presetID="1" presetClass="entr" presetSubtype="0" fill="hold" grpId="0" nodeType="withEffect">
+                                  <p:stCondLst>
+                                    <p:cond delay="0"/>
+                                  </p:stCondLst>
+                                  <p:childTnLst>
+                                    <p:set>
+                                      <p:cBhvr>
+                                        <p:cTn id="16" dur="1" fill="hold">
+                                          <p:stCondLst>
+                                            <p:cond delay="0"/>
+                                          </p:stCondLst>
+                                        </p:cTn>
+                                        <p:tgtEl>
+                                          <p:spTgt spid="4">
+                                            <p:txEl>
+                                              <p:pRg st="5" end="5"/>
+                                            </p:txEl>
+                                          </p:spTgt>
+                                        </p:tgtEl>
+                                        <p:attrNameLst>
+                                          <p:attrName>style.visibility</p:attrName>
+                                        </p:attrNameLst>
+                                      </p:cBhvr>
+                                      <p:to>
+                                        <p:strVal val="visible"/>
+                                      </p:to>
+                                    </p:set>
+                                  </p:childTnLst>
+                                </p:cTn>
+                              </p:par>
+                              <p:par>
+                                <p:cTn id="17" presetID="1" presetClass="entr" presetSubtype="0" fill="hold" grpId="0" nodeType="withEffect">
+                                  <p:stCondLst>
+                                    <p:cond delay="0"/>
+                                  </p:stCondLst>
+                                  <p:childTnLst>
+                                    <p:set>
+                                      <p:cBhvr>
+                                        <p:cTn id="18" dur="1" fill="hold">
+                                          <p:stCondLst>
+                                            <p:cond delay="0"/>
+                                          </p:stCondLst>
+                                        </p:cTn>
+                                        <p:tgtEl>
+                                          <p:spTgt spid="4">
+                                            <p:txEl>
+                                              <p:pRg st="6" end="6"/>
+                                            </p:txEl>
+                                          </p:spTgt>
+                                        </p:tgtEl>
+                                        <p:attrNameLst>
+                                          <p:attrName>style.visibility</p:attrName>
+                                        </p:attrNameLst>
+                                      </p:cBhvr>
+                                      <p:to>
+                                        <p:strVal val="visible"/>
+                                      </p:to>
+                                    </p:set>
+                                  </p:childTnLst>
+                                </p:cTn>
+                              </p:par>
+                            </p:childTnLst>
+                          </p:cTn>
+                        </p:par>
+                      </p:childTnLst>
+                    </p:cTn>
+                  </p:par>
+                  <p:par>
+                    <p:cTn id="19" fill="hold">
+                      <p:stCondLst>
+                        <p:cond delay="indefinite"/>
+                      </p:stCondLst>
+                      <p:childTnLst>
+                        <p:par>
+                          <p:cTn id="20" fill="hold">
+                            <p:stCondLst>
+                              <p:cond delay="0"/>
+                            </p:stCondLst>
+                            <p:childTnLst>
+                              <p:par>
+                                <p:cTn id="21" presetID="1" presetClass="entr" presetSubtype="0" fill="hold" nodeType="clickEffect">
+                                  <p:stCondLst>
+                                    <p:cond delay="0"/>
+                                  </p:stCondLst>
+                                  <p:childTnLst>
+                                    <p:set>
+                                      <p:cBhvr>
+                                        <p:cTn id="22" dur="1" fill="hold">
+                                          <p:stCondLst>
+                                            <p:cond delay="0"/>
+                                          </p:stCondLst>
+                                        </p:cTn>
+                                        <p:tgtEl>
+                                          <p:spTgt spid="1028"/>
+                                        </p:tgtEl>
+                                        <p:attrNameLst>
+                                          <p:attrName>style.visibility</p:attrName>
+                                        </p:attrNameLst>
+                                      </p:cBhvr>
+                                      <p:to>
+                                        <p:strVal val="visible"/>
+                                      </p:to>
+                                    </p:set>
+                                  </p:childTnLst>
+                                </p:cTn>
+                              </p:par>
+                            </p:childTnLst>
+                          </p:cTn>
+                        </p:par>
+                      </p:childTnLst>
+                    </p:cTn>
+                  </p:par>
+                  <p:par>
+                    <p:cTn id="23" fill="hold">
+                      <p:stCondLst>
+                        <p:cond delay="indefinite"/>
+                      </p:stCondLst>
+                      <p:childTnLst>
+                        <p:par>
+                          <p:cTn id="24" fill="hold">
+                            <p:stCondLst>
+                              <p:cond delay="0"/>
+                            </p:stCondLst>
+                            <p:childTnLst>
+                              <p:par>
+                                <p:cTn id="25" presetID="1" presetClass="entr" presetSubtype="0" fill="hold" grpId="0" nodeType="clickEffect">
+                                  <p:stCondLst>
+                                    <p:cond delay="0"/>
+                                  </p:stCondLst>
+                                  <p:childTnLst>
+                                    <p:set>
+                                      <p:cBhvr>
+                                        <p:cTn id="26" dur="1" fill="hold">
+                                          <p:stCondLst>
+                                            <p:cond delay="0"/>
+                                          </p:stCondLst>
+                                        </p:cTn>
+                                        <p:tgtEl>
+                                          <p:spTgt spid="4">
+                                            <p:txEl>
+                                              <p:pRg st="8" end="8"/>
+                                            </p:txEl>
+                                          </p:spTgt>
+                                        </p:tgtEl>
+                                        <p:attrNameLst>
+                                          <p:attrName>style.visibility</p:attrName>
+                                        </p:attrNameLst>
+                                      </p:cBhvr>
+                                      <p:to>
+                                        <p:strVal val="visible"/>
+                                      </p:to>
+                                    </p:set>
+                                  </p:childTnLst>
+                                </p:cTn>
+                              </p:par>
+                              <p:par>
+                                <p:cTn id="27" presetID="1" presetClass="entr" presetSubtype="0" fill="hold" grpId="0" nodeType="withEffect">
+                                  <p:stCondLst>
+                                    <p:cond delay="0"/>
+                                  </p:stCondLst>
+                                  <p:childTnLst>
+                                    <p:set>
+                                      <p:cBhvr>
+                                        <p:cTn id="28" dur="1" fill="hold">
+                                          <p:stCondLst>
+                                            <p:cond delay="0"/>
+                                          </p:stCondLst>
+                                        </p:cTn>
+                                        <p:tgtEl>
+                                          <p:spTgt spid="4">
+                                            <p:txEl>
+                                              <p:pRg st="9" end="9"/>
+                                            </p:txEl>
+                                          </p:spTgt>
+                                        </p:tgtEl>
+                                        <p:attrNameLst>
+                                          <p:attrName>style.visibility</p:attrName>
+                                        </p:attrNameLst>
+                                      </p:cBhvr>
+                                      <p:to>
+                                        <p:strVal val="visible"/>
+                                      </p:to>
+                                    </p:set>
+                                  </p:childTnLst>
+                                </p:cTn>
+                              </p:par>
+                              <p:par>
+                                <p:cTn id="29" presetID="1" presetClass="entr" presetSubtype="0" fill="hold" grpId="0" nodeType="withEffect">
+                                  <p:stCondLst>
+                                    <p:cond delay="0"/>
+                                  </p:stCondLst>
+                                  <p:childTnLst>
+                                    <p:set>
+                                      <p:cBhvr>
+                                        <p:cTn id="30" dur="1" fill="hold">
+                                          <p:stCondLst>
+                                            <p:cond delay="0"/>
+                                          </p:stCondLst>
+                                        </p:cTn>
+                                        <p:tgtEl>
+                                          <p:spTgt spid="4">
+                                            <p:txEl>
+                                              <p:pRg st="10" end="10"/>
+                                            </p:txEl>
+                                          </p:spTgt>
+                                        </p:tgtEl>
+                                        <p:attrNameLst>
+                                          <p:attrName>style.visibility</p:attrName>
+                                        </p:attrNameLst>
+                                      </p:cBhvr>
+                                      <p:to>
+                                        <p:strVal val="visible"/>
+                                      </p:to>
+                                    </p:set>
+                                  </p:childTnLst>
+                                </p:cTn>
+                              </p:par>
+                            </p:childTnLst>
+                          </p:cTn>
+                        </p:par>
+                      </p:childTnLst>
+                    </p:cTn>
+                  </p:par>
+                </p:childTnLst>
+              </p:cTn>
+              <p:prevCondLst>
+                <p:cond evt="onPrev" delay="0">
+                  <p:tgtEl>
+                    <p:sldTgt/>
+                  </p:tgtEl>
+                </p:cond>
+              </p:prevCondLst>
+              <p:nextCondLst>
+                <p:cond evt="onNext" delay="0">
+                  <p:tgtEl>
+                    <p:sldTgt/>
+                  </p:tgtEl>
+                </p:cond>
+              </p:nextCondLst>
+            </p:seq>
+          </p:childTnLst>
+        </p:cTn>
       </p:par>
     </p:tnLst>
+    <p:bldLst>
+      <p:bldP spid="4" grpId="0" uiExpand="1" build="p"/>
+      <p:bldP spid="7" grpId="0"/>
+    </p:bldLst>
   </p:timing>
 </p:sld>
 </file>

</xml_diff>